<commit_message>
right version of materials
</commit_message>
<xml_diff>
--- a/docs/yuqian-wang/yuqian_wang_presentation.pptx
+++ b/docs/yuqian-wang/yuqian_wang_presentation.pptx
@@ -1,45 +1,53 @@
 
 <file path=ppt/presentation.xml><?xml version="1.0" encoding="utf-8"?>
-<p:presentation xmlns:a="http://schemas.openxmlformats.org/drawingml/2006/main" xmlns:r="http://schemas.openxmlformats.org/officeDocument/2006/relationships" xmlns:mc="http://schemas.openxmlformats.org/markup-compatibility/2006" xmlns:mv="urn:schemas-microsoft-com:mac:vml" xmlns:p="http://schemas.openxmlformats.org/presentationml/2006/main" xmlns:c="http://schemas.openxmlformats.org/drawingml/2006/chart" xmlns:dgm="http://schemas.openxmlformats.org/drawingml/2006/diagram" xmlns:o="urn:schemas-microsoft-com:office:office" xmlns:v="urn:schemas-microsoft-com:vml" xmlns:pvml="urn:schemas-microsoft-com:office:powerpoint" xmlns:com="http://schemas.openxmlformats.org/drawingml/2006/compatibility" xmlns:p14="http://schemas.microsoft.com/office/powerpoint/2010/main" xmlns:p15="http://schemas.microsoft.com/office/powerpoint/2012/main" xmlns:ahyp="http://schemas.microsoft.com/office/drawing/2018/hyperlinkcolor" autoCompressPictures="0" embedTrueTypeFonts="1" strictFirstAndLastChars="0" saveSubsetFonts="1">
+<p:presentation xmlns:a="http://schemas.openxmlformats.org/drawingml/2006/main" xmlns:r="http://schemas.openxmlformats.org/officeDocument/2006/relationships" xmlns:p="http://schemas.openxmlformats.org/presentationml/2006/main" strictFirstAndLastChars="0" embedTrueTypeFonts="1" saveSubsetFonts="1" autoCompressPictures="0">
   <p:sldMasterIdLst>
-    <p:sldMasterId id="2147483659" r:id="rId4"/>
+    <p:sldMasterId id="2147483659" r:id="rId1"/>
   </p:sldMasterIdLst>
   <p:notesMasterIdLst>
-    <p:notesMasterId r:id="rId5"/>
+    <p:notesMasterId r:id="rId9"/>
   </p:notesMasterIdLst>
   <p:sldIdLst>
-    <p:sldId id="256" r:id="rId6"/>
-    <p:sldId id="257" r:id="rId7"/>
-    <p:sldId id="258" r:id="rId8"/>
-    <p:sldId id="259" r:id="rId9"/>
-    <p:sldId id="260" r:id="rId10"/>
-    <p:sldId id="261" r:id="rId11"/>
+    <p:sldId id="256" r:id="rId2"/>
+    <p:sldId id="257" r:id="rId3"/>
+    <p:sldId id="258" r:id="rId4"/>
+    <p:sldId id="259" r:id="rId5"/>
+    <p:sldId id="262" r:id="rId6"/>
+    <p:sldId id="260" r:id="rId7"/>
+    <p:sldId id="261" r:id="rId8"/>
   </p:sldIdLst>
-  <p:sldSz cy="5143500" cx="9144000"/>
+  <p:sldSz cx="9144000" cy="5143500" type="screen16x9"/>
   <p:notesSz cx="6858000" cy="9144000"/>
   <p:embeddedFontLst>
     <p:embeddedFont>
-      <p:font typeface="Raleway"/>
-      <p:regular r:id="rId12"/>
-      <p:bold r:id="rId13"/>
-      <p:italic r:id="rId14"/>
-      <p:boldItalic r:id="rId15"/>
+      <p:font typeface="Calibri" panose="020F0502020204030204" pitchFamily="34" charset="0"/>
+      <p:regular r:id="rId10"/>
+      <p:bold r:id="rId11"/>
+      <p:italic r:id="rId12"/>
+      <p:boldItalic r:id="rId13"/>
     </p:embeddedFont>
     <p:embeddedFont>
-      <p:font typeface="Lato"/>
-      <p:regular r:id="rId16"/>
-      <p:bold r:id="rId17"/>
-      <p:italic r:id="rId18"/>
+      <p:font typeface="Lato" panose="020F0502020204030203" pitchFamily="34" charset="0"/>
+      <p:regular r:id="rId14"/>
+      <p:bold r:id="rId15"/>
+      <p:italic r:id="rId16"/>
+      <p:boldItalic r:id="rId17"/>
+    </p:embeddedFont>
+    <p:embeddedFont>
+      <p:font typeface="Lato Black" panose="020F0502020204030203" pitchFamily="34" charset="0"/>
+      <p:bold r:id="rId18"/>
       <p:boldItalic r:id="rId19"/>
     </p:embeddedFont>
     <p:embeddedFont>
-      <p:font typeface="Lato Black"/>
-      <p:bold r:id="rId20"/>
-      <p:boldItalic r:id="rId21"/>
+      <p:font typeface="Raleway" pitchFamily="2" charset="0"/>
+      <p:regular r:id="rId20"/>
+      <p:bold r:id="rId21"/>
+      <p:italic r:id="rId22"/>
+      <p:boldItalic r:id="rId23"/>
     </p:embeddedFont>
   </p:embeddedFontLst>
   <p:defaultTextStyle>
-    <a:defPPr lvl="0" marR="0" rtl="0" algn="l">
+    <a:defPPr marR="0" lvl="0" algn="l" rtl="0">
       <a:lnSpc>
         <a:spcPct val="100000"/>
       </a:lnSpc>
@@ -50,7 +58,7 @@
         <a:spcPts val="0"/>
       </a:spcAft>
     </a:defPPr>
-    <a:lvl1pPr lvl="0" marR="0" rtl="0" algn="l">
+    <a:lvl1pPr marR="0" lvl="0" algn="l" rtl="0">
       <a:lnSpc>
         <a:spcPct val="100000"/>
       </a:lnSpc>
@@ -64,7 +72,7 @@
         <a:srgbClr val="000000"/>
       </a:buClr>
       <a:buFont typeface="Arial"/>
-      <a:defRPr b="0" i="0" sz="1400" u="none" cap="none" strike="noStrike">
+      <a:defRPr sz="1400" b="0" i="0" u="none" strike="noStrike" cap="none">
         <a:solidFill>
           <a:srgbClr val="000000"/>
         </a:solidFill>
@@ -74,7 +82,7 @@
         <a:sym typeface="Arial"/>
       </a:defRPr>
     </a:lvl1pPr>
-    <a:lvl2pPr lvl="1" marR="0" rtl="0" algn="l">
+    <a:lvl2pPr marR="0" lvl="1" algn="l" rtl="0">
       <a:lnSpc>
         <a:spcPct val="100000"/>
       </a:lnSpc>
@@ -88,7 +96,7 @@
         <a:srgbClr val="000000"/>
       </a:buClr>
       <a:buFont typeface="Arial"/>
-      <a:defRPr b="0" i="0" sz="1400" u="none" cap="none" strike="noStrike">
+      <a:defRPr sz="1400" b="0" i="0" u="none" strike="noStrike" cap="none">
         <a:solidFill>
           <a:srgbClr val="000000"/>
         </a:solidFill>
@@ -98,7 +106,7 @@
         <a:sym typeface="Arial"/>
       </a:defRPr>
     </a:lvl2pPr>
-    <a:lvl3pPr lvl="2" marR="0" rtl="0" algn="l">
+    <a:lvl3pPr marR="0" lvl="2" algn="l" rtl="0">
       <a:lnSpc>
         <a:spcPct val="100000"/>
       </a:lnSpc>
@@ -112,7 +120,7 @@
         <a:srgbClr val="000000"/>
       </a:buClr>
       <a:buFont typeface="Arial"/>
-      <a:defRPr b="0" i="0" sz="1400" u="none" cap="none" strike="noStrike">
+      <a:defRPr sz="1400" b="0" i="0" u="none" strike="noStrike" cap="none">
         <a:solidFill>
           <a:srgbClr val="000000"/>
         </a:solidFill>
@@ -122,7 +130,7 @@
         <a:sym typeface="Arial"/>
       </a:defRPr>
     </a:lvl3pPr>
-    <a:lvl4pPr lvl="3" marR="0" rtl="0" algn="l">
+    <a:lvl4pPr marR="0" lvl="3" algn="l" rtl="0">
       <a:lnSpc>
         <a:spcPct val="100000"/>
       </a:lnSpc>
@@ -136,7 +144,7 @@
         <a:srgbClr val="000000"/>
       </a:buClr>
       <a:buFont typeface="Arial"/>
-      <a:defRPr b="0" i="0" sz="1400" u="none" cap="none" strike="noStrike">
+      <a:defRPr sz="1400" b="0" i="0" u="none" strike="noStrike" cap="none">
         <a:solidFill>
           <a:srgbClr val="000000"/>
         </a:solidFill>
@@ -146,7 +154,7 @@
         <a:sym typeface="Arial"/>
       </a:defRPr>
     </a:lvl4pPr>
-    <a:lvl5pPr lvl="4" marR="0" rtl="0" algn="l">
+    <a:lvl5pPr marR="0" lvl="4" algn="l" rtl="0">
       <a:lnSpc>
         <a:spcPct val="100000"/>
       </a:lnSpc>
@@ -160,7 +168,7 @@
         <a:srgbClr val="000000"/>
       </a:buClr>
       <a:buFont typeface="Arial"/>
-      <a:defRPr b="0" i="0" sz="1400" u="none" cap="none" strike="noStrike">
+      <a:defRPr sz="1400" b="0" i="0" u="none" strike="noStrike" cap="none">
         <a:solidFill>
           <a:srgbClr val="000000"/>
         </a:solidFill>
@@ -170,7 +178,7 @@
         <a:sym typeface="Arial"/>
       </a:defRPr>
     </a:lvl5pPr>
-    <a:lvl6pPr lvl="5" marR="0" rtl="0" algn="l">
+    <a:lvl6pPr marR="0" lvl="5" algn="l" rtl="0">
       <a:lnSpc>
         <a:spcPct val="100000"/>
       </a:lnSpc>
@@ -184,7 +192,7 @@
         <a:srgbClr val="000000"/>
       </a:buClr>
       <a:buFont typeface="Arial"/>
-      <a:defRPr b="0" i="0" sz="1400" u="none" cap="none" strike="noStrike">
+      <a:defRPr sz="1400" b="0" i="0" u="none" strike="noStrike" cap="none">
         <a:solidFill>
           <a:srgbClr val="000000"/>
         </a:solidFill>
@@ -194,7 +202,7 @@
         <a:sym typeface="Arial"/>
       </a:defRPr>
     </a:lvl6pPr>
-    <a:lvl7pPr lvl="6" marR="0" rtl="0" algn="l">
+    <a:lvl7pPr marR="0" lvl="6" algn="l" rtl="0">
       <a:lnSpc>
         <a:spcPct val="100000"/>
       </a:lnSpc>
@@ -208,7 +216,7 @@
         <a:srgbClr val="000000"/>
       </a:buClr>
       <a:buFont typeface="Arial"/>
-      <a:defRPr b="0" i="0" sz="1400" u="none" cap="none" strike="noStrike">
+      <a:defRPr sz="1400" b="0" i="0" u="none" strike="noStrike" cap="none">
         <a:solidFill>
           <a:srgbClr val="000000"/>
         </a:solidFill>
@@ -218,7 +226,7 @@
         <a:sym typeface="Arial"/>
       </a:defRPr>
     </a:lvl7pPr>
-    <a:lvl8pPr lvl="7" marR="0" rtl="0" algn="l">
+    <a:lvl8pPr marR="0" lvl="7" algn="l" rtl="0">
       <a:lnSpc>
         <a:spcPct val="100000"/>
       </a:lnSpc>
@@ -232,7 +240,7 @@
         <a:srgbClr val="000000"/>
       </a:buClr>
       <a:buFont typeface="Arial"/>
-      <a:defRPr b="0" i="0" sz="1400" u="none" cap="none" strike="noStrike">
+      <a:defRPr sz="1400" b="0" i="0" u="none" strike="noStrike" cap="none">
         <a:solidFill>
           <a:srgbClr val="000000"/>
         </a:solidFill>
@@ -242,7 +250,7 @@
         <a:sym typeface="Arial"/>
       </a:defRPr>
     </a:lvl8pPr>
-    <a:lvl9pPr lvl="8" marR="0" rtl="0" algn="l">
+    <a:lvl9pPr marR="0" lvl="8" algn="l" rtl="0">
       <a:lnSpc>
         <a:spcPct val="100000"/>
       </a:lnSpc>
@@ -256,7 +264,7 @@
         <a:srgbClr val="000000"/>
       </a:buClr>
       <a:buFont typeface="Arial"/>
-      <a:defRPr b="0" i="0" sz="1400" u="none" cap="none" strike="noStrike">
+      <a:defRPr sz="1400" b="0" i="0" u="none" strike="noStrike" cap="none">
         <a:solidFill>
           <a:srgbClr val="000000"/>
         </a:solidFill>
@@ -269,7 +277,7 @@
   </p:defaultTextStyle>
   <p:extLst>
     <p:ext uri="{EFAFB233-063F-42B5-8137-9DF3F51BA10A}">
-      <p15:sldGuideLst>
+      <p15:sldGuideLst xmlns:p15="http://schemas.microsoft.com/office/powerpoint/2012/main">
         <p15:guide id="1" orient="horz" pos="1620">
           <p15:clr>
             <a:srgbClr val="747775"/>
@@ -287,11 +295,16 @@
 </file>
 
 <file path=ppt/notesMasters/notesMaster1.xml><?xml version="1.0" encoding="utf-8"?>
-<p:notesMaster xmlns:a="http://schemas.openxmlformats.org/drawingml/2006/main" xmlns:r="http://schemas.openxmlformats.org/officeDocument/2006/relationships" xmlns:mc="http://schemas.openxmlformats.org/markup-compatibility/2006" xmlns:mv="urn:schemas-microsoft-com:mac:vml" xmlns:p="http://schemas.openxmlformats.org/presentationml/2006/main" xmlns:c="http://schemas.openxmlformats.org/drawingml/2006/chart" xmlns:dgm="http://schemas.openxmlformats.org/drawingml/2006/diagram" xmlns:o="urn:schemas-microsoft-com:office:office" xmlns:v="urn:schemas-microsoft-com:vml" xmlns:pvml="urn:schemas-microsoft-com:office:powerpoint" xmlns:com="http://schemas.openxmlformats.org/drawingml/2006/compatibility" xmlns:p14="http://schemas.microsoft.com/office/powerpoint/2010/main" xmlns:p15="http://schemas.microsoft.com/office/powerpoint/2012/main" xmlns:ahyp="http://schemas.microsoft.com/office/drawing/2018/hyperlinkcolor">
+<p:notesMaster xmlns:a="http://schemas.openxmlformats.org/drawingml/2006/main" xmlns:r="http://schemas.openxmlformats.org/officeDocument/2006/relationships" xmlns:p="http://schemas.openxmlformats.org/presentationml/2006/main">
   <p:cSld>
+    <p:bg>
+      <p:bgRef idx="1001">
+        <a:schemeClr val="bg1"/>
+      </p:bgRef>
+    </p:bg>
     <p:spTree>
       <p:nvGrpSpPr>
-        <p:cNvPr id="2" name="Shape 2"/>
+        <p:cNvPr id="1" name="Shape 2"/>
         <p:cNvGrpSpPr/>
         <p:nvPr/>
       </p:nvGrpSpPr>
@@ -306,9 +319,11 @@
       <p:sp>
         <p:nvSpPr>
           <p:cNvPr id="3" name="Google Shape;3;n"/>
-          <p:cNvSpPr/>
+          <p:cNvSpPr>
+            <a:spLocks noGrp="1" noRot="1" noChangeAspect="1"/>
+          </p:cNvSpPr>
           <p:nvPr>
-            <p:ph idx="2" type="sldImg"/>
+            <p:ph type="sldImg" idx="2"/>
           </p:nvPr>
         </p:nvSpPr>
         <p:spPr>
@@ -317,9 +332,13 @@
             <a:ext cx="6096075" cy="3429000"/>
           </a:xfrm>
           <a:custGeom>
-            <a:rect b="b" l="l" r="r" t="t"/>
+            <a:avLst/>
+            <a:gdLst/>
+            <a:ahLst/>
+            <a:cxnLst/>
+            <a:rect l="l" t="t" r="r" b="b"/>
             <a:pathLst>
-              <a:path extrusionOk="0" h="120000" w="120000">
+              <a:path w="120000" h="120000" extrusionOk="0">
                 <a:moveTo>
                   <a:pt x="0" y="0"/>
                 </a:moveTo>
@@ -337,23 +356,25 @@
             </a:pathLst>
           </a:custGeom>
           <a:noFill/>
-          <a:ln cap="flat" cmpd="sng" w="9525">
+          <a:ln w="9525" cap="flat" cmpd="sng">
             <a:solidFill>
               <a:srgbClr val="000000"/>
             </a:solidFill>
             <a:prstDash val="solid"/>
             <a:round/>
-            <a:headEnd len="sm" w="sm" type="none"/>
-            <a:tailEnd len="sm" w="sm" type="none"/>
+            <a:headEnd type="none" w="sm" len="sm"/>
+            <a:tailEnd type="none" w="sm" len="sm"/>
           </a:ln>
         </p:spPr>
       </p:sp>
       <p:sp>
         <p:nvSpPr>
           <p:cNvPr id="4" name="Google Shape;4;n"/>
-          <p:cNvSpPr txBox="1"/>
+          <p:cNvSpPr txBox="1">
+            <a:spLocks noGrp="1"/>
+          </p:cNvSpPr>
           <p:nvPr>
-            <p:ph idx="1" type="body"/>
+            <p:ph type="body" idx="1"/>
           </p:nvPr>
         </p:nvSpPr>
         <p:spPr>
@@ -370,11 +391,11 @@
           </a:ln>
         </p:spPr>
         <p:txBody>
-          <a:bodyPr anchorCtr="0" anchor="t" bIns="91425" lIns="91425" spcFirstLastPara="1" rIns="91425" wrap="square" tIns="91425">
+          <a:bodyPr spcFirstLastPara="1" wrap="square" lIns="91425" tIns="91425" rIns="91425" bIns="91425" anchor="t" anchorCtr="0">
             <a:noAutofit/>
           </a:bodyPr>
           <a:lstStyle>
-            <a:lvl1pPr indent="-298450" lvl="0" marL="457200">
+            <a:lvl1pPr marL="457200" lvl="0" indent="-298450">
               <a:spcBef>
                 <a:spcPts val="0"/>
               </a:spcBef>
@@ -385,7 +406,7 @@
               <a:buChar char="●"/>
               <a:defRPr sz="1100"/>
             </a:lvl1pPr>
-            <a:lvl2pPr indent="-298450" lvl="1" marL="914400">
+            <a:lvl2pPr marL="914400" lvl="1" indent="-298450">
               <a:spcBef>
                 <a:spcPts val="0"/>
               </a:spcBef>
@@ -396,7 +417,7 @@
               <a:buChar char="○"/>
               <a:defRPr sz="1100"/>
             </a:lvl2pPr>
-            <a:lvl3pPr indent="-298450" lvl="2" marL="1371600">
+            <a:lvl3pPr marL="1371600" lvl="2" indent="-298450">
               <a:spcBef>
                 <a:spcPts val="0"/>
               </a:spcBef>
@@ -407,7 +428,7 @@
               <a:buChar char="■"/>
               <a:defRPr sz="1100"/>
             </a:lvl3pPr>
-            <a:lvl4pPr indent="-298450" lvl="3" marL="1828800">
+            <a:lvl4pPr marL="1828800" lvl="3" indent="-298450">
               <a:spcBef>
                 <a:spcPts val="0"/>
               </a:spcBef>
@@ -418,7 +439,7 @@
               <a:buChar char="●"/>
               <a:defRPr sz="1100"/>
             </a:lvl4pPr>
-            <a:lvl5pPr indent="-298450" lvl="4" marL="2286000">
+            <a:lvl5pPr marL="2286000" lvl="4" indent="-298450">
               <a:spcBef>
                 <a:spcPts val="0"/>
               </a:spcBef>
@@ -429,7 +450,7 @@
               <a:buChar char="○"/>
               <a:defRPr sz="1100"/>
             </a:lvl5pPr>
-            <a:lvl6pPr indent="-298450" lvl="5" marL="2743200">
+            <a:lvl6pPr marL="2743200" lvl="5" indent="-298450">
               <a:spcBef>
                 <a:spcPts val="0"/>
               </a:spcBef>
@@ -440,7 +461,7 @@
               <a:buChar char="■"/>
               <a:defRPr sz="1100"/>
             </a:lvl6pPr>
-            <a:lvl7pPr indent="-298450" lvl="6" marL="3200400">
+            <a:lvl7pPr marL="3200400" lvl="6" indent="-298450">
               <a:spcBef>
                 <a:spcPts val="0"/>
               </a:spcBef>
@@ -451,7 +472,7 @@
               <a:buChar char="●"/>
               <a:defRPr sz="1100"/>
             </a:lvl7pPr>
-            <a:lvl8pPr indent="-298450" lvl="7" marL="3657600">
+            <a:lvl8pPr marL="3657600" lvl="7" indent="-298450">
               <a:spcBef>
                 <a:spcPts val="0"/>
               </a:spcBef>
@@ -462,7 +483,7 @@
               <a:buChar char="○"/>
               <a:defRPr sz="1100"/>
             </a:lvl8pPr>
-            <a:lvl9pPr indent="-298450" lvl="8" marL="4114800">
+            <a:lvl9pPr marL="4114800" lvl="8" indent="-298450">
               <a:spcBef>
                 <a:spcPts val="0"/>
               </a:spcBef>
@@ -474,14 +495,16 @@
               <a:defRPr sz="1100"/>
             </a:lvl9pPr>
           </a:lstStyle>
-          <a:p/>
+          <a:p>
+            <a:endParaRPr/>
+          </a:p>
         </p:txBody>
       </p:sp>
     </p:spTree>
   </p:cSld>
-  <p:clrMap accent1="accent1" accent2="accent2" accent3="accent3" accent4="accent4" accent5="accent5" accent6="accent6" bg1="lt1" bg2="dk2" tx1="dk1" tx2="lt2" folHlink="folHlink" hlink="hlink"/>
+  <p:clrMap bg1="lt1" tx1="dk1" bg2="dk2" tx2="lt2" accent1="accent1" accent2="accent2" accent3="accent3" accent4="accent4" accent5="accent5" accent6="accent6" hlink="hlink" folHlink="folHlink"/>
   <p:notesStyle>
-    <a:defPPr lvl="0" marR="0" rtl="0" algn="l">
+    <a:defPPr marR="0" lvl="0" algn="l" rtl="0">
       <a:lnSpc>
         <a:spcPct val="100000"/>
       </a:lnSpc>
@@ -492,7 +515,7 @@
         <a:spcPts val="0"/>
       </a:spcAft>
     </a:defPPr>
-    <a:lvl1pPr lvl="0" marR="0" rtl="0" algn="l">
+    <a:lvl1pPr marR="0" lvl="0" algn="l" rtl="0">
       <a:lnSpc>
         <a:spcPct val="100000"/>
       </a:lnSpc>
@@ -506,7 +529,7 @@
         <a:srgbClr val="000000"/>
       </a:buClr>
       <a:buFont typeface="Arial"/>
-      <a:defRPr b="0" i="0" sz="1400" u="none" cap="none" strike="noStrike">
+      <a:defRPr sz="1400" b="0" i="0" u="none" strike="noStrike" cap="none">
         <a:solidFill>
           <a:srgbClr val="000000"/>
         </a:solidFill>
@@ -516,7 +539,7 @@
         <a:sym typeface="Arial"/>
       </a:defRPr>
     </a:lvl1pPr>
-    <a:lvl2pPr lvl="1" marR="0" rtl="0" algn="l">
+    <a:lvl2pPr marR="0" lvl="1" algn="l" rtl="0">
       <a:lnSpc>
         <a:spcPct val="100000"/>
       </a:lnSpc>
@@ -530,7 +553,7 @@
         <a:srgbClr val="000000"/>
       </a:buClr>
       <a:buFont typeface="Arial"/>
-      <a:defRPr b="0" i="0" sz="1400" u="none" cap="none" strike="noStrike">
+      <a:defRPr sz="1400" b="0" i="0" u="none" strike="noStrike" cap="none">
         <a:solidFill>
           <a:srgbClr val="000000"/>
         </a:solidFill>
@@ -540,7 +563,7 @@
         <a:sym typeface="Arial"/>
       </a:defRPr>
     </a:lvl2pPr>
-    <a:lvl3pPr lvl="2" marR="0" rtl="0" algn="l">
+    <a:lvl3pPr marR="0" lvl="2" algn="l" rtl="0">
       <a:lnSpc>
         <a:spcPct val="100000"/>
       </a:lnSpc>
@@ -554,7 +577,7 @@
         <a:srgbClr val="000000"/>
       </a:buClr>
       <a:buFont typeface="Arial"/>
-      <a:defRPr b="0" i="0" sz="1400" u="none" cap="none" strike="noStrike">
+      <a:defRPr sz="1400" b="0" i="0" u="none" strike="noStrike" cap="none">
         <a:solidFill>
           <a:srgbClr val="000000"/>
         </a:solidFill>
@@ -564,7 +587,7 @@
         <a:sym typeface="Arial"/>
       </a:defRPr>
     </a:lvl3pPr>
-    <a:lvl4pPr lvl="3" marR="0" rtl="0" algn="l">
+    <a:lvl4pPr marR="0" lvl="3" algn="l" rtl="0">
       <a:lnSpc>
         <a:spcPct val="100000"/>
       </a:lnSpc>
@@ -578,7 +601,7 @@
         <a:srgbClr val="000000"/>
       </a:buClr>
       <a:buFont typeface="Arial"/>
-      <a:defRPr b="0" i="0" sz="1400" u="none" cap="none" strike="noStrike">
+      <a:defRPr sz="1400" b="0" i="0" u="none" strike="noStrike" cap="none">
         <a:solidFill>
           <a:srgbClr val="000000"/>
         </a:solidFill>
@@ -588,7 +611,7 @@
         <a:sym typeface="Arial"/>
       </a:defRPr>
     </a:lvl4pPr>
-    <a:lvl5pPr lvl="4" marR="0" rtl="0" algn="l">
+    <a:lvl5pPr marR="0" lvl="4" algn="l" rtl="0">
       <a:lnSpc>
         <a:spcPct val="100000"/>
       </a:lnSpc>
@@ -602,7 +625,7 @@
         <a:srgbClr val="000000"/>
       </a:buClr>
       <a:buFont typeface="Arial"/>
-      <a:defRPr b="0" i="0" sz="1400" u="none" cap="none" strike="noStrike">
+      <a:defRPr sz="1400" b="0" i="0" u="none" strike="noStrike" cap="none">
         <a:solidFill>
           <a:srgbClr val="000000"/>
         </a:solidFill>
@@ -612,7 +635,7 @@
         <a:sym typeface="Arial"/>
       </a:defRPr>
     </a:lvl5pPr>
-    <a:lvl6pPr lvl="5" marR="0" rtl="0" algn="l">
+    <a:lvl6pPr marR="0" lvl="5" algn="l" rtl="0">
       <a:lnSpc>
         <a:spcPct val="100000"/>
       </a:lnSpc>
@@ -626,7 +649,7 @@
         <a:srgbClr val="000000"/>
       </a:buClr>
       <a:buFont typeface="Arial"/>
-      <a:defRPr b="0" i="0" sz="1400" u="none" cap="none" strike="noStrike">
+      <a:defRPr sz="1400" b="0" i="0" u="none" strike="noStrike" cap="none">
         <a:solidFill>
           <a:srgbClr val="000000"/>
         </a:solidFill>
@@ -636,7 +659,7 @@
         <a:sym typeface="Arial"/>
       </a:defRPr>
     </a:lvl6pPr>
-    <a:lvl7pPr lvl="6" marR="0" rtl="0" algn="l">
+    <a:lvl7pPr marR="0" lvl="6" algn="l" rtl="0">
       <a:lnSpc>
         <a:spcPct val="100000"/>
       </a:lnSpc>
@@ -650,7 +673,7 @@
         <a:srgbClr val="000000"/>
       </a:buClr>
       <a:buFont typeface="Arial"/>
-      <a:defRPr b="0" i="0" sz="1400" u="none" cap="none" strike="noStrike">
+      <a:defRPr sz="1400" b="0" i="0" u="none" strike="noStrike" cap="none">
         <a:solidFill>
           <a:srgbClr val="000000"/>
         </a:solidFill>
@@ -660,7 +683,7 @@
         <a:sym typeface="Arial"/>
       </a:defRPr>
     </a:lvl7pPr>
-    <a:lvl8pPr lvl="7" marR="0" rtl="0" algn="l">
+    <a:lvl8pPr marR="0" lvl="7" algn="l" rtl="0">
       <a:lnSpc>
         <a:spcPct val="100000"/>
       </a:lnSpc>
@@ -674,7 +697,7 @@
         <a:srgbClr val="000000"/>
       </a:buClr>
       <a:buFont typeface="Arial"/>
-      <a:defRPr b="0" i="0" sz="1400" u="none" cap="none" strike="noStrike">
+      <a:defRPr sz="1400" b="0" i="0" u="none" strike="noStrike" cap="none">
         <a:solidFill>
           <a:srgbClr val="000000"/>
         </a:solidFill>
@@ -684,7 +707,7 @@
         <a:sym typeface="Arial"/>
       </a:defRPr>
     </a:lvl8pPr>
-    <a:lvl9pPr lvl="8" marR="0" rtl="0" algn="l">
+    <a:lvl9pPr marR="0" lvl="8" algn="l" rtl="0">
       <a:lnSpc>
         <a:spcPct val="100000"/>
       </a:lnSpc>
@@ -698,7 +721,7 @@
         <a:srgbClr val="000000"/>
       </a:buClr>
       <a:buFont typeface="Arial"/>
-      <a:defRPr b="0" i="0" sz="1400" u="none" cap="none" strike="noStrike">
+      <a:defRPr sz="1400" b="0" i="0" u="none" strike="noStrike" cap="none">
         <a:solidFill>
           <a:srgbClr val="000000"/>
         </a:solidFill>
@@ -713,11 +736,11 @@
 </file>
 
 <file path=ppt/notesSlides/notesSlide1.xml><?xml version="1.0" encoding="utf-8"?>
-<p:notes xmlns:a="http://schemas.openxmlformats.org/drawingml/2006/main" xmlns:r="http://schemas.openxmlformats.org/officeDocument/2006/relationships" xmlns:mc="http://schemas.openxmlformats.org/markup-compatibility/2006" xmlns:mv="urn:schemas-microsoft-com:mac:vml" xmlns:p="http://schemas.openxmlformats.org/presentationml/2006/main" xmlns:c="http://schemas.openxmlformats.org/drawingml/2006/chart" xmlns:dgm="http://schemas.openxmlformats.org/drawingml/2006/diagram" xmlns:o="urn:schemas-microsoft-com:office:office" xmlns:v="urn:schemas-microsoft-com:vml" xmlns:pvml="urn:schemas-microsoft-com:office:powerpoint" xmlns:com="http://schemas.openxmlformats.org/drawingml/2006/compatibility" xmlns:p14="http://schemas.microsoft.com/office/powerpoint/2010/main" xmlns:p15="http://schemas.microsoft.com/office/powerpoint/2012/main" xmlns:ahyp="http://schemas.microsoft.com/office/drawing/2018/hyperlinkcolor" showMasterPhAnim="0" showMasterSp="0">
+<p:notes xmlns:a="http://schemas.openxmlformats.org/drawingml/2006/main" xmlns:r="http://schemas.openxmlformats.org/officeDocument/2006/relationships" xmlns:p="http://schemas.openxmlformats.org/presentationml/2006/main" showMasterSp="0" showMasterPhAnim="0">
   <p:cSld>
     <p:spTree>
       <p:nvGrpSpPr>
-        <p:cNvPr id="82" name="Shape 82"/>
+        <p:cNvPr id="1" name="Shape 82"/>
         <p:cNvGrpSpPr/>
         <p:nvPr/>
       </p:nvGrpSpPr>
@@ -732,9 +755,11 @@
       <p:sp>
         <p:nvSpPr>
           <p:cNvPr id="83" name="Google Shape;83;p:notes"/>
-          <p:cNvSpPr/>
+          <p:cNvSpPr>
+            <a:spLocks noGrp="1" noRot="1" noChangeAspect="1"/>
+          </p:cNvSpPr>
           <p:nvPr>
-            <p:ph idx="2" type="sldImg"/>
+            <p:ph type="sldImg" idx="2"/>
           </p:nvPr>
         </p:nvSpPr>
         <p:spPr>
@@ -743,9 +768,13 @@
             <a:ext cx="6096075" cy="3429000"/>
           </a:xfrm>
           <a:custGeom>
-            <a:rect b="b" l="l" r="r" t="t"/>
+            <a:avLst/>
+            <a:gdLst/>
+            <a:ahLst/>
+            <a:cxnLst/>
+            <a:rect l="l" t="t" r="r" b="b"/>
             <a:pathLst>
-              <a:path extrusionOk="0" h="120000" w="120000">
+              <a:path w="120000" h="120000" extrusionOk="0">
                 <a:moveTo>
                   <a:pt x="0" y="0"/>
                 </a:moveTo>
@@ -767,9 +796,11 @@
       <p:sp>
         <p:nvSpPr>
           <p:cNvPr id="84" name="Google Shape;84;p:notes"/>
-          <p:cNvSpPr txBox="1"/>
+          <p:cNvSpPr txBox="1">
+            <a:spLocks noGrp="1"/>
+          </p:cNvSpPr>
           <p:nvPr>
-            <p:ph idx="1" type="body"/>
+            <p:ph type="body" idx="1"/>
           </p:nvPr>
         </p:nvSpPr>
         <p:spPr>
@@ -782,12 +813,12 @@
           </a:prstGeom>
         </p:spPr>
         <p:txBody>
-          <a:bodyPr anchorCtr="0" anchor="t" bIns="91425" lIns="91425" spcFirstLastPara="1" rIns="91425" wrap="square" tIns="91425">
+          <a:bodyPr spcFirstLastPara="1" wrap="square" lIns="91425" tIns="91425" rIns="91425" bIns="91425" anchor="t" anchorCtr="0">
             <a:noAutofit/>
           </a:bodyPr>
           <a:lstStyle/>
           <a:p>
-            <a:pPr indent="0" lvl="0" marL="0" rtl="0" algn="l">
+            <a:pPr marL="0" lvl="0" indent="0" algn="l" rtl="0">
               <a:spcBef>
                 <a:spcPts val="0"/>
               </a:spcBef>
@@ -796,9 +827,6 @@
               </a:spcAft>
               <a:buNone/>
             </a:pPr>
-            <a:r>
-              <a:t/>
-            </a:r>
             <a:endParaRPr/>
           </a:p>
         </p:txBody>
@@ -812,11 +840,11 @@
 </file>
 
 <file path=ppt/notesSlides/notesSlide2.xml><?xml version="1.0" encoding="utf-8"?>
-<p:notes xmlns:a="http://schemas.openxmlformats.org/drawingml/2006/main" xmlns:r="http://schemas.openxmlformats.org/officeDocument/2006/relationships" xmlns:mc="http://schemas.openxmlformats.org/markup-compatibility/2006" xmlns:mv="urn:schemas-microsoft-com:mac:vml" xmlns:p="http://schemas.openxmlformats.org/presentationml/2006/main" xmlns:c="http://schemas.openxmlformats.org/drawingml/2006/chart" xmlns:dgm="http://schemas.openxmlformats.org/drawingml/2006/diagram" xmlns:o="urn:schemas-microsoft-com:office:office" xmlns:v="urn:schemas-microsoft-com:vml" xmlns:pvml="urn:schemas-microsoft-com:office:powerpoint" xmlns:com="http://schemas.openxmlformats.org/drawingml/2006/compatibility" xmlns:p14="http://schemas.microsoft.com/office/powerpoint/2010/main" xmlns:p15="http://schemas.microsoft.com/office/powerpoint/2012/main" xmlns:ahyp="http://schemas.microsoft.com/office/drawing/2018/hyperlinkcolor" showMasterPhAnim="0" showMasterSp="0">
+<p:notes xmlns:a="http://schemas.openxmlformats.org/drawingml/2006/main" xmlns:r="http://schemas.openxmlformats.org/officeDocument/2006/relationships" xmlns:p="http://schemas.openxmlformats.org/presentationml/2006/main" showMasterSp="0" showMasterPhAnim="0">
   <p:cSld>
     <p:spTree>
       <p:nvGrpSpPr>
-        <p:cNvPr id="90" name="Shape 90"/>
+        <p:cNvPr id="1" name="Shape 90"/>
         <p:cNvGrpSpPr/>
         <p:nvPr/>
       </p:nvGrpSpPr>
@@ -831,20 +859,26 @@
       <p:sp>
         <p:nvSpPr>
           <p:cNvPr id="91" name="Google Shape;91;g23776e4dc1c_0_78:notes"/>
-          <p:cNvSpPr/>
+          <p:cNvSpPr>
+            <a:spLocks noGrp="1" noRot="1" noChangeAspect="1"/>
+          </p:cNvSpPr>
           <p:nvPr>
-            <p:ph idx="2" type="sldImg"/>
+            <p:ph type="sldImg" idx="2"/>
           </p:nvPr>
         </p:nvSpPr>
         <p:spPr>
           <a:xfrm>
-            <a:off x="381300" y="685800"/>
+            <a:off x="381000" y="685800"/>
             <a:ext cx="6096000" cy="3429000"/>
           </a:xfrm>
           <a:custGeom>
-            <a:rect b="b" l="l" r="r" t="t"/>
+            <a:avLst/>
+            <a:gdLst/>
+            <a:ahLst/>
+            <a:cxnLst/>
+            <a:rect l="l" t="t" r="r" b="b"/>
             <a:pathLst>
-              <a:path extrusionOk="0" h="120000" w="120000">
+              <a:path w="120000" h="120000" extrusionOk="0">
                 <a:moveTo>
                   <a:pt x="0" y="0"/>
                 </a:moveTo>
@@ -866,9 +900,11 @@
       <p:sp>
         <p:nvSpPr>
           <p:cNvPr id="92" name="Google Shape;92;g23776e4dc1c_0_78:notes"/>
-          <p:cNvSpPr txBox="1"/>
+          <p:cNvSpPr txBox="1">
+            <a:spLocks noGrp="1"/>
+          </p:cNvSpPr>
           <p:nvPr>
-            <p:ph idx="1" type="body"/>
+            <p:ph type="body" idx="1"/>
           </p:nvPr>
         </p:nvSpPr>
         <p:spPr>
@@ -881,12 +917,12 @@
           </a:prstGeom>
         </p:spPr>
         <p:txBody>
-          <a:bodyPr anchorCtr="0" anchor="t" bIns="91425" lIns="91425" spcFirstLastPara="1" rIns="91425" wrap="square" tIns="91425">
+          <a:bodyPr spcFirstLastPara="1" wrap="square" lIns="91425" tIns="91425" rIns="91425" bIns="91425" anchor="t" anchorCtr="0">
             <a:noAutofit/>
           </a:bodyPr>
           <a:lstStyle/>
           <a:p>
-            <a:pPr indent="0" lvl="0" marL="0" rtl="0" algn="l">
+            <a:pPr marL="0" lvl="0" indent="0" algn="l" rtl="0">
               <a:spcBef>
                 <a:spcPts val="0"/>
               </a:spcBef>
@@ -895,9 +931,6 @@
               </a:spcAft>
               <a:buNone/>
             </a:pPr>
-            <a:r>
-              <a:t/>
-            </a:r>
             <a:endParaRPr/>
           </a:p>
         </p:txBody>
@@ -911,11 +944,11 @@
 </file>
 
 <file path=ppt/notesSlides/notesSlide3.xml><?xml version="1.0" encoding="utf-8"?>
-<p:notes xmlns:a="http://schemas.openxmlformats.org/drawingml/2006/main" xmlns:r="http://schemas.openxmlformats.org/officeDocument/2006/relationships" xmlns:mc="http://schemas.openxmlformats.org/markup-compatibility/2006" xmlns:mv="urn:schemas-microsoft-com:mac:vml" xmlns:p="http://schemas.openxmlformats.org/presentationml/2006/main" xmlns:c="http://schemas.openxmlformats.org/drawingml/2006/chart" xmlns:dgm="http://schemas.openxmlformats.org/drawingml/2006/diagram" xmlns:o="urn:schemas-microsoft-com:office:office" xmlns:v="urn:schemas-microsoft-com:vml" xmlns:pvml="urn:schemas-microsoft-com:office:powerpoint" xmlns:com="http://schemas.openxmlformats.org/drawingml/2006/compatibility" xmlns:p14="http://schemas.microsoft.com/office/powerpoint/2010/main" xmlns:p15="http://schemas.microsoft.com/office/powerpoint/2012/main" xmlns:ahyp="http://schemas.microsoft.com/office/drawing/2018/hyperlinkcolor" showMasterPhAnim="0" showMasterSp="0">
+<p:notes xmlns:a="http://schemas.openxmlformats.org/drawingml/2006/main" xmlns:r="http://schemas.openxmlformats.org/officeDocument/2006/relationships" xmlns:p="http://schemas.openxmlformats.org/presentationml/2006/main" showMasterSp="0" showMasterPhAnim="0">
   <p:cSld>
     <p:spTree>
       <p:nvGrpSpPr>
-        <p:cNvPr id="96" name="Shape 96"/>
+        <p:cNvPr id="1" name="Shape 96"/>
         <p:cNvGrpSpPr/>
         <p:nvPr/>
       </p:nvGrpSpPr>
@@ -930,9 +963,11 @@
       <p:sp>
         <p:nvSpPr>
           <p:cNvPr id="97" name="Google Shape;97;g23776e4dc1c_0_83:notes"/>
-          <p:cNvSpPr/>
+          <p:cNvSpPr>
+            <a:spLocks noGrp="1" noRot="1" noChangeAspect="1"/>
+          </p:cNvSpPr>
           <p:nvPr>
-            <p:ph idx="2" type="sldImg"/>
+            <p:ph type="sldImg" idx="2"/>
           </p:nvPr>
         </p:nvSpPr>
         <p:spPr>
@@ -941,9 +976,13 @@
             <a:ext cx="6096000" cy="3429000"/>
           </a:xfrm>
           <a:custGeom>
-            <a:rect b="b" l="l" r="r" t="t"/>
+            <a:avLst/>
+            <a:gdLst/>
+            <a:ahLst/>
+            <a:cxnLst/>
+            <a:rect l="l" t="t" r="r" b="b"/>
             <a:pathLst>
-              <a:path extrusionOk="0" h="120000" w="120000">
+              <a:path w="120000" h="120000" extrusionOk="0">
                 <a:moveTo>
                   <a:pt x="0" y="0"/>
                 </a:moveTo>
@@ -965,9 +1004,11 @@
       <p:sp>
         <p:nvSpPr>
           <p:cNvPr id="98" name="Google Shape;98;g23776e4dc1c_0_83:notes"/>
-          <p:cNvSpPr txBox="1"/>
+          <p:cNvSpPr txBox="1">
+            <a:spLocks noGrp="1"/>
+          </p:cNvSpPr>
           <p:nvPr>
-            <p:ph idx="1" type="body"/>
+            <p:ph type="body" idx="1"/>
           </p:nvPr>
         </p:nvSpPr>
         <p:spPr>
@@ -980,12 +1021,12 @@
           </a:prstGeom>
         </p:spPr>
         <p:txBody>
-          <a:bodyPr anchorCtr="0" anchor="t" bIns="91425" lIns="91425" spcFirstLastPara="1" rIns="91425" wrap="square" tIns="91425">
+          <a:bodyPr spcFirstLastPara="1" wrap="square" lIns="91425" tIns="91425" rIns="91425" bIns="91425" anchor="t" anchorCtr="0">
             <a:noAutofit/>
           </a:bodyPr>
           <a:lstStyle/>
           <a:p>
-            <a:pPr indent="0" lvl="0" marL="0" rtl="0" algn="l">
+            <a:pPr marL="0" lvl="0" indent="0" algn="l" rtl="0">
               <a:spcBef>
                 <a:spcPts val="0"/>
               </a:spcBef>
@@ -1011,11 +1052,11 @@
 </file>
 
 <file path=ppt/notesSlides/notesSlide4.xml><?xml version="1.0" encoding="utf-8"?>
-<p:notes xmlns:a="http://schemas.openxmlformats.org/drawingml/2006/main" xmlns:r="http://schemas.openxmlformats.org/officeDocument/2006/relationships" xmlns:mc="http://schemas.openxmlformats.org/markup-compatibility/2006" xmlns:mv="urn:schemas-microsoft-com:mac:vml" xmlns:p="http://schemas.openxmlformats.org/presentationml/2006/main" xmlns:c="http://schemas.openxmlformats.org/drawingml/2006/chart" xmlns:dgm="http://schemas.openxmlformats.org/drawingml/2006/diagram" xmlns:o="urn:schemas-microsoft-com:office:office" xmlns:v="urn:schemas-microsoft-com:vml" xmlns:pvml="urn:schemas-microsoft-com:office:powerpoint" xmlns:com="http://schemas.openxmlformats.org/drawingml/2006/compatibility" xmlns:p14="http://schemas.microsoft.com/office/powerpoint/2010/main" xmlns:p15="http://schemas.microsoft.com/office/powerpoint/2012/main" xmlns:ahyp="http://schemas.microsoft.com/office/drawing/2018/hyperlinkcolor" showMasterPhAnim="0" showMasterSp="0">
+<p:notes xmlns:a="http://schemas.openxmlformats.org/drawingml/2006/main" xmlns:r="http://schemas.openxmlformats.org/officeDocument/2006/relationships" xmlns:p="http://schemas.openxmlformats.org/presentationml/2006/main" showMasterSp="0" showMasterPhAnim="0">
   <p:cSld>
     <p:spTree>
       <p:nvGrpSpPr>
-        <p:cNvPr id="104" name="Shape 104"/>
+        <p:cNvPr id="1" name="Shape 104"/>
         <p:cNvGrpSpPr/>
         <p:nvPr/>
       </p:nvGrpSpPr>
@@ -1030,9 +1071,11 @@
       <p:sp>
         <p:nvSpPr>
           <p:cNvPr id="105" name="Google Shape;105;g23776e4dc1c_0_88:notes"/>
-          <p:cNvSpPr/>
+          <p:cNvSpPr>
+            <a:spLocks noGrp="1" noRot="1" noChangeAspect="1"/>
+          </p:cNvSpPr>
           <p:nvPr>
-            <p:ph idx="2" type="sldImg"/>
+            <p:ph type="sldImg" idx="2"/>
           </p:nvPr>
         </p:nvSpPr>
         <p:spPr>
@@ -1041,9 +1084,13 @@
             <a:ext cx="6096000" cy="3429000"/>
           </a:xfrm>
           <a:custGeom>
-            <a:rect b="b" l="l" r="r" t="t"/>
+            <a:avLst/>
+            <a:gdLst/>
+            <a:ahLst/>
+            <a:cxnLst/>
+            <a:rect l="l" t="t" r="r" b="b"/>
             <a:pathLst>
-              <a:path extrusionOk="0" h="120000" w="120000">
+              <a:path w="120000" h="120000" extrusionOk="0">
                 <a:moveTo>
                   <a:pt x="0" y="0"/>
                 </a:moveTo>
@@ -1065,9 +1112,11 @@
       <p:sp>
         <p:nvSpPr>
           <p:cNvPr id="106" name="Google Shape;106;g23776e4dc1c_0_88:notes"/>
-          <p:cNvSpPr txBox="1"/>
+          <p:cNvSpPr txBox="1">
+            <a:spLocks noGrp="1"/>
+          </p:cNvSpPr>
           <p:nvPr>
-            <p:ph idx="1" type="body"/>
+            <p:ph type="body" idx="1"/>
           </p:nvPr>
         </p:nvSpPr>
         <p:spPr>
@@ -1080,12 +1129,12 @@
           </a:prstGeom>
         </p:spPr>
         <p:txBody>
-          <a:bodyPr anchorCtr="0" anchor="t" bIns="91425" lIns="91425" spcFirstLastPara="1" rIns="91425" wrap="square" tIns="91425">
+          <a:bodyPr spcFirstLastPara="1" wrap="square" lIns="91425" tIns="91425" rIns="91425" bIns="91425" anchor="t" anchorCtr="0">
             <a:noAutofit/>
           </a:bodyPr>
           <a:lstStyle/>
           <a:p>
-            <a:pPr indent="0" lvl="0" marL="0" rtl="0" algn="l">
+            <a:pPr marL="0" lvl="0" indent="0" algn="l" rtl="0">
               <a:lnSpc>
                 <a:spcPct val="115000"/>
               </a:lnSpc>
@@ -1120,7 +1169,7 @@
             </a:endParaRPr>
           </a:p>
           <a:p>
-            <a:pPr indent="0" lvl="0" marL="0" rtl="0" algn="l">
+            <a:pPr marL="0" lvl="0" indent="0" algn="l" rtl="0">
               <a:lnSpc>
                 <a:spcPct val="115000"/>
               </a:lnSpc>
@@ -1160,7 +1209,7 @@
             </a:endParaRPr>
           </a:p>
           <a:p>
-            <a:pPr indent="0" lvl="0" marL="0" rtl="0" algn="l">
+            <a:pPr marL="0" lvl="0" indent="0" algn="l" rtl="0">
               <a:spcBef>
                 <a:spcPts val="1200"/>
               </a:spcBef>
@@ -1169,9 +1218,6 @@
               </a:spcAft>
               <a:buNone/>
             </a:pPr>
-            <a:r>
-              <a:t/>
-            </a:r>
             <a:endParaRPr/>
           </a:p>
         </p:txBody>
@@ -1185,11 +1231,11 @@
 </file>
 
 <file path=ppt/notesSlides/notesSlide5.xml><?xml version="1.0" encoding="utf-8"?>
-<p:notes xmlns:a="http://schemas.openxmlformats.org/drawingml/2006/main" xmlns:r="http://schemas.openxmlformats.org/officeDocument/2006/relationships" xmlns:mc="http://schemas.openxmlformats.org/markup-compatibility/2006" xmlns:mv="urn:schemas-microsoft-com:mac:vml" xmlns:p="http://schemas.openxmlformats.org/presentationml/2006/main" xmlns:c="http://schemas.openxmlformats.org/drawingml/2006/chart" xmlns:dgm="http://schemas.openxmlformats.org/drawingml/2006/diagram" xmlns:o="urn:schemas-microsoft-com:office:office" xmlns:v="urn:schemas-microsoft-com:vml" xmlns:pvml="urn:schemas-microsoft-com:office:powerpoint" xmlns:com="http://schemas.openxmlformats.org/drawingml/2006/compatibility" xmlns:p14="http://schemas.microsoft.com/office/powerpoint/2010/main" xmlns:p15="http://schemas.microsoft.com/office/powerpoint/2012/main" xmlns:ahyp="http://schemas.microsoft.com/office/drawing/2018/hyperlinkcolor" showMasterPhAnim="0" showMasterSp="0">
+<p:notes xmlns:a="http://schemas.openxmlformats.org/drawingml/2006/main" xmlns:r="http://schemas.openxmlformats.org/officeDocument/2006/relationships" xmlns:p="http://schemas.openxmlformats.org/presentationml/2006/main" showMasterSp="0" showMasterPhAnim="0">
   <p:cSld>
     <p:spTree>
       <p:nvGrpSpPr>
-        <p:cNvPr id="110" name="Shape 110"/>
+        <p:cNvPr id="1" name="Shape 110"/>
         <p:cNvGrpSpPr/>
         <p:nvPr/>
       </p:nvGrpSpPr>
@@ -1204,20 +1250,26 @@
       <p:sp>
         <p:nvSpPr>
           <p:cNvPr id="111" name="Google Shape;111;g23776e4dc1c_0_114:notes"/>
-          <p:cNvSpPr/>
+          <p:cNvSpPr>
+            <a:spLocks noGrp="1" noRot="1" noChangeAspect="1"/>
+          </p:cNvSpPr>
           <p:nvPr>
-            <p:ph idx="2" type="sldImg"/>
+            <p:ph type="sldImg" idx="2"/>
           </p:nvPr>
         </p:nvSpPr>
         <p:spPr>
           <a:xfrm>
-            <a:off x="381300" y="685800"/>
+            <a:off x="381000" y="685800"/>
             <a:ext cx="6096000" cy="3429000"/>
           </a:xfrm>
           <a:custGeom>
-            <a:rect b="b" l="l" r="r" t="t"/>
+            <a:avLst/>
+            <a:gdLst/>
+            <a:ahLst/>
+            <a:cxnLst/>
+            <a:rect l="l" t="t" r="r" b="b"/>
             <a:pathLst>
-              <a:path extrusionOk="0" h="120000" w="120000">
+              <a:path w="120000" h="120000" extrusionOk="0">
                 <a:moveTo>
                   <a:pt x="0" y="0"/>
                 </a:moveTo>
@@ -1239,9 +1291,11 @@
       <p:sp>
         <p:nvSpPr>
           <p:cNvPr id="112" name="Google Shape;112;g23776e4dc1c_0_114:notes"/>
-          <p:cNvSpPr txBox="1"/>
+          <p:cNvSpPr txBox="1">
+            <a:spLocks noGrp="1"/>
+          </p:cNvSpPr>
           <p:nvPr>
-            <p:ph idx="1" type="body"/>
+            <p:ph type="body" idx="1"/>
           </p:nvPr>
         </p:nvSpPr>
         <p:spPr>
@@ -1254,12 +1308,12 @@
           </a:prstGeom>
         </p:spPr>
         <p:txBody>
-          <a:bodyPr anchorCtr="0" anchor="t" bIns="91425" lIns="91425" spcFirstLastPara="1" rIns="91425" wrap="square" tIns="91425">
+          <a:bodyPr spcFirstLastPara="1" wrap="square" lIns="91425" tIns="91425" rIns="91425" bIns="91425" anchor="t" anchorCtr="0">
             <a:noAutofit/>
           </a:bodyPr>
           <a:lstStyle/>
           <a:p>
-            <a:pPr indent="0" lvl="0" marL="0" rtl="0" algn="l">
+            <a:pPr marL="0" lvl="0" indent="0" algn="l" rtl="0">
               <a:spcBef>
                 <a:spcPts val="0"/>
               </a:spcBef>
@@ -1268,9 +1322,6 @@
               </a:spcAft>
               <a:buNone/>
             </a:pPr>
-            <a:r>
-              <a:t/>
-            </a:r>
             <a:endParaRPr/>
           </a:p>
         </p:txBody>
@@ -1284,11 +1335,11 @@
 </file>
 
 <file path=ppt/notesSlides/notesSlide6.xml><?xml version="1.0" encoding="utf-8"?>
-<p:notes xmlns:a="http://schemas.openxmlformats.org/drawingml/2006/main" xmlns:r="http://schemas.openxmlformats.org/officeDocument/2006/relationships" xmlns:mc="http://schemas.openxmlformats.org/markup-compatibility/2006" xmlns:mv="urn:schemas-microsoft-com:mac:vml" xmlns:p="http://schemas.openxmlformats.org/presentationml/2006/main" xmlns:c="http://schemas.openxmlformats.org/drawingml/2006/chart" xmlns:dgm="http://schemas.openxmlformats.org/drawingml/2006/diagram" xmlns:o="urn:schemas-microsoft-com:office:office" xmlns:v="urn:schemas-microsoft-com:vml" xmlns:pvml="urn:schemas-microsoft-com:office:powerpoint" xmlns:com="http://schemas.openxmlformats.org/drawingml/2006/compatibility" xmlns:p14="http://schemas.microsoft.com/office/powerpoint/2010/main" xmlns:p15="http://schemas.microsoft.com/office/powerpoint/2012/main" xmlns:ahyp="http://schemas.microsoft.com/office/drawing/2018/hyperlinkcolor" showMasterPhAnim="0" showMasterSp="0">
+<p:notes xmlns:a="http://schemas.openxmlformats.org/drawingml/2006/main" xmlns:r="http://schemas.openxmlformats.org/officeDocument/2006/relationships" xmlns:p="http://schemas.openxmlformats.org/presentationml/2006/main" showMasterSp="0" showMasterPhAnim="0">
   <p:cSld>
     <p:spTree>
       <p:nvGrpSpPr>
-        <p:cNvPr id="116" name="Shape 116"/>
+        <p:cNvPr id="1" name="Shape 116"/>
         <p:cNvGrpSpPr/>
         <p:nvPr/>
       </p:nvGrpSpPr>
@@ -1303,9 +1354,11 @@
       <p:sp>
         <p:nvSpPr>
           <p:cNvPr id="117" name="Google Shape;117;g23776e4dc1c_0_126:notes"/>
-          <p:cNvSpPr/>
+          <p:cNvSpPr>
+            <a:spLocks noGrp="1" noRot="1" noChangeAspect="1"/>
+          </p:cNvSpPr>
           <p:nvPr>
-            <p:ph idx="2" type="sldImg"/>
+            <p:ph type="sldImg" idx="2"/>
           </p:nvPr>
         </p:nvSpPr>
         <p:spPr>
@@ -1314,9 +1367,13 @@
             <a:ext cx="6096000" cy="3429000"/>
           </a:xfrm>
           <a:custGeom>
-            <a:rect b="b" l="l" r="r" t="t"/>
+            <a:avLst/>
+            <a:gdLst/>
+            <a:ahLst/>
+            <a:cxnLst/>
+            <a:rect l="l" t="t" r="r" b="b"/>
             <a:pathLst>
-              <a:path extrusionOk="0" h="120000" w="120000">
+              <a:path w="120000" h="120000" extrusionOk="0">
                 <a:moveTo>
                   <a:pt x="0" y="0"/>
                 </a:moveTo>
@@ -1338,9 +1395,11 @@
       <p:sp>
         <p:nvSpPr>
           <p:cNvPr id="118" name="Google Shape;118;g23776e4dc1c_0_126:notes"/>
-          <p:cNvSpPr txBox="1"/>
+          <p:cNvSpPr txBox="1">
+            <a:spLocks noGrp="1"/>
+          </p:cNvSpPr>
           <p:nvPr>
-            <p:ph idx="1" type="body"/>
+            <p:ph type="body" idx="1"/>
           </p:nvPr>
         </p:nvSpPr>
         <p:spPr>
@@ -1353,12 +1412,12 @@
           </a:prstGeom>
         </p:spPr>
         <p:txBody>
-          <a:bodyPr anchorCtr="0" anchor="t" bIns="91425" lIns="91425" spcFirstLastPara="1" rIns="91425" wrap="square" tIns="91425">
+          <a:bodyPr spcFirstLastPara="1" wrap="square" lIns="91425" tIns="91425" rIns="91425" bIns="91425" anchor="t" anchorCtr="0">
             <a:noAutofit/>
           </a:bodyPr>
           <a:lstStyle/>
           <a:p>
-            <a:pPr indent="0" lvl="0" marL="0" rtl="0" algn="l">
+            <a:pPr marL="0" lvl="0" indent="0" algn="l" rtl="0">
               <a:spcBef>
                 <a:spcPts val="0"/>
               </a:spcBef>
@@ -1367,9 +1426,6 @@
               </a:spcAft>
               <a:buNone/>
             </a:pPr>
-            <a:r>
-              <a:t/>
-            </a:r>
             <a:endParaRPr/>
           </a:p>
         </p:txBody>
@@ -1383,18 +1439,19 @@
 </file>
 
 <file path=ppt/slideLayouts/slideLayout1.xml><?xml version="1.0" encoding="utf-8"?>
-<p:sldLayout xmlns:a="http://schemas.openxmlformats.org/drawingml/2006/main" xmlns:r="http://schemas.openxmlformats.org/officeDocument/2006/relationships" xmlns:mc="http://schemas.openxmlformats.org/markup-compatibility/2006" xmlns:mv="urn:schemas-microsoft-com:mac:vml" xmlns:p="http://schemas.openxmlformats.org/presentationml/2006/main" xmlns:c="http://schemas.openxmlformats.org/drawingml/2006/chart" xmlns:dgm="http://schemas.openxmlformats.org/drawingml/2006/diagram" xmlns:o="urn:schemas-microsoft-com:office:office" xmlns:v="urn:schemas-microsoft-com:vml" xmlns:pvml="urn:schemas-microsoft-com:office:powerpoint" xmlns:com="http://schemas.openxmlformats.org/drawingml/2006/compatibility" xmlns:p14="http://schemas.microsoft.com/office/powerpoint/2010/main" xmlns:p15="http://schemas.microsoft.com/office/powerpoint/2012/main" xmlns:ahyp="http://schemas.microsoft.com/office/drawing/2018/hyperlinkcolor" matchingName="Title slide" type="title">
+<p:sldLayout xmlns:a="http://schemas.openxmlformats.org/drawingml/2006/main" xmlns:r="http://schemas.openxmlformats.org/officeDocument/2006/relationships" xmlns:p="http://schemas.openxmlformats.org/presentationml/2006/main" matchingName="Title slide" type="title">
   <p:cSld name="TITLE">
     <p:bg>
       <p:bgPr>
         <a:solidFill>
           <a:schemeClr val="lt2"/>
         </a:solidFill>
+        <a:effectLst/>
       </p:bgPr>
     </p:bg>
     <p:spTree>
       <p:nvGrpSpPr>
-        <p:cNvPr id="9" name="Shape 9"/>
+        <p:cNvPr id="1" name="Shape 9"/>
         <p:cNvGrpSpPr/>
         <p:nvPr/>
       </p:nvGrpSpPr>
@@ -1428,12 +1485,12 @@
           </a:ln>
         </p:spPr>
         <p:txBody>
-          <a:bodyPr anchorCtr="0" anchor="ctr" bIns="91425" lIns="91425" spcFirstLastPara="1" rIns="91425" wrap="square" tIns="91425">
+          <a:bodyPr spcFirstLastPara="1" wrap="square" lIns="91425" tIns="91425" rIns="91425" bIns="91425" anchor="ctr" anchorCtr="0">
             <a:noAutofit/>
           </a:bodyPr>
           <a:lstStyle/>
           <a:p>
-            <a:pPr indent="0" lvl="0" marL="0" rtl="0" algn="l">
+            <a:pPr marL="0" lvl="0" indent="0" algn="l" rtl="0">
               <a:spcBef>
                 <a:spcPts val="0"/>
               </a:spcBef>
@@ -1442,9 +1499,6 @@
               </a:spcAft>
               <a:buNone/>
             </a:pPr>
-            <a:r>
-              <a:t/>
-            </a:r>
             <a:endParaRPr/>
           </a:p>
         </p:txBody>
@@ -1485,12 +1539,12 @@
             </a:ln>
           </p:spPr>
           <p:txBody>
-            <a:bodyPr anchorCtr="0" anchor="ctr" bIns="91425" lIns="91425" spcFirstLastPara="1" rIns="91425" wrap="square" tIns="91425">
+            <a:bodyPr spcFirstLastPara="1" wrap="square" lIns="91425" tIns="91425" rIns="91425" bIns="91425" anchor="ctr" anchorCtr="0">
               <a:noAutofit/>
             </a:bodyPr>
             <a:lstStyle/>
             <a:p>
-              <a:pPr indent="0" lvl="0" marL="0" rtl="0" algn="l">
+              <a:pPr marL="0" lvl="0" indent="0" algn="l" rtl="0">
                 <a:spcBef>
                   <a:spcPts val="0"/>
                 </a:spcBef>
@@ -1499,9 +1553,6 @@
                 </a:spcAft>
                 <a:buNone/>
               </a:pPr>
-              <a:r>
-                <a:t/>
-              </a:r>
               <a:endParaRPr/>
             </a:p>
           </p:txBody>
@@ -1528,12 +1579,12 @@
             </a:ln>
           </p:spPr>
           <p:txBody>
-            <a:bodyPr anchorCtr="0" anchor="ctr" bIns="91425" lIns="91425" spcFirstLastPara="1" rIns="91425" wrap="square" tIns="91425">
+            <a:bodyPr spcFirstLastPara="1" wrap="square" lIns="91425" tIns="91425" rIns="91425" bIns="91425" anchor="ctr" anchorCtr="0">
               <a:noAutofit/>
             </a:bodyPr>
             <a:lstStyle/>
             <a:p>
-              <a:pPr indent="0" lvl="0" marL="0" rtl="0" algn="l">
+              <a:pPr marL="0" lvl="0" indent="0" algn="l" rtl="0">
                 <a:spcBef>
                   <a:spcPts val="0"/>
                 </a:spcBef>
@@ -1542,9 +1593,6 @@
                 </a:spcAft>
                 <a:buNone/>
               </a:pPr>
-              <a:r>
-                <a:t/>
-              </a:r>
               <a:endParaRPr/>
             </a:p>
           </p:txBody>
@@ -1553,7 +1601,9 @@
       <p:sp>
         <p:nvSpPr>
           <p:cNvPr id="14" name="Google Shape;14;p2"/>
-          <p:cNvSpPr txBox="1"/>
+          <p:cNvSpPr txBox="1">
+            <a:spLocks noGrp="1"/>
+          </p:cNvSpPr>
           <p:nvPr>
             <p:ph type="ctrTitle"/>
           </p:nvPr>
@@ -1568,7 +1618,7 @@
           </a:prstGeom>
         </p:spPr>
         <p:txBody>
-          <a:bodyPr anchorCtr="0" anchor="t" bIns="91425" lIns="91425" spcFirstLastPara="1" rIns="91425" wrap="square" tIns="91425">
+          <a:bodyPr spcFirstLastPara="1" wrap="square" lIns="91425" tIns="91425" rIns="91425" bIns="91425" anchor="t" anchorCtr="0">
             <a:normAutofit/>
           </a:bodyPr>
           <a:lstStyle>
@@ -1672,15 +1722,19 @@
               <a:defRPr sz="4200"/>
             </a:lvl9pPr>
           </a:lstStyle>
-          <a:p/>
+          <a:p>
+            <a:endParaRPr/>
+          </a:p>
         </p:txBody>
       </p:sp>
       <p:sp>
         <p:nvSpPr>
           <p:cNvPr id="15" name="Google Shape;15;p2"/>
-          <p:cNvSpPr txBox="1"/>
+          <p:cNvSpPr txBox="1">
+            <a:spLocks noGrp="1"/>
+          </p:cNvSpPr>
           <p:nvPr>
-            <p:ph idx="1" type="subTitle"/>
+            <p:ph type="subTitle" idx="1"/>
           </p:nvPr>
         </p:nvSpPr>
         <p:spPr>
@@ -1693,7 +1747,7 @@
           </a:prstGeom>
         </p:spPr>
         <p:txBody>
-          <a:bodyPr anchorCtr="0" anchor="t" bIns="91425" lIns="91425" spcFirstLastPara="1" rIns="91425" wrap="square" tIns="91425">
+          <a:bodyPr spcFirstLastPara="1" wrap="square" lIns="91425" tIns="91425" rIns="91425" bIns="91425" anchor="t" anchorCtr="0">
             <a:normAutofit/>
           </a:bodyPr>
           <a:lstStyle>
@@ -1824,15 +1878,19 @@
               <a:defRPr sz="1600"/>
             </a:lvl9pPr>
           </a:lstStyle>
-          <a:p/>
+          <a:p>
+            <a:endParaRPr/>
+          </a:p>
         </p:txBody>
       </p:sp>
       <p:sp>
         <p:nvSpPr>
           <p:cNvPr id="16" name="Google Shape;16;p2"/>
-          <p:cNvSpPr txBox="1"/>
+          <p:cNvSpPr txBox="1">
+            <a:spLocks noGrp="1"/>
+          </p:cNvSpPr>
           <p:nvPr>
-            <p:ph idx="12" type="sldNum"/>
+            <p:ph type="sldNum" idx="12"/>
           </p:nvPr>
         </p:nvSpPr>
         <p:spPr>
@@ -1845,7 +1903,7 @@
           </a:prstGeom>
         </p:spPr>
         <p:txBody>
-          <a:bodyPr anchorCtr="0" anchor="ctr" bIns="91425" lIns="91425" spcFirstLastPara="1" rIns="91425" wrap="square" tIns="91425">
+          <a:bodyPr spcFirstLastPara="1" wrap="square" lIns="91425" tIns="91425" rIns="91425" bIns="91425" anchor="ctr" anchorCtr="0">
             <a:normAutofit/>
           </a:bodyPr>
           <a:lstStyle>
@@ -1887,7 +1945,7 @@
             </a:lvl9pPr>
           </a:lstStyle>
           <a:p>
-            <a:pPr indent="0" lvl="0" marL="0" rtl="0" algn="r">
+            <a:pPr marL="0" lvl="0" indent="0" algn="r" rtl="0">
               <a:spcBef>
                 <a:spcPts val="0"/>
               </a:spcBef>
@@ -1913,18 +1971,19 @@
 </file>
 
 <file path=ppt/slideLayouts/slideLayout10.xml><?xml version="1.0" encoding="utf-8"?>
-<p:sldLayout xmlns:a="http://schemas.openxmlformats.org/drawingml/2006/main" xmlns:r="http://schemas.openxmlformats.org/officeDocument/2006/relationships" xmlns:mc="http://schemas.openxmlformats.org/markup-compatibility/2006" xmlns:mv="urn:schemas-microsoft-com:mac:vml" xmlns:p="http://schemas.openxmlformats.org/presentationml/2006/main" xmlns:c="http://schemas.openxmlformats.org/drawingml/2006/chart" xmlns:dgm="http://schemas.openxmlformats.org/drawingml/2006/diagram" xmlns:o="urn:schemas-microsoft-com:office:office" xmlns:v="urn:schemas-microsoft-com:vml" xmlns:pvml="urn:schemas-microsoft-com:office:powerpoint" xmlns:com="http://schemas.openxmlformats.org/drawingml/2006/compatibility" xmlns:p14="http://schemas.microsoft.com/office/powerpoint/2010/main" xmlns:p15="http://schemas.microsoft.com/office/powerpoint/2012/main" xmlns:ahyp="http://schemas.microsoft.com/office/drawing/2018/hyperlinkcolor" matchingName="Big number">
+<p:sldLayout xmlns:a="http://schemas.openxmlformats.org/drawingml/2006/main" xmlns:r="http://schemas.openxmlformats.org/officeDocument/2006/relationships" xmlns:p="http://schemas.openxmlformats.org/presentationml/2006/main" matchingName="Big number">
   <p:cSld name="BIG_NUMBER">
     <p:bg>
       <p:bgPr>
         <a:solidFill>
           <a:schemeClr val="dk1"/>
         </a:solidFill>
+        <a:effectLst/>
       </p:bgPr>
     </p:bg>
     <p:spTree>
       <p:nvGrpSpPr>
-        <p:cNvPr id="73" name="Shape 73"/>
+        <p:cNvPr id="1" name="Shape 73"/>
         <p:cNvGrpSpPr/>
         <p:nvPr/>
       </p:nvGrpSpPr>
@@ -1972,12 +2031,12 @@
             </a:ln>
           </p:spPr>
           <p:txBody>
-            <a:bodyPr anchorCtr="0" anchor="ctr" bIns="91425" lIns="91425" spcFirstLastPara="1" rIns="91425" wrap="square" tIns="91425">
+            <a:bodyPr spcFirstLastPara="1" wrap="square" lIns="91425" tIns="91425" rIns="91425" bIns="91425" anchor="ctr" anchorCtr="0">
               <a:noAutofit/>
             </a:bodyPr>
             <a:lstStyle/>
             <a:p>
-              <a:pPr indent="0" lvl="0" marL="0" rtl="0" algn="l">
+              <a:pPr marL="0" lvl="0" indent="0" algn="l" rtl="0">
                 <a:spcBef>
                   <a:spcPts val="0"/>
                 </a:spcBef>
@@ -1986,9 +2045,6 @@
                 </a:spcAft>
                 <a:buNone/>
               </a:pPr>
-              <a:r>
-                <a:t/>
-              </a:r>
               <a:endParaRPr/>
             </a:p>
           </p:txBody>
@@ -2015,12 +2071,12 @@
             </a:ln>
           </p:spPr>
           <p:txBody>
-            <a:bodyPr anchorCtr="0" anchor="ctr" bIns="91425" lIns="91425" spcFirstLastPara="1" rIns="91425" wrap="square" tIns="91425">
+            <a:bodyPr spcFirstLastPara="1" wrap="square" lIns="91425" tIns="91425" rIns="91425" bIns="91425" anchor="ctr" anchorCtr="0">
               <a:noAutofit/>
             </a:bodyPr>
             <a:lstStyle/>
             <a:p>
-              <a:pPr indent="0" lvl="0" marL="0" rtl="0" algn="l">
+              <a:pPr marL="0" lvl="0" indent="0" algn="l" rtl="0">
                 <a:spcBef>
                   <a:spcPts val="0"/>
                 </a:spcBef>
@@ -2029,9 +2085,6 @@
                 </a:spcAft>
                 <a:buNone/>
               </a:pPr>
-              <a:r>
-                <a:t/>
-              </a:r>
               <a:endParaRPr/>
             </a:p>
           </p:txBody>
@@ -2040,9 +2093,11 @@
       <p:sp>
         <p:nvSpPr>
           <p:cNvPr id="77" name="Google Shape;77;p11"/>
-          <p:cNvSpPr txBox="1"/>
+          <p:cNvSpPr txBox="1">
+            <a:spLocks noGrp="1"/>
+          </p:cNvSpPr>
           <p:nvPr>
-            <p:ph hasCustomPrompt="1" type="title"/>
+            <p:ph type="title" hasCustomPrompt="1"/>
           </p:nvPr>
         </p:nvSpPr>
         <p:spPr>
@@ -2055,7 +2110,7 @@
           </a:prstGeom>
         </p:spPr>
         <p:txBody>
-          <a:bodyPr anchorCtr="0" anchor="t" bIns="91425" lIns="91425" spcFirstLastPara="1" rIns="91425" wrap="square" tIns="91425">
+          <a:bodyPr spcFirstLastPara="1" wrap="square" lIns="91425" tIns="91425" rIns="91425" bIns="91425" anchor="t" anchorCtr="0">
             <a:normAutofit/>
           </a:bodyPr>
           <a:lstStyle>
@@ -2232,9 +2287,11 @@
       <p:sp>
         <p:nvSpPr>
           <p:cNvPr id="78" name="Google Shape;78;p11"/>
-          <p:cNvSpPr txBox="1"/>
+          <p:cNvSpPr txBox="1">
+            <a:spLocks noGrp="1"/>
+          </p:cNvSpPr>
           <p:nvPr>
-            <p:ph idx="1" type="body"/>
+            <p:ph type="body" idx="1"/>
           </p:nvPr>
         </p:nvSpPr>
         <p:spPr>
@@ -2247,11 +2304,11 @@
           </a:prstGeom>
         </p:spPr>
         <p:txBody>
-          <a:bodyPr anchorCtr="0" anchor="t" bIns="91425" lIns="91425" spcFirstLastPara="1" rIns="91425" wrap="square" tIns="91425">
+          <a:bodyPr spcFirstLastPara="1" wrap="square" lIns="91425" tIns="91425" rIns="91425" bIns="91425" anchor="t" anchorCtr="0">
             <a:normAutofit/>
           </a:bodyPr>
           <a:lstStyle>
-            <a:lvl1pPr indent="-311150" lvl="0" marL="457200">
+            <a:lvl1pPr marL="457200" lvl="0" indent="-311150">
               <a:spcBef>
                 <a:spcPts val="0"/>
               </a:spcBef>
@@ -2269,7 +2326,7 @@
                 </a:solidFill>
               </a:defRPr>
             </a:lvl1pPr>
-            <a:lvl2pPr indent="-298450" lvl="1" marL="914400">
+            <a:lvl2pPr marL="914400" lvl="1" indent="-298450">
               <a:spcBef>
                 <a:spcPts val="0"/>
               </a:spcBef>
@@ -2287,7 +2344,7 @@
                 </a:solidFill>
               </a:defRPr>
             </a:lvl2pPr>
-            <a:lvl3pPr indent="-298450" lvl="2" marL="1371600">
+            <a:lvl3pPr marL="1371600" lvl="2" indent="-298450">
               <a:spcBef>
                 <a:spcPts val="0"/>
               </a:spcBef>
@@ -2305,7 +2362,7 @@
                 </a:solidFill>
               </a:defRPr>
             </a:lvl3pPr>
-            <a:lvl4pPr indent="-298450" lvl="3" marL="1828800">
+            <a:lvl4pPr marL="1828800" lvl="3" indent="-298450">
               <a:spcBef>
                 <a:spcPts val="0"/>
               </a:spcBef>
@@ -2323,7 +2380,7 @@
                 </a:solidFill>
               </a:defRPr>
             </a:lvl4pPr>
-            <a:lvl5pPr indent="-298450" lvl="4" marL="2286000">
+            <a:lvl5pPr marL="2286000" lvl="4" indent="-298450">
               <a:spcBef>
                 <a:spcPts val="0"/>
               </a:spcBef>
@@ -2341,7 +2398,7 @@
                 </a:solidFill>
               </a:defRPr>
             </a:lvl5pPr>
-            <a:lvl6pPr indent="-298450" lvl="5" marL="2743200">
+            <a:lvl6pPr marL="2743200" lvl="5" indent="-298450">
               <a:spcBef>
                 <a:spcPts val="0"/>
               </a:spcBef>
@@ -2359,7 +2416,7 @@
                 </a:solidFill>
               </a:defRPr>
             </a:lvl6pPr>
-            <a:lvl7pPr indent="-298450" lvl="6" marL="3200400">
+            <a:lvl7pPr marL="3200400" lvl="6" indent="-298450">
               <a:spcBef>
                 <a:spcPts val="0"/>
               </a:spcBef>
@@ -2377,7 +2434,7 @@
                 </a:solidFill>
               </a:defRPr>
             </a:lvl7pPr>
-            <a:lvl8pPr indent="-298450" lvl="7" marL="3657600">
+            <a:lvl8pPr marL="3657600" lvl="7" indent="-298450">
               <a:spcBef>
                 <a:spcPts val="0"/>
               </a:spcBef>
@@ -2395,7 +2452,7 @@
                 </a:solidFill>
               </a:defRPr>
             </a:lvl8pPr>
-            <a:lvl9pPr indent="-298450" lvl="8" marL="4114800">
+            <a:lvl9pPr marL="4114800" lvl="8" indent="-298450">
               <a:spcBef>
                 <a:spcPts val="0"/>
               </a:spcBef>
@@ -2414,15 +2471,19 @@
               </a:defRPr>
             </a:lvl9pPr>
           </a:lstStyle>
-          <a:p/>
+          <a:p>
+            <a:endParaRPr/>
+          </a:p>
         </p:txBody>
       </p:sp>
       <p:sp>
         <p:nvSpPr>
           <p:cNvPr id="79" name="Google Shape;79;p11"/>
-          <p:cNvSpPr txBox="1"/>
+          <p:cNvSpPr txBox="1">
+            <a:spLocks noGrp="1"/>
+          </p:cNvSpPr>
           <p:nvPr>
-            <p:ph idx="12" type="sldNum"/>
+            <p:ph type="sldNum" idx="12"/>
           </p:nvPr>
         </p:nvSpPr>
         <p:spPr>
@@ -2435,7 +2496,7 @@
           </a:prstGeom>
         </p:spPr>
         <p:txBody>
-          <a:bodyPr anchorCtr="0" anchor="ctr" bIns="91425" lIns="91425" spcFirstLastPara="1" rIns="91425" wrap="square" tIns="91425">
+          <a:bodyPr spcFirstLastPara="1" wrap="square" lIns="91425" tIns="91425" rIns="91425" bIns="91425" anchor="ctr" anchorCtr="0">
             <a:normAutofit/>
           </a:bodyPr>
           <a:lstStyle>
@@ -2513,7 +2574,7 @@
             </a:lvl9pPr>
           </a:lstStyle>
           <a:p>
-            <a:pPr indent="0" lvl="0" marL="0" rtl="0" algn="r">
+            <a:pPr marL="0" lvl="0" indent="0" algn="r" rtl="0">
               <a:spcBef>
                 <a:spcPts val="0"/>
               </a:spcBef>
@@ -2539,11 +2600,11 @@
 </file>
 
 <file path=ppt/slideLayouts/slideLayout11.xml><?xml version="1.0" encoding="utf-8"?>
-<p:sldLayout xmlns:a="http://schemas.openxmlformats.org/drawingml/2006/main" xmlns:r="http://schemas.openxmlformats.org/officeDocument/2006/relationships" xmlns:mc="http://schemas.openxmlformats.org/markup-compatibility/2006" xmlns:mv="urn:schemas-microsoft-com:mac:vml" xmlns:p="http://schemas.openxmlformats.org/presentationml/2006/main" xmlns:c="http://schemas.openxmlformats.org/drawingml/2006/chart" xmlns:dgm="http://schemas.openxmlformats.org/drawingml/2006/diagram" xmlns:o="urn:schemas-microsoft-com:office:office" xmlns:v="urn:schemas-microsoft-com:vml" xmlns:pvml="urn:schemas-microsoft-com:office:powerpoint" xmlns:com="http://schemas.openxmlformats.org/drawingml/2006/compatibility" xmlns:p14="http://schemas.microsoft.com/office/powerpoint/2010/main" xmlns:p15="http://schemas.microsoft.com/office/powerpoint/2012/main" xmlns:ahyp="http://schemas.microsoft.com/office/drawing/2018/hyperlinkcolor" matchingName="Blank" type="blank">
+<p:sldLayout xmlns:a="http://schemas.openxmlformats.org/drawingml/2006/main" xmlns:r="http://schemas.openxmlformats.org/officeDocument/2006/relationships" xmlns:p="http://schemas.openxmlformats.org/presentationml/2006/main" matchingName="Blank" type="blank">
   <p:cSld name="BLANK">
     <p:spTree>
       <p:nvGrpSpPr>
-        <p:cNvPr id="80" name="Shape 80"/>
+        <p:cNvPr id="1" name="Shape 80"/>
         <p:cNvGrpSpPr/>
         <p:nvPr/>
       </p:nvGrpSpPr>
@@ -2558,9 +2619,11 @@
       <p:sp>
         <p:nvSpPr>
           <p:cNvPr id="81" name="Google Shape;81;p12"/>
-          <p:cNvSpPr txBox="1"/>
+          <p:cNvSpPr txBox="1">
+            <a:spLocks noGrp="1"/>
+          </p:cNvSpPr>
           <p:nvPr>
-            <p:ph idx="12" type="sldNum"/>
+            <p:ph type="sldNum" idx="12"/>
           </p:nvPr>
         </p:nvSpPr>
         <p:spPr>
@@ -2573,7 +2636,7 @@
           </a:prstGeom>
         </p:spPr>
         <p:txBody>
-          <a:bodyPr anchorCtr="0" anchor="ctr" bIns="91425" lIns="91425" spcFirstLastPara="1" rIns="91425" wrap="square" tIns="91425">
+          <a:bodyPr spcFirstLastPara="1" wrap="square" lIns="91425" tIns="91425" rIns="91425" bIns="91425" anchor="ctr" anchorCtr="0">
             <a:normAutofit/>
           </a:bodyPr>
           <a:lstStyle>
@@ -2615,7 +2678,7 @@
             </a:lvl9pPr>
           </a:lstStyle>
           <a:p>
-            <a:pPr indent="0" lvl="0" marL="0" rtl="0" algn="r">
+            <a:pPr marL="0" lvl="0" indent="0" algn="r" rtl="0">
               <a:spcBef>
                 <a:spcPts val="0"/>
               </a:spcBef>
@@ -2641,18 +2704,19 @@
 </file>
 
 <file path=ppt/slideLayouts/slideLayout2.xml><?xml version="1.0" encoding="utf-8"?>
-<p:sldLayout xmlns:a="http://schemas.openxmlformats.org/drawingml/2006/main" xmlns:r="http://schemas.openxmlformats.org/officeDocument/2006/relationships" xmlns:mc="http://schemas.openxmlformats.org/markup-compatibility/2006" xmlns:mv="urn:schemas-microsoft-com:mac:vml" xmlns:p="http://schemas.openxmlformats.org/presentationml/2006/main" xmlns:c="http://schemas.openxmlformats.org/drawingml/2006/chart" xmlns:dgm="http://schemas.openxmlformats.org/drawingml/2006/diagram" xmlns:o="urn:schemas-microsoft-com:office:office" xmlns:v="urn:schemas-microsoft-com:vml" xmlns:pvml="urn:schemas-microsoft-com:office:powerpoint" xmlns:com="http://schemas.openxmlformats.org/drawingml/2006/compatibility" xmlns:p14="http://schemas.microsoft.com/office/powerpoint/2010/main" xmlns:p15="http://schemas.microsoft.com/office/powerpoint/2012/main" xmlns:ahyp="http://schemas.microsoft.com/office/drawing/2018/hyperlinkcolor" matchingName="Section header" type="secHead">
+<p:sldLayout xmlns:a="http://schemas.openxmlformats.org/drawingml/2006/main" xmlns:r="http://schemas.openxmlformats.org/officeDocument/2006/relationships" xmlns:p="http://schemas.openxmlformats.org/presentationml/2006/main" matchingName="Section header" type="secHead">
   <p:cSld name="SECTION_HEADER">
     <p:bg>
       <p:bgPr>
         <a:solidFill>
           <a:schemeClr val="dk1"/>
         </a:solidFill>
+        <a:effectLst/>
       </p:bgPr>
     </p:bg>
     <p:spTree>
       <p:nvGrpSpPr>
-        <p:cNvPr id="17" name="Shape 17"/>
+        <p:cNvPr id="1" name="Shape 17"/>
         <p:cNvGrpSpPr/>
         <p:nvPr/>
       </p:nvGrpSpPr>
@@ -2700,12 +2764,12 @@
             </a:ln>
           </p:spPr>
           <p:txBody>
-            <a:bodyPr anchorCtr="0" anchor="ctr" bIns="91425" lIns="91425" spcFirstLastPara="1" rIns="91425" wrap="square" tIns="91425">
+            <a:bodyPr spcFirstLastPara="1" wrap="square" lIns="91425" tIns="91425" rIns="91425" bIns="91425" anchor="ctr" anchorCtr="0">
               <a:noAutofit/>
             </a:bodyPr>
             <a:lstStyle/>
             <a:p>
-              <a:pPr indent="0" lvl="0" marL="0" rtl="0" algn="l">
+              <a:pPr marL="0" lvl="0" indent="0" algn="l" rtl="0">
                 <a:spcBef>
                   <a:spcPts val="0"/>
                 </a:spcBef>
@@ -2714,9 +2778,6 @@
                 </a:spcAft>
                 <a:buNone/>
               </a:pPr>
-              <a:r>
-                <a:t/>
-              </a:r>
               <a:endParaRPr/>
             </a:p>
           </p:txBody>
@@ -2743,12 +2804,12 @@
             </a:ln>
           </p:spPr>
           <p:txBody>
-            <a:bodyPr anchorCtr="0" anchor="ctr" bIns="91425" lIns="91425" spcFirstLastPara="1" rIns="91425" wrap="square" tIns="91425">
+            <a:bodyPr spcFirstLastPara="1" wrap="square" lIns="91425" tIns="91425" rIns="91425" bIns="91425" anchor="ctr" anchorCtr="0">
               <a:noAutofit/>
             </a:bodyPr>
             <a:lstStyle/>
             <a:p>
-              <a:pPr indent="0" lvl="0" marL="0" rtl="0" algn="l">
+              <a:pPr marL="0" lvl="0" indent="0" algn="l" rtl="0">
                 <a:spcBef>
                   <a:spcPts val="0"/>
                 </a:spcBef>
@@ -2757,9 +2818,6 @@
                 </a:spcAft>
                 <a:buNone/>
               </a:pPr>
-              <a:r>
-                <a:t/>
-              </a:r>
               <a:endParaRPr/>
             </a:p>
           </p:txBody>
@@ -2768,7 +2826,9 @@
       <p:sp>
         <p:nvSpPr>
           <p:cNvPr id="21" name="Google Shape;21;p3"/>
-          <p:cNvSpPr txBox="1"/>
+          <p:cNvSpPr txBox="1">
+            <a:spLocks noGrp="1"/>
+          </p:cNvSpPr>
           <p:nvPr>
             <p:ph type="title"/>
           </p:nvPr>
@@ -2783,7 +2843,7 @@
           </a:prstGeom>
         </p:spPr>
         <p:txBody>
-          <a:bodyPr anchorCtr="0" anchor="t" bIns="91425" lIns="91425" spcFirstLastPara="1" rIns="91425" wrap="square" tIns="91425">
+          <a:bodyPr spcFirstLastPara="1" wrap="square" lIns="91425" tIns="91425" rIns="91425" bIns="91425" anchor="t" anchorCtr="0">
             <a:normAutofit/>
           </a:bodyPr>
           <a:lstStyle>
@@ -2950,15 +3010,19 @@
               </a:defRPr>
             </a:lvl9pPr>
           </a:lstStyle>
-          <a:p/>
+          <a:p>
+            <a:endParaRPr/>
+          </a:p>
         </p:txBody>
       </p:sp>
       <p:sp>
         <p:nvSpPr>
           <p:cNvPr id="22" name="Google Shape;22;p3"/>
-          <p:cNvSpPr txBox="1"/>
+          <p:cNvSpPr txBox="1">
+            <a:spLocks noGrp="1"/>
+          </p:cNvSpPr>
           <p:nvPr>
-            <p:ph idx="12" type="sldNum"/>
+            <p:ph type="sldNum" idx="12"/>
           </p:nvPr>
         </p:nvSpPr>
         <p:spPr>
@@ -2971,7 +3035,7 @@
           </a:prstGeom>
         </p:spPr>
         <p:txBody>
-          <a:bodyPr anchorCtr="0" anchor="ctr" bIns="91425" lIns="91425" spcFirstLastPara="1" rIns="91425" wrap="square" tIns="91425">
+          <a:bodyPr spcFirstLastPara="1" wrap="square" lIns="91425" tIns="91425" rIns="91425" bIns="91425" anchor="ctr" anchorCtr="0">
             <a:normAutofit/>
           </a:bodyPr>
           <a:lstStyle>
@@ -3049,7 +3113,7 @@
             </a:lvl9pPr>
           </a:lstStyle>
           <a:p>
-            <a:pPr indent="0" lvl="0" marL="0" rtl="0" algn="r">
+            <a:pPr marL="0" lvl="0" indent="0" algn="r" rtl="0">
               <a:spcBef>
                 <a:spcPts val="0"/>
               </a:spcBef>
@@ -3075,11 +3139,11 @@
 </file>
 
 <file path=ppt/slideLayouts/slideLayout3.xml><?xml version="1.0" encoding="utf-8"?>
-<p:sldLayout xmlns:a="http://schemas.openxmlformats.org/drawingml/2006/main" xmlns:r="http://schemas.openxmlformats.org/officeDocument/2006/relationships" xmlns:mc="http://schemas.openxmlformats.org/markup-compatibility/2006" xmlns:mv="urn:schemas-microsoft-com:mac:vml" xmlns:p="http://schemas.openxmlformats.org/presentationml/2006/main" xmlns:c="http://schemas.openxmlformats.org/drawingml/2006/chart" xmlns:dgm="http://schemas.openxmlformats.org/drawingml/2006/diagram" xmlns:o="urn:schemas-microsoft-com:office:office" xmlns:v="urn:schemas-microsoft-com:vml" xmlns:pvml="urn:schemas-microsoft-com:office:powerpoint" xmlns:com="http://schemas.openxmlformats.org/drawingml/2006/compatibility" xmlns:p14="http://schemas.microsoft.com/office/powerpoint/2010/main" xmlns:p15="http://schemas.microsoft.com/office/powerpoint/2012/main" xmlns:ahyp="http://schemas.microsoft.com/office/drawing/2018/hyperlinkcolor" matchingName="Title and body" type="tx">
+<p:sldLayout xmlns:a="http://schemas.openxmlformats.org/drawingml/2006/main" xmlns:r="http://schemas.openxmlformats.org/officeDocument/2006/relationships" xmlns:p="http://schemas.openxmlformats.org/presentationml/2006/main" matchingName="Title and body" type="tx">
   <p:cSld name="TITLE_AND_BODY">
     <p:spTree>
       <p:nvGrpSpPr>
-        <p:cNvPr id="23" name="Shape 23"/>
+        <p:cNvPr id="1" name="Shape 23"/>
         <p:cNvGrpSpPr/>
         <p:nvPr/>
       </p:nvGrpSpPr>
@@ -3113,12 +3177,12 @@
           </a:ln>
         </p:spPr>
         <p:txBody>
-          <a:bodyPr anchorCtr="0" anchor="ctr" bIns="91425" lIns="91425" spcFirstLastPara="1" rIns="91425" wrap="square" tIns="91425">
+          <a:bodyPr spcFirstLastPara="1" wrap="square" lIns="91425" tIns="91425" rIns="91425" bIns="91425" anchor="ctr" anchorCtr="0">
             <a:noAutofit/>
           </a:bodyPr>
           <a:lstStyle/>
           <a:p>
-            <a:pPr indent="0" lvl="0" marL="0" rtl="0" algn="l">
+            <a:pPr marL="0" lvl="0" indent="0" algn="l" rtl="0">
               <a:spcBef>
                 <a:spcPts val="0"/>
               </a:spcBef>
@@ -3127,9 +3191,6 @@
               </a:spcAft>
               <a:buNone/>
             </a:pPr>
-            <a:r>
-              <a:t/>
-            </a:r>
             <a:endParaRPr/>
           </a:p>
         </p:txBody>
@@ -3170,12 +3231,12 @@
             </a:ln>
           </p:spPr>
           <p:txBody>
-            <a:bodyPr anchorCtr="0" anchor="ctr" bIns="91425" lIns="91425" spcFirstLastPara="1" rIns="91425" wrap="square" tIns="91425">
+            <a:bodyPr spcFirstLastPara="1" wrap="square" lIns="91425" tIns="91425" rIns="91425" bIns="91425" anchor="ctr" anchorCtr="0">
               <a:noAutofit/>
             </a:bodyPr>
             <a:lstStyle/>
             <a:p>
-              <a:pPr indent="0" lvl="0" marL="0" rtl="0" algn="l">
+              <a:pPr marL="0" lvl="0" indent="0" algn="l" rtl="0">
                 <a:spcBef>
                   <a:spcPts val="0"/>
                 </a:spcBef>
@@ -3184,9 +3245,6 @@
                 </a:spcAft>
                 <a:buNone/>
               </a:pPr>
-              <a:r>
-                <a:t/>
-              </a:r>
               <a:endParaRPr/>
             </a:p>
           </p:txBody>
@@ -3213,12 +3271,12 @@
             </a:ln>
           </p:spPr>
           <p:txBody>
-            <a:bodyPr anchorCtr="0" anchor="ctr" bIns="91425" lIns="91425" spcFirstLastPara="1" rIns="91425" wrap="square" tIns="91425">
+            <a:bodyPr spcFirstLastPara="1" wrap="square" lIns="91425" tIns="91425" rIns="91425" bIns="91425" anchor="ctr" anchorCtr="0">
               <a:noAutofit/>
             </a:bodyPr>
             <a:lstStyle/>
             <a:p>
-              <a:pPr indent="0" lvl="0" marL="0" rtl="0" algn="l">
+              <a:pPr marL="0" lvl="0" indent="0" algn="l" rtl="0">
                 <a:spcBef>
                   <a:spcPts val="0"/>
                 </a:spcBef>
@@ -3227,9 +3285,6 @@
                 </a:spcAft>
                 <a:buNone/>
               </a:pPr>
-              <a:r>
-                <a:t/>
-              </a:r>
               <a:endParaRPr/>
             </a:p>
           </p:txBody>
@@ -3238,7 +3293,9 @@
       <p:sp>
         <p:nvSpPr>
           <p:cNvPr id="28" name="Google Shape;28;p4"/>
-          <p:cNvSpPr txBox="1"/>
+          <p:cNvSpPr txBox="1">
+            <a:spLocks noGrp="1"/>
+          </p:cNvSpPr>
           <p:nvPr>
             <p:ph type="title"/>
           </p:nvPr>
@@ -3253,7 +3310,7 @@
           </a:prstGeom>
         </p:spPr>
         <p:txBody>
-          <a:bodyPr anchorCtr="0" anchor="t" bIns="91425" lIns="91425" spcFirstLastPara="1" rIns="91425" wrap="square" tIns="91425">
+          <a:bodyPr spcFirstLastPara="1" wrap="square" lIns="91425" tIns="91425" rIns="91425" bIns="91425" anchor="t" anchorCtr="0">
             <a:normAutofit/>
           </a:bodyPr>
           <a:lstStyle>
@@ -3357,15 +3414,19 @@
               <a:defRPr sz="2600"/>
             </a:lvl9pPr>
           </a:lstStyle>
-          <a:p/>
+          <a:p>
+            <a:endParaRPr/>
+          </a:p>
         </p:txBody>
       </p:sp>
       <p:sp>
         <p:nvSpPr>
           <p:cNvPr id="29" name="Google Shape;29;p4"/>
-          <p:cNvSpPr txBox="1"/>
+          <p:cNvSpPr txBox="1">
+            <a:spLocks noGrp="1"/>
+          </p:cNvSpPr>
           <p:nvPr>
-            <p:ph idx="1" type="body"/>
+            <p:ph type="body" idx="1"/>
           </p:nvPr>
         </p:nvSpPr>
         <p:spPr>
@@ -3378,11 +3439,11 @@
           </a:prstGeom>
         </p:spPr>
         <p:txBody>
-          <a:bodyPr anchorCtr="0" anchor="t" bIns="91425" lIns="91425" spcFirstLastPara="1" rIns="91425" wrap="square" tIns="91425">
+          <a:bodyPr spcFirstLastPara="1" wrap="square" lIns="91425" tIns="91425" rIns="91425" bIns="91425" anchor="t" anchorCtr="0">
             <a:normAutofit/>
           </a:bodyPr>
           <a:lstStyle>
-            <a:lvl1pPr indent="-311150" lvl="0" marL="457200">
+            <a:lvl1pPr marL="457200" lvl="0" indent="-311150">
               <a:spcBef>
                 <a:spcPts val="0"/>
               </a:spcBef>
@@ -3393,7 +3454,7 @@
               <a:buChar char="●"/>
               <a:defRPr/>
             </a:lvl1pPr>
-            <a:lvl2pPr indent="-298450" lvl="1" marL="914400">
+            <a:lvl2pPr marL="914400" lvl="1" indent="-298450">
               <a:spcBef>
                 <a:spcPts val="0"/>
               </a:spcBef>
@@ -3404,7 +3465,7 @@
               <a:buChar char="○"/>
               <a:defRPr/>
             </a:lvl2pPr>
-            <a:lvl3pPr indent="-298450" lvl="2" marL="1371600">
+            <a:lvl3pPr marL="1371600" lvl="2" indent="-298450">
               <a:spcBef>
                 <a:spcPts val="0"/>
               </a:spcBef>
@@ -3415,7 +3476,7 @@
               <a:buChar char="■"/>
               <a:defRPr/>
             </a:lvl3pPr>
-            <a:lvl4pPr indent="-298450" lvl="3" marL="1828800">
+            <a:lvl4pPr marL="1828800" lvl="3" indent="-298450">
               <a:spcBef>
                 <a:spcPts val="0"/>
               </a:spcBef>
@@ -3426,7 +3487,7 @@
               <a:buChar char="●"/>
               <a:defRPr/>
             </a:lvl4pPr>
-            <a:lvl5pPr indent="-298450" lvl="4" marL="2286000">
+            <a:lvl5pPr marL="2286000" lvl="4" indent="-298450">
               <a:spcBef>
                 <a:spcPts val="0"/>
               </a:spcBef>
@@ -3437,7 +3498,7 @@
               <a:buChar char="○"/>
               <a:defRPr/>
             </a:lvl5pPr>
-            <a:lvl6pPr indent="-298450" lvl="5" marL="2743200">
+            <a:lvl6pPr marL="2743200" lvl="5" indent="-298450">
               <a:spcBef>
                 <a:spcPts val="0"/>
               </a:spcBef>
@@ -3448,7 +3509,7 @@
               <a:buChar char="■"/>
               <a:defRPr/>
             </a:lvl6pPr>
-            <a:lvl7pPr indent="-298450" lvl="6" marL="3200400">
+            <a:lvl7pPr marL="3200400" lvl="6" indent="-298450">
               <a:spcBef>
                 <a:spcPts val="0"/>
               </a:spcBef>
@@ -3459,7 +3520,7 @@
               <a:buChar char="●"/>
               <a:defRPr/>
             </a:lvl7pPr>
-            <a:lvl8pPr indent="-298450" lvl="7" marL="3657600">
+            <a:lvl8pPr marL="3657600" lvl="7" indent="-298450">
               <a:spcBef>
                 <a:spcPts val="0"/>
               </a:spcBef>
@@ -3470,7 +3531,7 @@
               <a:buChar char="○"/>
               <a:defRPr/>
             </a:lvl8pPr>
-            <a:lvl9pPr indent="-298450" lvl="8" marL="4114800">
+            <a:lvl9pPr marL="4114800" lvl="8" indent="-298450">
               <a:spcBef>
                 <a:spcPts val="0"/>
               </a:spcBef>
@@ -3482,15 +3543,19 @@
               <a:defRPr/>
             </a:lvl9pPr>
           </a:lstStyle>
-          <a:p/>
+          <a:p>
+            <a:endParaRPr/>
+          </a:p>
         </p:txBody>
       </p:sp>
       <p:sp>
         <p:nvSpPr>
           <p:cNvPr id="30" name="Google Shape;30;p4"/>
-          <p:cNvSpPr txBox="1"/>
+          <p:cNvSpPr txBox="1">
+            <a:spLocks noGrp="1"/>
+          </p:cNvSpPr>
           <p:nvPr>
-            <p:ph idx="12" type="sldNum"/>
+            <p:ph type="sldNum" idx="12"/>
           </p:nvPr>
         </p:nvSpPr>
         <p:spPr>
@@ -3503,7 +3568,7 @@
           </a:prstGeom>
         </p:spPr>
         <p:txBody>
-          <a:bodyPr anchorCtr="0" anchor="ctr" bIns="91425" lIns="91425" spcFirstLastPara="1" rIns="91425" wrap="square" tIns="91425">
+          <a:bodyPr spcFirstLastPara="1" wrap="square" lIns="91425" tIns="91425" rIns="91425" bIns="91425" anchor="ctr" anchorCtr="0">
             <a:normAutofit/>
           </a:bodyPr>
           <a:lstStyle>
@@ -3545,7 +3610,7 @@
             </a:lvl9pPr>
           </a:lstStyle>
           <a:p>
-            <a:pPr indent="0" lvl="0" marL="0" rtl="0" algn="r">
+            <a:pPr marL="0" lvl="0" indent="0" algn="r" rtl="0">
               <a:spcBef>
                 <a:spcPts val="0"/>
               </a:spcBef>
@@ -3571,11 +3636,11 @@
 </file>
 
 <file path=ppt/slideLayouts/slideLayout4.xml><?xml version="1.0" encoding="utf-8"?>
-<p:sldLayout xmlns:a="http://schemas.openxmlformats.org/drawingml/2006/main" xmlns:r="http://schemas.openxmlformats.org/officeDocument/2006/relationships" xmlns:mc="http://schemas.openxmlformats.org/markup-compatibility/2006" xmlns:mv="urn:schemas-microsoft-com:mac:vml" xmlns:p="http://schemas.openxmlformats.org/presentationml/2006/main" xmlns:c="http://schemas.openxmlformats.org/drawingml/2006/chart" xmlns:dgm="http://schemas.openxmlformats.org/drawingml/2006/diagram" xmlns:o="urn:schemas-microsoft-com:office:office" xmlns:v="urn:schemas-microsoft-com:vml" xmlns:pvml="urn:schemas-microsoft-com:office:powerpoint" xmlns:com="http://schemas.openxmlformats.org/drawingml/2006/compatibility" xmlns:p14="http://schemas.microsoft.com/office/powerpoint/2010/main" xmlns:p15="http://schemas.microsoft.com/office/powerpoint/2012/main" xmlns:ahyp="http://schemas.microsoft.com/office/drawing/2018/hyperlinkcolor" matchingName="Title and two columns" type="twoColTx">
+<p:sldLayout xmlns:a="http://schemas.openxmlformats.org/drawingml/2006/main" xmlns:r="http://schemas.openxmlformats.org/officeDocument/2006/relationships" xmlns:p="http://schemas.openxmlformats.org/presentationml/2006/main" matchingName="Title and two columns" type="twoColTx">
   <p:cSld name="TITLE_AND_TWO_COLUMNS">
     <p:spTree>
       <p:nvGrpSpPr>
-        <p:cNvPr id="31" name="Shape 31"/>
+        <p:cNvPr id="1" name="Shape 31"/>
         <p:cNvGrpSpPr/>
         <p:nvPr/>
       </p:nvGrpSpPr>
@@ -3609,12 +3674,12 @@
           </a:ln>
         </p:spPr>
         <p:txBody>
-          <a:bodyPr anchorCtr="0" anchor="ctr" bIns="91425" lIns="91425" spcFirstLastPara="1" rIns="91425" wrap="square" tIns="91425">
+          <a:bodyPr spcFirstLastPara="1" wrap="square" lIns="91425" tIns="91425" rIns="91425" bIns="91425" anchor="ctr" anchorCtr="0">
             <a:noAutofit/>
           </a:bodyPr>
           <a:lstStyle/>
           <a:p>
-            <a:pPr indent="0" lvl="0" marL="0" rtl="0" algn="l">
+            <a:pPr marL="0" lvl="0" indent="0" algn="l" rtl="0">
               <a:spcBef>
                 <a:spcPts val="0"/>
               </a:spcBef>
@@ -3623,9 +3688,6 @@
               </a:spcAft>
               <a:buNone/>
             </a:pPr>
-            <a:r>
-              <a:t/>
-            </a:r>
             <a:endParaRPr/>
           </a:p>
         </p:txBody>
@@ -3666,12 +3728,12 @@
             </a:ln>
           </p:spPr>
           <p:txBody>
-            <a:bodyPr anchorCtr="0" anchor="ctr" bIns="91425" lIns="91425" spcFirstLastPara="1" rIns="91425" wrap="square" tIns="91425">
+            <a:bodyPr spcFirstLastPara="1" wrap="square" lIns="91425" tIns="91425" rIns="91425" bIns="91425" anchor="ctr" anchorCtr="0">
               <a:noAutofit/>
             </a:bodyPr>
             <a:lstStyle/>
             <a:p>
-              <a:pPr indent="0" lvl="0" marL="0" rtl="0" algn="l">
+              <a:pPr marL="0" lvl="0" indent="0" algn="l" rtl="0">
                 <a:spcBef>
                   <a:spcPts val="0"/>
                 </a:spcBef>
@@ -3680,9 +3742,6 @@
                 </a:spcAft>
                 <a:buNone/>
               </a:pPr>
-              <a:r>
-                <a:t/>
-              </a:r>
               <a:endParaRPr/>
             </a:p>
           </p:txBody>
@@ -3709,12 +3768,12 @@
             </a:ln>
           </p:spPr>
           <p:txBody>
-            <a:bodyPr anchorCtr="0" anchor="ctr" bIns="91425" lIns="91425" spcFirstLastPara="1" rIns="91425" wrap="square" tIns="91425">
+            <a:bodyPr spcFirstLastPara="1" wrap="square" lIns="91425" tIns="91425" rIns="91425" bIns="91425" anchor="ctr" anchorCtr="0">
               <a:noAutofit/>
             </a:bodyPr>
             <a:lstStyle/>
             <a:p>
-              <a:pPr indent="0" lvl="0" marL="0" rtl="0" algn="l">
+              <a:pPr marL="0" lvl="0" indent="0" algn="l" rtl="0">
                 <a:spcBef>
                   <a:spcPts val="0"/>
                 </a:spcBef>
@@ -3723,9 +3782,6 @@
                 </a:spcAft>
                 <a:buNone/>
               </a:pPr>
-              <a:r>
-                <a:t/>
-              </a:r>
               <a:endParaRPr/>
             </a:p>
           </p:txBody>
@@ -3734,7 +3790,9 @@
       <p:sp>
         <p:nvSpPr>
           <p:cNvPr id="36" name="Google Shape;36;p5"/>
-          <p:cNvSpPr txBox="1"/>
+          <p:cNvSpPr txBox="1">
+            <a:spLocks noGrp="1"/>
+          </p:cNvSpPr>
           <p:nvPr>
             <p:ph type="title"/>
           </p:nvPr>
@@ -3749,7 +3807,7 @@
           </a:prstGeom>
         </p:spPr>
         <p:txBody>
-          <a:bodyPr anchorCtr="0" anchor="t" bIns="91425" lIns="91425" spcFirstLastPara="1" rIns="91425" wrap="square" tIns="91425">
+          <a:bodyPr spcFirstLastPara="1" wrap="square" lIns="91425" tIns="91425" rIns="91425" bIns="91425" anchor="t" anchorCtr="0">
             <a:normAutofit/>
           </a:bodyPr>
           <a:lstStyle>
@@ -3853,15 +3911,19 @@
               <a:defRPr sz="2600"/>
             </a:lvl9pPr>
           </a:lstStyle>
-          <a:p/>
+          <a:p>
+            <a:endParaRPr/>
+          </a:p>
         </p:txBody>
       </p:sp>
       <p:sp>
         <p:nvSpPr>
           <p:cNvPr id="37" name="Google Shape;37;p5"/>
-          <p:cNvSpPr txBox="1"/>
+          <p:cNvSpPr txBox="1">
+            <a:spLocks noGrp="1"/>
+          </p:cNvSpPr>
           <p:nvPr>
-            <p:ph idx="1" type="body"/>
+            <p:ph type="body" idx="1"/>
           </p:nvPr>
         </p:nvSpPr>
         <p:spPr>
@@ -3874,11 +3936,11 @@
           </a:prstGeom>
         </p:spPr>
         <p:txBody>
-          <a:bodyPr anchorCtr="0" anchor="t" bIns="91425" lIns="91425" spcFirstLastPara="1" rIns="91425" wrap="square" tIns="91425">
+          <a:bodyPr spcFirstLastPara="1" wrap="square" lIns="91425" tIns="91425" rIns="91425" bIns="91425" anchor="t" anchorCtr="0">
             <a:normAutofit/>
           </a:bodyPr>
           <a:lstStyle>
-            <a:lvl1pPr indent="-311150" lvl="0" marL="457200">
+            <a:lvl1pPr marL="457200" lvl="0" indent="-311150">
               <a:spcBef>
                 <a:spcPts val="0"/>
               </a:spcBef>
@@ -3889,7 +3951,7 @@
               <a:buChar char="●"/>
               <a:defRPr/>
             </a:lvl1pPr>
-            <a:lvl2pPr indent="-298450" lvl="1" marL="914400">
+            <a:lvl2pPr marL="914400" lvl="1" indent="-298450">
               <a:spcBef>
                 <a:spcPts val="0"/>
               </a:spcBef>
@@ -3900,7 +3962,7 @@
               <a:buChar char="○"/>
               <a:defRPr/>
             </a:lvl2pPr>
-            <a:lvl3pPr indent="-298450" lvl="2" marL="1371600">
+            <a:lvl3pPr marL="1371600" lvl="2" indent="-298450">
               <a:spcBef>
                 <a:spcPts val="0"/>
               </a:spcBef>
@@ -3911,7 +3973,7 @@
               <a:buChar char="■"/>
               <a:defRPr/>
             </a:lvl3pPr>
-            <a:lvl4pPr indent="-298450" lvl="3" marL="1828800">
+            <a:lvl4pPr marL="1828800" lvl="3" indent="-298450">
               <a:spcBef>
                 <a:spcPts val="0"/>
               </a:spcBef>
@@ -3922,7 +3984,7 @@
               <a:buChar char="●"/>
               <a:defRPr/>
             </a:lvl4pPr>
-            <a:lvl5pPr indent="-298450" lvl="4" marL="2286000">
+            <a:lvl5pPr marL="2286000" lvl="4" indent="-298450">
               <a:spcBef>
                 <a:spcPts val="0"/>
               </a:spcBef>
@@ -3933,7 +3995,7 @@
               <a:buChar char="○"/>
               <a:defRPr/>
             </a:lvl5pPr>
-            <a:lvl6pPr indent="-298450" lvl="5" marL="2743200">
+            <a:lvl6pPr marL="2743200" lvl="5" indent="-298450">
               <a:spcBef>
                 <a:spcPts val="0"/>
               </a:spcBef>
@@ -3944,7 +4006,7 @@
               <a:buChar char="■"/>
               <a:defRPr/>
             </a:lvl6pPr>
-            <a:lvl7pPr indent="-298450" lvl="6" marL="3200400">
+            <a:lvl7pPr marL="3200400" lvl="6" indent="-298450">
               <a:spcBef>
                 <a:spcPts val="0"/>
               </a:spcBef>
@@ -3955,7 +4017,7 @@
               <a:buChar char="●"/>
               <a:defRPr/>
             </a:lvl7pPr>
-            <a:lvl8pPr indent="-298450" lvl="7" marL="3657600">
+            <a:lvl8pPr marL="3657600" lvl="7" indent="-298450">
               <a:spcBef>
                 <a:spcPts val="0"/>
               </a:spcBef>
@@ -3966,7 +4028,7 @@
               <a:buChar char="○"/>
               <a:defRPr/>
             </a:lvl8pPr>
-            <a:lvl9pPr indent="-298450" lvl="8" marL="4114800">
+            <a:lvl9pPr marL="4114800" lvl="8" indent="-298450">
               <a:spcBef>
                 <a:spcPts val="0"/>
               </a:spcBef>
@@ -3978,15 +4040,19 @@
               <a:defRPr/>
             </a:lvl9pPr>
           </a:lstStyle>
-          <a:p/>
+          <a:p>
+            <a:endParaRPr/>
+          </a:p>
         </p:txBody>
       </p:sp>
       <p:sp>
         <p:nvSpPr>
           <p:cNvPr id="38" name="Google Shape;38;p5"/>
-          <p:cNvSpPr txBox="1"/>
+          <p:cNvSpPr txBox="1">
+            <a:spLocks noGrp="1"/>
+          </p:cNvSpPr>
           <p:nvPr>
-            <p:ph idx="2" type="body"/>
+            <p:ph type="body" idx="2"/>
           </p:nvPr>
         </p:nvSpPr>
         <p:spPr>
@@ -3999,11 +4065,11 @@
           </a:prstGeom>
         </p:spPr>
         <p:txBody>
-          <a:bodyPr anchorCtr="0" anchor="t" bIns="91425" lIns="91425" spcFirstLastPara="1" rIns="91425" wrap="square" tIns="91425">
+          <a:bodyPr spcFirstLastPara="1" wrap="square" lIns="91425" tIns="91425" rIns="91425" bIns="91425" anchor="t" anchorCtr="0">
             <a:normAutofit/>
           </a:bodyPr>
           <a:lstStyle>
-            <a:lvl1pPr indent="-311150" lvl="0" marL="457200">
+            <a:lvl1pPr marL="457200" lvl="0" indent="-311150">
               <a:spcBef>
                 <a:spcPts val="0"/>
               </a:spcBef>
@@ -4014,7 +4080,7 @@
               <a:buChar char="●"/>
               <a:defRPr/>
             </a:lvl1pPr>
-            <a:lvl2pPr indent="-298450" lvl="1" marL="914400">
+            <a:lvl2pPr marL="914400" lvl="1" indent="-298450">
               <a:spcBef>
                 <a:spcPts val="0"/>
               </a:spcBef>
@@ -4025,7 +4091,7 @@
               <a:buChar char="○"/>
               <a:defRPr/>
             </a:lvl2pPr>
-            <a:lvl3pPr indent="-298450" lvl="2" marL="1371600">
+            <a:lvl3pPr marL="1371600" lvl="2" indent="-298450">
               <a:spcBef>
                 <a:spcPts val="0"/>
               </a:spcBef>
@@ -4036,7 +4102,7 @@
               <a:buChar char="■"/>
               <a:defRPr/>
             </a:lvl3pPr>
-            <a:lvl4pPr indent="-298450" lvl="3" marL="1828800">
+            <a:lvl4pPr marL="1828800" lvl="3" indent="-298450">
               <a:spcBef>
                 <a:spcPts val="0"/>
               </a:spcBef>
@@ -4047,7 +4113,7 @@
               <a:buChar char="●"/>
               <a:defRPr/>
             </a:lvl4pPr>
-            <a:lvl5pPr indent="-298450" lvl="4" marL="2286000">
+            <a:lvl5pPr marL="2286000" lvl="4" indent="-298450">
               <a:spcBef>
                 <a:spcPts val="0"/>
               </a:spcBef>
@@ -4058,7 +4124,7 @@
               <a:buChar char="○"/>
               <a:defRPr/>
             </a:lvl5pPr>
-            <a:lvl6pPr indent="-298450" lvl="5" marL="2743200">
+            <a:lvl6pPr marL="2743200" lvl="5" indent="-298450">
               <a:spcBef>
                 <a:spcPts val="0"/>
               </a:spcBef>
@@ -4069,7 +4135,7 @@
               <a:buChar char="■"/>
               <a:defRPr/>
             </a:lvl6pPr>
-            <a:lvl7pPr indent="-298450" lvl="6" marL="3200400">
+            <a:lvl7pPr marL="3200400" lvl="6" indent="-298450">
               <a:spcBef>
                 <a:spcPts val="0"/>
               </a:spcBef>
@@ -4080,7 +4146,7 @@
               <a:buChar char="●"/>
               <a:defRPr/>
             </a:lvl7pPr>
-            <a:lvl8pPr indent="-298450" lvl="7" marL="3657600">
+            <a:lvl8pPr marL="3657600" lvl="7" indent="-298450">
               <a:spcBef>
                 <a:spcPts val="0"/>
               </a:spcBef>
@@ -4091,7 +4157,7 @@
               <a:buChar char="○"/>
               <a:defRPr/>
             </a:lvl8pPr>
-            <a:lvl9pPr indent="-298450" lvl="8" marL="4114800">
+            <a:lvl9pPr marL="4114800" lvl="8" indent="-298450">
               <a:spcBef>
                 <a:spcPts val="0"/>
               </a:spcBef>
@@ -4103,15 +4169,19 @@
               <a:defRPr/>
             </a:lvl9pPr>
           </a:lstStyle>
-          <a:p/>
+          <a:p>
+            <a:endParaRPr/>
+          </a:p>
         </p:txBody>
       </p:sp>
       <p:sp>
         <p:nvSpPr>
           <p:cNvPr id="39" name="Google Shape;39;p5"/>
-          <p:cNvSpPr txBox="1"/>
+          <p:cNvSpPr txBox="1">
+            <a:spLocks noGrp="1"/>
+          </p:cNvSpPr>
           <p:nvPr>
-            <p:ph idx="12" type="sldNum"/>
+            <p:ph type="sldNum" idx="12"/>
           </p:nvPr>
         </p:nvSpPr>
         <p:spPr>
@@ -4124,7 +4194,7 @@
           </a:prstGeom>
         </p:spPr>
         <p:txBody>
-          <a:bodyPr anchorCtr="0" anchor="ctr" bIns="91425" lIns="91425" spcFirstLastPara="1" rIns="91425" wrap="square" tIns="91425">
+          <a:bodyPr spcFirstLastPara="1" wrap="square" lIns="91425" tIns="91425" rIns="91425" bIns="91425" anchor="ctr" anchorCtr="0">
             <a:normAutofit/>
           </a:bodyPr>
           <a:lstStyle>
@@ -4166,7 +4236,7 @@
             </a:lvl9pPr>
           </a:lstStyle>
           <a:p>
-            <a:pPr indent="0" lvl="0" marL="0" rtl="0" algn="r">
+            <a:pPr marL="0" lvl="0" indent="0" algn="r" rtl="0">
               <a:spcBef>
                 <a:spcPts val="0"/>
               </a:spcBef>
@@ -4192,11 +4262,11 @@
 </file>
 
 <file path=ppt/slideLayouts/slideLayout5.xml><?xml version="1.0" encoding="utf-8"?>
-<p:sldLayout xmlns:a="http://schemas.openxmlformats.org/drawingml/2006/main" xmlns:r="http://schemas.openxmlformats.org/officeDocument/2006/relationships" xmlns:mc="http://schemas.openxmlformats.org/markup-compatibility/2006" xmlns:mv="urn:schemas-microsoft-com:mac:vml" xmlns:p="http://schemas.openxmlformats.org/presentationml/2006/main" xmlns:c="http://schemas.openxmlformats.org/drawingml/2006/chart" xmlns:dgm="http://schemas.openxmlformats.org/drawingml/2006/diagram" xmlns:o="urn:schemas-microsoft-com:office:office" xmlns:v="urn:schemas-microsoft-com:vml" xmlns:pvml="urn:schemas-microsoft-com:office:powerpoint" xmlns:com="http://schemas.openxmlformats.org/drawingml/2006/compatibility" xmlns:p14="http://schemas.microsoft.com/office/powerpoint/2010/main" xmlns:p15="http://schemas.microsoft.com/office/powerpoint/2012/main" xmlns:ahyp="http://schemas.microsoft.com/office/drawing/2018/hyperlinkcolor" matchingName="Title only" type="titleOnly">
+<p:sldLayout xmlns:a="http://schemas.openxmlformats.org/drawingml/2006/main" xmlns:r="http://schemas.openxmlformats.org/officeDocument/2006/relationships" xmlns:p="http://schemas.openxmlformats.org/presentationml/2006/main" matchingName="Title only" type="titleOnly">
   <p:cSld name="TITLE_ONLY">
     <p:spTree>
       <p:nvGrpSpPr>
-        <p:cNvPr id="40" name="Shape 40"/>
+        <p:cNvPr id="1" name="Shape 40"/>
         <p:cNvGrpSpPr/>
         <p:nvPr/>
       </p:nvGrpSpPr>
@@ -4230,12 +4300,12 @@
           </a:ln>
         </p:spPr>
         <p:txBody>
-          <a:bodyPr anchorCtr="0" anchor="ctr" bIns="91425" lIns="91425" spcFirstLastPara="1" rIns="91425" wrap="square" tIns="91425">
+          <a:bodyPr spcFirstLastPara="1" wrap="square" lIns="91425" tIns="91425" rIns="91425" bIns="91425" anchor="ctr" anchorCtr="0">
             <a:noAutofit/>
           </a:bodyPr>
           <a:lstStyle/>
           <a:p>
-            <a:pPr indent="0" lvl="0" marL="0" rtl="0" algn="l">
+            <a:pPr marL="0" lvl="0" indent="0" algn="l" rtl="0">
               <a:spcBef>
                 <a:spcPts val="0"/>
               </a:spcBef>
@@ -4244,9 +4314,6 @@
               </a:spcAft>
               <a:buNone/>
             </a:pPr>
-            <a:r>
-              <a:t/>
-            </a:r>
             <a:endParaRPr/>
           </a:p>
         </p:txBody>
@@ -4287,12 +4354,12 @@
             </a:ln>
           </p:spPr>
           <p:txBody>
-            <a:bodyPr anchorCtr="0" anchor="ctr" bIns="91425" lIns="91425" spcFirstLastPara="1" rIns="91425" wrap="square" tIns="91425">
+            <a:bodyPr spcFirstLastPara="1" wrap="square" lIns="91425" tIns="91425" rIns="91425" bIns="91425" anchor="ctr" anchorCtr="0">
               <a:noAutofit/>
             </a:bodyPr>
             <a:lstStyle/>
             <a:p>
-              <a:pPr indent="0" lvl="0" marL="0" rtl="0" algn="l">
+              <a:pPr marL="0" lvl="0" indent="0" algn="l" rtl="0">
                 <a:spcBef>
                   <a:spcPts val="0"/>
                 </a:spcBef>
@@ -4301,9 +4368,6 @@
                 </a:spcAft>
                 <a:buNone/>
               </a:pPr>
-              <a:r>
-                <a:t/>
-              </a:r>
               <a:endParaRPr/>
             </a:p>
           </p:txBody>
@@ -4330,12 +4394,12 @@
             </a:ln>
           </p:spPr>
           <p:txBody>
-            <a:bodyPr anchorCtr="0" anchor="ctr" bIns="91425" lIns="91425" spcFirstLastPara="1" rIns="91425" wrap="square" tIns="91425">
+            <a:bodyPr spcFirstLastPara="1" wrap="square" lIns="91425" tIns="91425" rIns="91425" bIns="91425" anchor="ctr" anchorCtr="0">
               <a:noAutofit/>
             </a:bodyPr>
             <a:lstStyle/>
             <a:p>
-              <a:pPr indent="0" lvl="0" marL="0" rtl="0" algn="l">
+              <a:pPr marL="0" lvl="0" indent="0" algn="l" rtl="0">
                 <a:spcBef>
                   <a:spcPts val="0"/>
                 </a:spcBef>
@@ -4344,9 +4408,6 @@
                 </a:spcAft>
                 <a:buNone/>
               </a:pPr>
-              <a:r>
-                <a:t/>
-              </a:r>
               <a:endParaRPr/>
             </a:p>
           </p:txBody>
@@ -4355,7 +4416,9 @@
       <p:sp>
         <p:nvSpPr>
           <p:cNvPr id="45" name="Google Shape;45;p6"/>
-          <p:cNvSpPr txBox="1"/>
+          <p:cNvSpPr txBox="1">
+            <a:spLocks noGrp="1"/>
+          </p:cNvSpPr>
           <p:nvPr>
             <p:ph type="title"/>
           </p:nvPr>
@@ -4370,7 +4433,7 @@
           </a:prstGeom>
         </p:spPr>
         <p:txBody>
-          <a:bodyPr anchorCtr="0" anchor="t" bIns="91425" lIns="91425" spcFirstLastPara="1" rIns="91425" wrap="square" tIns="91425">
+          <a:bodyPr spcFirstLastPara="1" wrap="square" lIns="91425" tIns="91425" rIns="91425" bIns="91425" anchor="t" anchorCtr="0">
             <a:normAutofit/>
           </a:bodyPr>
           <a:lstStyle>
@@ -4474,15 +4537,19 @@
               <a:defRPr sz="2600"/>
             </a:lvl9pPr>
           </a:lstStyle>
-          <a:p/>
+          <a:p>
+            <a:endParaRPr/>
+          </a:p>
         </p:txBody>
       </p:sp>
       <p:sp>
         <p:nvSpPr>
           <p:cNvPr id="46" name="Google Shape;46;p6"/>
-          <p:cNvSpPr txBox="1"/>
+          <p:cNvSpPr txBox="1">
+            <a:spLocks noGrp="1"/>
+          </p:cNvSpPr>
           <p:nvPr>
-            <p:ph idx="12" type="sldNum"/>
+            <p:ph type="sldNum" idx="12"/>
           </p:nvPr>
         </p:nvSpPr>
         <p:spPr>
@@ -4495,7 +4562,7 @@
           </a:prstGeom>
         </p:spPr>
         <p:txBody>
-          <a:bodyPr anchorCtr="0" anchor="ctr" bIns="91425" lIns="91425" spcFirstLastPara="1" rIns="91425" wrap="square" tIns="91425">
+          <a:bodyPr spcFirstLastPara="1" wrap="square" lIns="91425" tIns="91425" rIns="91425" bIns="91425" anchor="ctr" anchorCtr="0">
             <a:normAutofit/>
           </a:bodyPr>
           <a:lstStyle>
@@ -4537,7 +4604,7 @@
             </a:lvl9pPr>
           </a:lstStyle>
           <a:p>
-            <a:pPr indent="0" lvl="0" marL="0" rtl="0" algn="r">
+            <a:pPr marL="0" lvl="0" indent="0" algn="r" rtl="0">
               <a:spcBef>
                 <a:spcPts val="0"/>
               </a:spcBef>
@@ -4563,11 +4630,11 @@
 </file>
 
 <file path=ppt/slideLayouts/slideLayout6.xml><?xml version="1.0" encoding="utf-8"?>
-<p:sldLayout xmlns:a="http://schemas.openxmlformats.org/drawingml/2006/main" xmlns:r="http://schemas.openxmlformats.org/officeDocument/2006/relationships" xmlns:mc="http://schemas.openxmlformats.org/markup-compatibility/2006" xmlns:mv="urn:schemas-microsoft-com:mac:vml" xmlns:p="http://schemas.openxmlformats.org/presentationml/2006/main" xmlns:c="http://schemas.openxmlformats.org/drawingml/2006/chart" xmlns:dgm="http://schemas.openxmlformats.org/drawingml/2006/diagram" xmlns:o="urn:schemas-microsoft-com:office:office" xmlns:v="urn:schemas-microsoft-com:vml" xmlns:pvml="urn:schemas-microsoft-com:office:powerpoint" xmlns:com="http://schemas.openxmlformats.org/drawingml/2006/compatibility" xmlns:p14="http://schemas.microsoft.com/office/powerpoint/2010/main" xmlns:p15="http://schemas.microsoft.com/office/powerpoint/2012/main" xmlns:ahyp="http://schemas.microsoft.com/office/drawing/2018/hyperlinkcolor" matchingName="One column text">
+<p:sldLayout xmlns:a="http://schemas.openxmlformats.org/drawingml/2006/main" xmlns:r="http://schemas.openxmlformats.org/officeDocument/2006/relationships" xmlns:p="http://schemas.openxmlformats.org/presentationml/2006/main" matchingName="One column text">
   <p:cSld name="ONE_COLUMN_TEXT">
     <p:spTree>
       <p:nvGrpSpPr>
-        <p:cNvPr id="47" name="Shape 47"/>
+        <p:cNvPr id="1" name="Shape 47"/>
         <p:cNvGrpSpPr/>
         <p:nvPr/>
       </p:nvGrpSpPr>
@@ -4601,12 +4668,12 @@
           </a:ln>
         </p:spPr>
         <p:txBody>
-          <a:bodyPr anchorCtr="0" anchor="ctr" bIns="91425" lIns="91425" spcFirstLastPara="1" rIns="91425" wrap="square" tIns="91425">
+          <a:bodyPr spcFirstLastPara="1" wrap="square" lIns="91425" tIns="91425" rIns="91425" bIns="91425" anchor="ctr" anchorCtr="0">
             <a:noAutofit/>
           </a:bodyPr>
           <a:lstStyle/>
           <a:p>
-            <a:pPr indent="0" lvl="0" marL="0" rtl="0" algn="l">
+            <a:pPr marL="0" lvl="0" indent="0" algn="l" rtl="0">
               <a:spcBef>
                 <a:spcPts val="0"/>
               </a:spcBef>
@@ -4615,9 +4682,6 @@
               </a:spcAft>
               <a:buNone/>
             </a:pPr>
-            <a:r>
-              <a:t/>
-            </a:r>
             <a:endParaRPr/>
           </a:p>
         </p:txBody>
@@ -4658,12 +4722,12 @@
             </a:ln>
           </p:spPr>
           <p:txBody>
-            <a:bodyPr anchorCtr="0" anchor="ctr" bIns="91425" lIns="91425" spcFirstLastPara="1" rIns="91425" wrap="square" tIns="91425">
+            <a:bodyPr spcFirstLastPara="1" wrap="square" lIns="91425" tIns="91425" rIns="91425" bIns="91425" anchor="ctr" anchorCtr="0">
               <a:noAutofit/>
             </a:bodyPr>
             <a:lstStyle/>
             <a:p>
-              <a:pPr indent="0" lvl="0" marL="0" rtl="0" algn="l">
+              <a:pPr marL="0" lvl="0" indent="0" algn="l" rtl="0">
                 <a:spcBef>
                   <a:spcPts val="0"/>
                 </a:spcBef>
@@ -4672,9 +4736,6 @@
                 </a:spcAft>
                 <a:buNone/>
               </a:pPr>
-              <a:r>
-                <a:t/>
-              </a:r>
               <a:endParaRPr/>
             </a:p>
           </p:txBody>
@@ -4701,12 +4762,12 @@
             </a:ln>
           </p:spPr>
           <p:txBody>
-            <a:bodyPr anchorCtr="0" anchor="ctr" bIns="91425" lIns="91425" spcFirstLastPara="1" rIns="91425" wrap="square" tIns="91425">
+            <a:bodyPr spcFirstLastPara="1" wrap="square" lIns="91425" tIns="91425" rIns="91425" bIns="91425" anchor="ctr" anchorCtr="0">
               <a:noAutofit/>
             </a:bodyPr>
             <a:lstStyle/>
             <a:p>
-              <a:pPr indent="0" lvl="0" marL="0" rtl="0" algn="l">
+              <a:pPr marL="0" lvl="0" indent="0" algn="l" rtl="0">
                 <a:spcBef>
                   <a:spcPts val="0"/>
                 </a:spcBef>
@@ -4715,9 +4776,6 @@
                 </a:spcAft>
                 <a:buNone/>
               </a:pPr>
-              <a:r>
-                <a:t/>
-              </a:r>
               <a:endParaRPr/>
             </a:p>
           </p:txBody>
@@ -4726,7 +4784,9 @@
       <p:sp>
         <p:nvSpPr>
           <p:cNvPr id="52" name="Google Shape;52;p7"/>
-          <p:cNvSpPr txBox="1"/>
+          <p:cNvSpPr txBox="1">
+            <a:spLocks noGrp="1"/>
+          </p:cNvSpPr>
           <p:nvPr>
             <p:ph type="title"/>
           </p:nvPr>
@@ -4741,7 +4801,7 @@
           </a:prstGeom>
         </p:spPr>
         <p:txBody>
-          <a:bodyPr anchorCtr="0" anchor="t" bIns="91425" lIns="91425" spcFirstLastPara="1" rIns="91425" wrap="square" tIns="91425">
+          <a:bodyPr spcFirstLastPara="1" wrap="square" lIns="91425" tIns="91425" rIns="91425" bIns="91425" anchor="t" anchorCtr="0">
             <a:normAutofit/>
           </a:bodyPr>
           <a:lstStyle>
@@ -4845,15 +4905,19 @@
               <a:defRPr sz="2600"/>
             </a:lvl9pPr>
           </a:lstStyle>
-          <a:p/>
+          <a:p>
+            <a:endParaRPr/>
+          </a:p>
         </p:txBody>
       </p:sp>
       <p:sp>
         <p:nvSpPr>
           <p:cNvPr id="53" name="Google Shape;53;p7"/>
-          <p:cNvSpPr txBox="1"/>
+          <p:cNvSpPr txBox="1">
+            <a:spLocks noGrp="1"/>
+          </p:cNvSpPr>
           <p:nvPr>
-            <p:ph idx="1" type="body"/>
+            <p:ph type="body" idx="1"/>
           </p:nvPr>
         </p:nvSpPr>
         <p:spPr>
@@ -4866,11 +4930,11 @@
           </a:prstGeom>
         </p:spPr>
         <p:txBody>
-          <a:bodyPr anchorCtr="0" anchor="t" bIns="91425" lIns="91425" spcFirstLastPara="1" rIns="91425" wrap="square" tIns="91425">
+          <a:bodyPr spcFirstLastPara="1" wrap="square" lIns="91425" tIns="91425" rIns="91425" bIns="91425" anchor="t" anchorCtr="0">
             <a:normAutofit/>
           </a:bodyPr>
           <a:lstStyle>
-            <a:lvl1pPr indent="-311150" lvl="0" marL="457200">
+            <a:lvl1pPr marL="457200" lvl="0" indent="-311150">
               <a:spcBef>
                 <a:spcPts val="0"/>
               </a:spcBef>
@@ -4881,7 +4945,7 @@
               <a:buChar char="●"/>
               <a:defRPr/>
             </a:lvl1pPr>
-            <a:lvl2pPr indent="-298450" lvl="1" marL="914400">
+            <a:lvl2pPr marL="914400" lvl="1" indent="-298450">
               <a:spcBef>
                 <a:spcPts val="0"/>
               </a:spcBef>
@@ -4892,7 +4956,7 @@
               <a:buChar char="○"/>
               <a:defRPr/>
             </a:lvl2pPr>
-            <a:lvl3pPr indent="-298450" lvl="2" marL="1371600">
+            <a:lvl3pPr marL="1371600" lvl="2" indent="-298450">
               <a:spcBef>
                 <a:spcPts val="0"/>
               </a:spcBef>
@@ -4903,7 +4967,7 @@
               <a:buChar char="■"/>
               <a:defRPr/>
             </a:lvl3pPr>
-            <a:lvl4pPr indent="-298450" lvl="3" marL="1828800">
+            <a:lvl4pPr marL="1828800" lvl="3" indent="-298450">
               <a:spcBef>
                 <a:spcPts val="0"/>
               </a:spcBef>
@@ -4914,7 +4978,7 @@
               <a:buChar char="●"/>
               <a:defRPr/>
             </a:lvl4pPr>
-            <a:lvl5pPr indent="-298450" lvl="4" marL="2286000">
+            <a:lvl5pPr marL="2286000" lvl="4" indent="-298450">
               <a:spcBef>
                 <a:spcPts val="0"/>
               </a:spcBef>
@@ -4925,7 +4989,7 @@
               <a:buChar char="○"/>
               <a:defRPr/>
             </a:lvl5pPr>
-            <a:lvl6pPr indent="-298450" lvl="5" marL="2743200">
+            <a:lvl6pPr marL="2743200" lvl="5" indent="-298450">
               <a:spcBef>
                 <a:spcPts val="0"/>
               </a:spcBef>
@@ -4936,7 +5000,7 @@
               <a:buChar char="■"/>
               <a:defRPr/>
             </a:lvl6pPr>
-            <a:lvl7pPr indent="-298450" lvl="6" marL="3200400">
+            <a:lvl7pPr marL="3200400" lvl="6" indent="-298450">
               <a:spcBef>
                 <a:spcPts val="0"/>
               </a:spcBef>
@@ -4947,7 +5011,7 @@
               <a:buChar char="●"/>
               <a:defRPr/>
             </a:lvl7pPr>
-            <a:lvl8pPr indent="-298450" lvl="7" marL="3657600">
+            <a:lvl8pPr marL="3657600" lvl="7" indent="-298450">
               <a:spcBef>
                 <a:spcPts val="0"/>
               </a:spcBef>
@@ -4958,7 +5022,7 @@
               <a:buChar char="○"/>
               <a:defRPr/>
             </a:lvl8pPr>
-            <a:lvl9pPr indent="-298450" lvl="8" marL="4114800">
+            <a:lvl9pPr marL="4114800" lvl="8" indent="-298450">
               <a:spcBef>
                 <a:spcPts val="0"/>
               </a:spcBef>
@@ -4970,15 +5034,19 @@
               <a:defRPr/>
             </a:lvl9pPr>
           </a:lstStyle>
-          <a:p/>
+          <a:p>
+            <a:endParaRPr/>
+          </a:p>
         </p:txBody>
       </p:sp>
       <p:sp>
         <p:nvSpPr>
           <p:cNvPr id="54" name="Google Shape;54;p7"/>
-          <p:cNvSpPr txBox="1"/>
+          <p:cNvSpPr txBox="1">
+            <a:spLocks noGrp="1"/>
+          </p:cNvSpPr>
           <p:nvPr>
-            <p:ph idx="12" type="sldNum"/>
+            <p:ph type="sldNum" idx="12"/>
           </p:nvPr>
         </p:nvSpPr>
         <p:spPr>
@@ -4991,7 +5059,7 @@
           </a:prstGeom>
         </p:spPr>
         <p:txBody>
-          <a:bodyPr anchorCtr="0" anchor="ctr" bIns="91425" lIns="91425" spcFirstLastPara="1" rIns="91425" wrap="square" tIns="91425">
+          <a:bodyPr spcFirstLastPara="1" wrap="square" lIns="91425" tIns="91425" rIns="91425" bIns="91425" anchor="ctr" anchorCtr="0">
             <a:normAutofit/>
           </a:bodyPr>
           <a:lstStyle>
@@ -5033,7 +5101,7 @@
             </a:lvl9pPr>
           </a:lstStyle>
           <a:p>
-            <a:pPr indent="0" lvl="0" marL="0" rtl="0" algn="r">
+            <a:pPr marL="0" lvl="0" indent="0" algn="r" rtl="0">
               <a:spcBef>
                 <a:spcPts val="0"/>
               </a:spcBef>
@@ -5059,18 +5127,19 @@
 </file>
 
 <file path=ppt/slideLayouts/slideLayout7.xml><?xml version="1.0" encoding="utf-8"?>
-<p:sldLayout xmlns:a="http://schemas.openxmlformats.org/drawingml/2006/main" xmlns:r="http://schemas.openxmlformats.org/officeDocument/2006/relationships" xmlns:mc="http://schemas.openxmlformats.org/markup-compatibility/2006" xmlns:mv="urn:schemas-microsoft-com:mac:vml" xmlns:p="http://schemas.openxmlformats.org/presentationml/2006/main" xmlns:c="http://schemas.openxmlformats.org/drawingml/2006/chart" xmlns:dgm="http://schemas.openxmlformats.org/drawingml/2006/diagram" xmlns:o="urn:schemas-microsoft-com:office:office" xmlns:v="urn:schemas-microsoft-com:vml" xmlns:pvml="urn:schemas-microsoft-com:office:powerpoint" xmlns:com="http://schemas.openxmlformats.org/drawingml/2006/compatibility" xmlns:p14="http://schemas.microsoft.com/office/powerpoint/2010/main" xmlns:p15="http://schemas.microsoft.com/office/powerpoint/2012/main" xmlns:ahyp="http://schemas.microsoft.com/office/drawing/2018/hyperlinkcolor" matchingName="Main point">
+<p:sldLayout xmlns:a="http://schemas.openxmlformats.org/drawingml/2006/main" xmlns:r="http://schemas.openxmlformats.org/officeDocument/2006/relationships" xmlns:p="http://schemas.openxmlformats.org/presentationml/2006/main" matchingName="Main point">
   <p:cSld name="MAIN_POINT">
     <p:bg>
       <p:bgPr>
         <a:solidFill>
           <a:schemeClr val="accent3"/>
         </a:solidFill>
+        <a:effectLst/>
       </p:bgPr>
     </p:bg>
     <p:spTree>
       <p:nvGrpSpPr>
-        <p:cNvPr id="55" name="Shape 55"/>
+        <p:cNvPr id="1" name="Shape 55"/>
         <p:cNvGrpSpPr/>
         <p:nvPr/>
       </p:nvGrpSpPr>
@@ -5118,12 +5187,12 @@
             </a:ln>
           </p:spPr>
           <p:txBody>
-            <a:bodyPr anchorCtr="0" anchor="ctr" bIns="91425" lIns="91425" spcFirstLastPara="1" rIns="91425" wrap="square" tIns="91425">
+            <a:bodyPr spcFirstLastPara="1" wrap="square" lIns="91425" tIns="91425" rIns="91425" bIns="91425" anchor="ctr" anchorCtr="0">
               <a:noAutofit/>
             </a:bodyPr>
             <a:lstStyle/>
             <a:p>
-              <a:pPr indent="0" lvl="0" marL="0" rtl="0" algn="l">
+              <a:pPr marL="0" lvl="0" indent="0" algn="l" rtl="0">
                 <a:spcBef>
                   <a:spcPts val="0"/>
                 </a:spcBef>
@@ -5132,9 +5201,6 @@
                 </a:spcAft>
                 <a:buNone/>
               </a:pPr>
-              <a:r>
-                <a:t/>
-              </a:r>
               <a:endParaRPr/>
             </a:p>
           </p:txBody>
@@ -5161,12 +5227,12 @@
             </a:ln>
           </p:spPr>
           <p:txBody>
-            <a:bodyPr anchorCtr="0" anchor="ctr" bIns="91425" lIns="91425" spcFirstLastPara="1" rIns="91425" wrap="square" tIns="91425">
+            <a:bodyPr spcFirstLastPara="1" wrap="square" lIns="91425" tIns="91425" rIns="91425" bIns="91425" anchor="ctr" anchorCtr="0">
               <a:noAutofit/>
             </a:bodyPr>
             <a:lstStyle/>
             <a:p>
-              <a:pPr indent="0" lvl="0" marL="0" rtl="0" algn="l">
+              <a:pPr marL="0" lvl="0" indent="0" algn="l" rtl="0">
                 <a:spcBef>
                   <a:spcPts val="0"/>
                 </a:spcBef>
@@ -5175,9 +5241,6 @@
                 </a:spcAft>
                 <a:buNone/>
               </a:pPr>
-              <a:r>
-                <a:t/>
-              </a:r>
               <a:endParaRPr/>
             </a:p>
           </p:txBody>
@@ -5186,7 +5249,9 @@
       <p:sp>
         <p:nvSpPr>
           <p:cNvPr id="59" name="Google Shape;59;p8"/>
-          <p:cNvSpPr txBox="1"/>
+          <p:cNvSpPr txBox="1">
+            <a:spLocks noGrp="1"/>
+          </p:cNvSpPr>
           <p:nvPr>
             <p:ph type="title"/>
           </p:nvPr>
@@ -5201,7 +5266,7 @@
           </a:prstGeom>
         </p:spPr>
         <p:txBody>
-          <a:bodyPr anchorCtr="0" anchor="ctr" bIns="91425" lIns="91425" spcFirstLastPara="1" rIns="91425" wrap="square" tIns="91425">
+          <a:bodyPr spcFirstLastPara="1" wrap="square" lIns="91425" tIns="91425" rIns="91425" bIns="91425" anchor="ctr" anchorCtr="0">
             <a:normAutofit/>
           </a:bodyPr>
           <a:lstStyle>
@@ -5368,15 +5433,19 @@
               </a:defRPr>
             </a:lvl9pPr>
           </a:lstStyle>
-          <a:p/>
+          <a:p>
+            <a:endParaRPr/>
+          </a:p>
         </p:txBody>
       </p:sp>
       <p:sp>
         <p:nvSpPr>
           <p:cNvPr id="60" name="Google Shape;60;p8"/>
-          <p:cNvSpPr txBox="1"/>
+          <p:cNvSpPr txBox="1">
+            <a:spLocks noGrp="1"/>
+          </p:cNvSpPr>
           <p:nvPr>
-            <p:ph idx="12" type="sldNum"/>
+            <p:ph type="sldNum" idx="12"/>
           </p:nvPr>
         </p:nvSpPr>
         <p:spPr>
@@ -5389,7 +5458,7 @@
           </a:prstGeom>
         </p:spPr>
         <p:txBody>
-          <a:bodyPr anchorCtr="0" anchor="ctr" bIns="91425" lIns="91425" spcFirstLastPara="1" rIns="91425" wrap="square" tIns="91425">
+          <a:bodyPr spcFirstLastPara="1" wrap="square" lIns="91425" tIns="91425" rIns="91425" bIns="91425" anchor="ctr" anchorCtr="0">
             <a:normAutofit/>
           </a:bodyPr>
           <a:lstStyle>
@@ -5467,7 +5536,7 @@
             </a:lvl9pPr>
           </a:lstStyle>
           <a:p>
-            <a:pPr indent="0" lvl="0" marL="0" rtl="0" algn="r">
+            <a:pPr marL="0" lvl="0" indent="0" algn="r" rtl="0">
               <a:spcBef>
                 <a:spcPts val="0"/>
               </a:spcBef>
@@ -5493,11 +5562,11 @@
 </file>
 
 <file path=ppt/slideLayouts/slideLayout8.xml><?xml version="1.0" encoding="utf-8"?>
-<p:sldLayout xmlns:a="http://schemas.openxmlformats.org/drawingml/2006/main" xmlns:r="http://schemas.openxmlformats.org/officeDocument/2006/relationships" xmlns:mc="http://schemas.openxmlformats.org/markup-compatibility/2006" xmlns:mv="urn:schemas-microsoft-com:mac:vml" xmlns:p="http://schemas.openxmlformats.org/presentationml/2006/main" xmlns:c="http://schemas.openxmlformats.org/drawingml/2006/chart" xmlns:dgm="http://schemas.openxmlformats.org/drawingml/2006/diagram" xmlns:o="urn:schemas-microsoft-com:office:office" xmlns:v="urn:schemas-microsoft-com:vml" xmlns:pvml="urn:schemas-microsoft-com:office:powerpoint" xmlns:com="http://schemas.openxmlformats.org/drawingml/2006/compatibility" xmlns:p14="http://schemas.microsoft.com/office/powerpoint/2010/main" xmlns:p15="http://schemas.microsoft.com/office/powerpoint/2012/main" xmlns:ahyp="http://schemas.microsoft.com/office/drawing/2018/hyperlinkcolor" matchingName="Section title and description">
+<p:sldLayout xmlns:a="http://schemas.openxmlformats.org/drawingml/2006/main" xmlns:r="http://schemas.openxmlformats.org/officeDocument/2006/relationships" xmlns:p="http://schemas.openxmlformats.org/presentationml/2006/main" matchingName="Section title and description">
   <p:cSld name="SECTION_TITLE_AND_DESCRIPTION">
     <p:spTree>
       <p:nvGrpSpPr>
-        <p:cNvPr id="61" name="Shape 61"/>
+        <p:cNvPr id="1" name="Shape 61"/>
         <p:cNvGrpSpPr/>
         <p:nvPr/>
       </p:nvGrpSpPr>
@@ -5531,12 +5600,12 @@
           </a:ln>
         </p:spPr>
         <p:txBody>
-          <a:bodyPr anchorCtr="0" anchor="ctr" bIns="91425" lIns="91425" spcFirstLastPara="1" rIns="91425" wrap="square" tIns="91425">
+          <a:bodyPr spcFirstLastPara="1" wrap="square" lIns="91425" tIns="91425" rIns="91425" bIns="91425" anchor="ctr" anchorCtr="0">
             <a:noAutofit/>
           </a:bodyPr>
           <a:lstStyle/>
           <a:p>
-            <a:pPr indent="0" lvl="0" marL="0" rtl="0" algn="l">
+            <a:pPr marL="0" lvl="0" indent="0" algn="l" rtl="0">
               <a:spcBef>
                 <a:spcPts val="0"/>
               </a:spcBef>
@@ -5545,9 +5614,6 @@
               </a:spcAft>
               <a:buNone/>
             </a:pPr>
-            <a:r>
-              <a:t/>
-            </a:r>
             <a:endParaRPr/>
           </a:p>
         </p:txBody>
@@ -5588,12 +5654,12 @@
             </a:ln>
           </p:spPr>
           <p:txBody>
-            <a:bodyPr anchorCtr="0" anchor="ctr" bIns="91425" lIns="91425" spcFirstLastPara="1" rIns="91425" wrap="square" tIns="91425">
+            <a:bodyPr spcFirstLastPara="1" wrap="square" lIns="91425" tIns="91425" rIns="91425" bIns="91425" anchor="ctr" anchorCtr="0">
               <a:noAutofit/>
             </a:bodyPr>
             <a:lstStyle/>
             <a:p>
-              <a:pPr indent="0" lvl="0" marL="0" rtl="0" algn="l">
+              <a:pPr marL="0" lvl="0" indent="0" algn="l" rtl="0">
                 <a:spcBef>
                   <a:spcPts val="0"/>
                 </a:spcBef>
@@ -5602,9 +5668,6 @@
                 </a:spcAft>
                 <a:buNone/>
               </a:pPr>
-              <a:r>
-                <a:t/>
-              </a:r>
               <a:endParaRPr/>
             </a:p>
           </p:txBody>
@@ -5631,12 +5694,12 @@
             </a:ln>
           </p:spPr>
           <p:txBody>
-            <a:bodyPr anchorCtr="0" anchor="ctr" bIns="91425" lIns="91425" spcFirstLastPara="1" rIns="91425" wrap="square" tIns="91425">
+            <a:bodyPr spcFirstLastPara="1" wrap="square" lIns="91425" tIns="91425" rIns="91425" bIns="91425" anchor="ctr" anchorCtr="0">
               <a:noAutofit/>
             </a:bodyPr>
             <a:lstStyle/>
             <a:p>
-              <a:pPr indent="0" lvl="0" marL="0" rtl="0" algn="l">
+              <a:pPr marL="0" lvl="0" indent="0" algn="l" rtl="0">
                 <a:spcBef>
                   <a:spcPts val="0"/>
                 </a:spcBef>
@@ -5645,9 +5708,6 @@
                 </a:spcAft>
                 <a:buNone/>
               </a:pPr>
-              <a:r>
-                <a:t/>
-              </a:r>
               <a:endParaRPr/>
             </a:p>
           </p:txBody>
@@ -5656,7 +5716,9 @@
       <p:sp>
         <p:nvSpPr>
           <p:cNvPr id="66" name="Google Shape;66;p9"/>
-          <p:cNvSpPr txBox="1"/>
+          <p:cNvSpPr txBox="1">
+            <a:spLocks noGrp="1"/>
+          </p:cNvSpPr>
           <p:nvPr>
             <p:ph type="title"/>
           </p:nvPr>
@@ -5671,7 +5733,7 @@
           </a:prstGeom>
         </p:spPr>
         <p:txBody>
-          <a:bodyPr anchorCtr="0" anchor="t" bIns="91425" lIns="91425" spcFirstLastPara="1" rIns="91425" wrap="square" tIns="91425">
+          <a:bodyPr spcFirstLastPara="1" wrap="square" lIns="91425" tIns="91425" rIns="91425" bIns="91425" anchor="t" anchorCtr="0">
             <a:normAutofit/>
           </a:bodyPr>
           <a:lstStyle>
@@ -5775,15 +5837,19 @@
               <a:defRPr sz="2600"/>
             </a:lvl9pPr>
           </a:lstStyle>
-          <a:p/>
+          <a:p>
+            <a:endParaRPr/>
+          </a:p>
         </p:txBody>
       </p:sp>
       <p:sp>
         <p:nvSpPr>
           <p:cNvPr id="67" name="Google Shape;67;p9"/>
-          <p:cNvSpPr txBox="1"/>
+          <p:cNvSpPr txBox="1">
+            <a:spLocks noGrp="1"/>
+          </p:cNvSpPr>
           <p:nvPr>
-            <p:ph idx="1" type="subTitle"/>
+            <p:ph type="subTitle" idx="1"/>
           </p:nvPr>
         </p:nvSpPr>
         <p:spPr>
@@ -5796,7 +5862,7 @@
           </a:prstGeom>
         </p:spPr>
         <p:txBody>
-          <a:bodyPr anchorCtr="0" anchor="t" bIns="91425" lIns="91425" spcFirstLastPara="1" rIns="91425" wrap="square" tIns="91425">
+          <a:bodyPr spcFirstLastPara="1" wrap="square" lIns="91425" tIns="91425" rIns="91425" bIns="91425" anchor="t" anchorCtr="0">
             <a:normAutofit/>
           </a:bodyPr>
           <a:lstStyle>
@@ -5927,15 +5993,19 @@
               <a:defRPr sz="1600"/>
             </a:lvl9pPr>
           </a:lstStyle>
-          <a:p/>
+          <a:p>
+            <a:endParaRPr/>
+          </a:p>
         </p:txBody>
       </p:sp>
       <p:sp>
         <p:nvSpPr>
           <p:cNvPr id="68" name="Google Shape;68;p9"/>
-          <p:cNvSpPr txBox="1"/>
+          <p:cNvSpPr txBox="1">
+            <a:spLocks noGrp="1"/>
+          </p:cNvSpPr>
           <p:nvPr>
-            <p:ph idx="2" type="body"/>
+            <p:ph type="body" idx="2"/>
           </p:nvPr>
         </p:nvSpPr>
         <p:spPr>
@@ -5948,11 +6018,11 @@
           </a:prstGeom>
         </p:spPr>
         <p:txBody>
-          <a:bodyPr anchorCtr="0" anchor="t" bIns="91425" lIns="91425" spcFirstLastPara="1" rIns="91425" wrap="square" tIns="91425">
+          <a:bodyPr spcFirstLastPara="1" wrap="square" lIns="91425" tIns="91425" rIns="91425" bIns="91425" anchor="t" anchorCtr="0">
             <a:normAutofit/>
           </a:bodyPr>
           <a:lstStyle>
-            <a:lvl1pPr indent="-311150" lvl="0" marL="457200">
+            <a:lvl1pPr marL="457200" lvl="0" indent="-311150">
               <a:spcBef>
                 <a:spcPts val="0"/>
               </a:spcBef>
@@ -5963,7 +6033,7 @@
               <a:buChar char="●"/>
               <a:defRPr/>
             </a:lvl1pPr>
-            <a:lvl2pPr indent="-298450" lvl="1" marL="914400">
+            <a:lvl2pPr marL="914400" lvl="1" indent="-298450">
               <a:spcBef>
                 <a:spcPts val="0"/>
               </a:spcBef>
@@ -5974,7 +6044,7 @@
               <a:buChar char="○"/>
               <a:defRPr/>
             </a:lvl2pPr>
-            <a:lvl3pPr indent="-298450" lvl="2" marL="1371600">
+            <a:lvl3pPr marL="1371600" lvl="2" indent="-298450">
               <a:spcBef>
                 <a:spcPts val="0"/>
               </a:spcBef>
@@ -5985,7 +6055,7 @@
               <a:buChar char="■"/>
               <a:defRPr/>
             </a:lvl3pPr>
-            <a:lvl4pPr indent="-298450" lvl="3" marL="1828800">
+            <a:lvl4pPr marL="1828800" lvl="3" indent="-298450">
               <a:spcBef>
                 <a:spcPts val="0"/>
               </a:spcBef>
@@ -5996,7 +6066,7 @@
               <a:buChar char="●"/>
               <a:defRPr/>
             </a:lvl4pPr>
-            <a:lvl5pPr indent="-298450" lvl="4" marL="2286000">
+            <a:lvl5pPr marL="2286000" lvl="4" indent="-298450">
               <a:spcBef>
                 <a:spcPts val="0"/>
               </a:spcBef>
@@ -6007,7 +6077,7 @@
               <a:buChar char="○"/>
               <a:defRPr/>
             </a:lvl5pPr>
-            <a:lvl6pPr indent="-298450" lvl="5" marL="2743200">
+            <a:lvl6pPr marL="2743200" lvl="5" indent="-298450">
               <a:spcBef>
                 <a:spcPts val="0"/>
               </a:spcBef>
@@ -6018,7 +6088,7 @@
               <a:buChar char="■"/>
               <a:defRPr/>
             </a:lvl6pPr>
-            <a:lvl7pPr indent="-298450" lvl="6" marL="3200400">
+            <a:lvl7pPr marL="3200400" lvl="6" indent="-298450">
               <a:spcBef>
                 <a:spcPts val="0"/>
               </a:spcBef>
@@ -6029,7 +6099,7 @@
               <a:buChar char="●"/>
               <a:defRPr/>
             </a:lvl7pPr>
-            <a:lvl8pPr indent="-298450" lvl="7" marL="3657600">
+            <a:lvl8pPr marL="3657600" lvl="7" indent="-298450">
               <a:spcBef>
                 <a:spcPts val="0"/>
               </a:spcBef>
@@ -6040,7 +6110,7 @@
               <a:buChar char="○"/>
               <a:defRPr/>
             </a:lvl8pPr>
-            <a:lvl9pPr indent="-298450" lvl="8" marL="4114800">
+            <a:lvl9pPr marL="4114800" lvl="8" indent="-298450">
               <a:spcBef>
                 <a:spcPts val="0"/>
               </a:spcBef>
@@ -6052,15 +6122,19 @@
               <a:defRPr/>
             </a:lvl9pPr>
           </a:lstStyle>
-          <a:p/>
+          <a:p>
+            <a:endParaRPr/>
+          </a:p>
         </p:txBody>
       </p:sp>
       <p:sp>
         <p:nvSpPr>
           <p:cNvPr id="69" name="Google Shape;69;p9"/>
-          <p:cNvSpPr txBox="1"/>
+          <p:cNvSpPr txBox="1">
+            <a:spLocks noGrp="1"/>
+          </p:cNvSpPr>
           <p:nvPr>
-            <p:ph idx="12" type="sldNum"/>
+            <p:ph type="sldNum" idx="12"/>
           </p:nvPr>
         </p:nvSpPr>
         <p:spPr>
@@ -6073,7 +6147,7 @@
           </a:prstGeom>
         </p:spPr>
         <p:txBody>
-          <a:bodyPr anchorCtr="0" anchor="ctr" bIns="91425" lIns="91425" spcFirstLastPara="1" rIns="91425" wrap="square" tIns="91425">
+          <a:bodyPr spcFirstLastPara="1" wrap="square" lIns="91425" tIns="91425" rIns="91425" bIns="91425" anchor="ctr" anchorCtr="0">
             <a:normAutofit/>
           </a:bodyPr>
           <a:lstStyle>
@@ -6115,7 +6189,7 @@
             </a:lvl9pPr>
           </a:lstStyle>
           <a:p>
-            <a:pPr indent="0" lvl="0" marL="0" rtl="0" algn="r">
+            <a:pPr marL="0" lvl="0" indent="0" algn="r" rtl="0">
               <a:spcBef>
                 <a:spcPts val="0"/>
               </a:spcBef>
@@ -6141,11 +6215,11 @@
 </file>
 
 <file path=ppt/slideLayouts/slideLayout9.xml><?xml version="1.0" encoding="utf-8"?>
-<p:sldLayout xmlns:a="http://schemas.openxmlformats.org/drawingml/2006/main" xmlns:r="http://schemas.openxmlformats.org/officeDocument/2006/relationships" xmlns:mc="http://schemas.openxmlformats.org/markup-compatibility/2006" xmlns:mv="urn:schemas-microsoft-com:mac:vml" xmlns:p="http://schemas.openxmlformats.org/presentationml/2006/main" xmlns:c="http://schemas.openxmlformats.org/drawingml/2006/chart" xmlns:dgm="http://schemas.openxmlformats.org/drawingml/2006/diagram" xmlns:o="urn:schemas-microsoft-com:office:office" xmlns:v="urn:schemas-microsoft-com:vml" xmlns:pvml="urn:schemas-microsoft-com:office:powerpoint" xmlns:com="http://schemas.openxmlformats.org/drawingml/2006/compatibility" xmlns:p14="http://schemas.microsoft.com/office/powerpoint/2010/main" xmlns:p15="http://schemas.microsoft.com/office/powerpoint/2012/main" xmlns:ahyp="http://schemas.microsoft.com/office/drawing/2018/hyperlinkcolor" matchingName="Caption">
+<p:sldLayout xmlns:a="http://schemas.openxmlformats.org/drawingml/2006/main" xmlns:r="http://schemas.openxmlformats.org/officeDocument/2006/relationships" xmlns:p="http://schemas.openxmlformats.org/presentationml/2006/main" matchingName="Caption">
   <p:cSld name="CAPTION_ONLY">
     <p:spTree>
       <p:nvGrpSpPr>
-        <p:cNvPr id="70" name="Shape 70"/>
+        <p:cNvPr id="1" name="Shape 70"/>
         <p:cNvGrpSpPr/>
         <p:nvPr/>
       </p:nvGrpSpPr>
@@ -6160,9 +6234,11 @@
       <p:sp>
         <p:nvSpPr>
           <p:cNvPr id="71" name="Google Shape;71;p10"/>
-          <p:cNvSpPr txBox="1"/>
+          <p:cNvSpPr txBox="1">
+            <a:spLocks noGrp="1"/>
+          </p:cNvSpPr>
           <p:nvPr>
-            <p:ph idx="1" type="body"/>
+            <p:ph type="body" idx="1"/>
           </p:nvPr>
         </p:nvSpPr>
         <p:spPr>
@@ -6175,11 +6251,11 @@
           </a:prstGeom>
         </p:spPr>
         <p:txBody>
-          <a:bodyPr anchorCtr="0" anchor="ctr" bIns="91425" lIns="91425" spcFirstLastPara="1" rIns="91425" wrap="square" tIns="91425">
+          <a:bodyPr spcFirstLastPara="1" wrap="square" lIns="91425" tIns="91425" rIns="91425" bIns="91425" anchor="ctr" anchorCtr="0">
             <a:normAutofit/>
           </a:bodyPr>
           <a:lstStyle>
-            <a:lvl1pPr indent="-228600" lvl="0" marL="457200">
+            <a:lvl1pPr marL="457200" lvl="0" indent="-228600">
               <a:lnSpc>
                 <a:spcPct val="100000"/>
               </a:lnSpc>
@@ -6194,15 +6270,19 @@
               <a:defRPr/>
             </a:lvl1pPr>
           </a:lstStyle>
-          <a:p/>
+          <a:p>
+            <a:endParaRPr/>
+          </a:p>
         </p:txBody>
       </p:sp>
       <p:sp>
         <p:nvSpPr>
           <p:cNvPr id="72" name="Google Shape;72;p10"/>
-          <p:cNvSpPr txBox="1"/>
+          <p:cNvSpPr txBox="1">
+            <a:spLocks noGrp="1"/>
+          </p:cNvSpPr>
           <p:nvPr>
-            <p:ph idx="12" type="sldNum"/>
+            <p:ph type="sldNum" idx="12"/>
           </p:nvPr>
         </p:nvSpPr>
         <p:spPr>
@@ -6215,7 +6295,7 @@
           </a:prstGeom>
         </p:spPr>
         <p:txBody>
-          <a:bodyPr anchorCtr="0" anchor="ctr" bIns="91425" lIns="91425" spcFirstLastPara="1" rIns="91425" wrap="square" tIns="91425">
+          <a:bodyPr spcFirstLastPara="1" wrap="square" lIns="91425" tIns="91425" rIns="91425" bIns="91425" anchor="ctr" anchorCtr="0">
             <a:normAutofit/>
           </a:bodyPr>
           <a:lstStyle>
@@ -6257,7 +6337,7 @@
             </a:lvl9pPr>
           </a:lstStyle>
           <a:p>
-            <a:pPr indent="0" lvl="0" marL="0" rtl="0" algn="r">
+            <a:pPr marL="0" lvl="0" indent="0" algn="r" rtl="0">
               <a:spcBef>
                 <a:spcPts val="0"/>
               </a:spcBef>
@@ -6283,18 +6363,19 @@
 </file>
 
 <file path=ppt/slideMasters/slideMaster1.xml><?xml version="1.0" encoding="utf-8"?>
-<p:sldMaster xmlns:a="http://schemas.openxmlformats.org/drawingml/2006/main" xmlns:r="http://schemas.openxmlformats.org/officeDocument/2006/relationships" xmlns:mc="http://schemas.openxmlformats.org/markup-compatibility/2006" xmlns:mv="urn:schemas-microsoft-com:mac:vml" xmlns:p="http://schemas.openxmlformats.org/presentationml/2006/main" xmlns:c="http://schemas.openxmlformats.org/drawingml/2006/chart" xmlns:dgm="http://schemas.openxmlformats.org/drawingml/2006/diagram" xmlns:o="urn:schemas-microsoft-com:office:office" xmlns:v="urn:schemas-microsoft-com:vml" xmlns:pvml="urn:schemas-microsoft-com:office:powerpoint" xmlns:com="http://schemas.openxmlformats.org/drawingml/2006/compatibility" xmlns:p14="http://schemas.microsoft.com/office/powerpoint/2010/main" xmlns:p15="http://schemas.microsoft.com/office/powerpoint/2012/main" xmlns:ahyp="http://schemas.microsoft.com/office/drawing/2018/hyperlinkcolor">
+<p:sldMaster xmlns:a="http://schemas.openxmlformats.org/drawingml/2006/main" xmlns:r="http://schemas.openxmlformats.org/officeDocument/2006/relationships" xmlns:p="http://schemas.openxmlformats.org/presentationml/2006/main">
   <p:cSld name="streamline">
     <p:bg>
       <p:bgPr>
         <a:solidFill>
           <a:schemeClr val="lt1"/>
         </a:solidFill>
+        <a:effectLst/>
       </p:bgPr>
     </p:bg>
     <p:spTree>
       <p:nvGrpSpPr>
-        <p:cNvPr id="5" name="Shape 5"/>
+        <p:cNvPr id="1" name="Shape 5"/>
         <p:cNvGrpSpPr/>
         <p:nvPr/>
       </p:nvGrpSpPr>
@@ -6309,7 +6390,9 @@
       <p:sp>
         <p:nvSpPr>
           <p:cNvPr id="6" name="Google Shape;6;p1"/>
-          <p:cNvSpPr txBox="1"/>
+          <p:cNvSpPr txBox="1">
+            <a:spLocks noGrp="1"/>
+          </p:cNvSpPr>
           <p:nvPr>
             <p:ph type="title"/>
           </p:nvPr>
@@ -6328,7 +6411,7 @@
           </a:ln>
         </p:spPr>
         <p:txBody>
-          <a:bodyPr anchorCtr="0" anchor="t" bIns="91425" lIns="91425" spcFirstLastPara="1" rIns="91425" wrap="square" tIns="91425">
+          <a:bodyPr spcFirstLastPara="1" wrap="square" lIns="91425" tIns="91425" rIns="91425" bIns="91425" anchor="t" anchorCtr="0">
             <a:normAutofit/>
           </a:bodyPr>
           <a:lstStyle>
@@ -6345,7 +6428,7 @@
               <a:buSzPts val="2800"/>
               <a:buFont typeface="Raleway"/>
               <a:buNone/>
-              <a:defRPr b="1" sz="2800">
+              <a:defRPr sz="2800" b="1">
                 <a:solidFill>
                   <a:schemeClr val="dk2"/>
                 </a:solidFill>
@@ -6368,7 +6451,7 @@
               <a:buSzPts val="2800"/>
               <a:buFont typeface="Raleway"/>
               <a:buNone/>
-              <a:defRPr b="1" sz="2800">
+              <a:defRPr sz="2800" b="1">
                 <a:solidFill>
                   <a:schemeClr val="dk2"/>
                 </a:solidFill>
@@ -6391,7 +6474,7 @@
               <a:buSzPts val="2800"/>
               <a:buFont typeface="Raleway"/>
               <a:buNone/>
-              <a:defRPr b="1" sz="2800">
+              <a:defRPr sz="2800" b="1">
                 <a:solidFill>
                   <a:schemeClr val="dk2"/>
                 </a:solidFill>
@@ -6414,7 +6497,7 @@
               <a:buSzPts val="2800"/>
               <a:buFont typeface="Raleway"/>
               <a:buNone/>
-              <a:defRPr b="1" sz="2800">
+              <a:defRPr sz="2800" b="1">
                 <a:solidFill>
                   <a:schemeClr val="dk2"/>
                 </a:solidFill>
@@ -6437,7 +6520,7 @@
               <a:buSzPts val="2800"/>
               <a:buFont typeface="Raleway"/>
               <a:buNone/>
-              <a:defRPr b="1" sz="2800">
+              <a:defRPr sz="2800" b="1">
                 <a:solidFill>
                   <a:schemeClr val="dk2"/>
                 </a:solidFill>
@@ -6460,7 +6543,7 @@
               <a:buSzPts val="2800"/>
               <a:buFont typeface="Raleway"/>
               <a:buNone/>
-              <a:defRPr b="1" sz="2800">
+              <a:defRPr sz="2800" b="1">
                 <a:solidFill>
                   <a:schemeClr val="dk2"/>
                 </a:solidFill>
@@ -6483,7 +6566,7 @@
               <a:buSzPts val="2800"/>
               <a:buFont typeface="Raleway"/>
               <a:buNone/>
-              <a:defRPr b="1" sz="2800">
+              <a:defRPr sz="2800" b="1">
                 <a:solidFill>
                   <a:schemeClr val="dk2"/>
                 </a:solidFill>
@@ -6506,7 +6589,7 @@
               <a:buSzPts val="2800"/>
               <a:buFont typeface="Raleway"/>
               <a:buNone/>
-              <a:defRPr b="1" sz="2800">
+              <a:defRPr sz="2800" b="1">
                 <a:solidFill>
                   <a:schemeClr val="dk2"/>
                 </a:solidFill>
@@ -6529,7 +6612,7 @@
               <a:buSzPts val="2800"/>
               <a:buFont typeface="Raleway"/>
               <a:buNone/>
-              <a:defRPr b="1" sz="2800">
+              <a:defRPr sz="2800" b="1">
                 <a:solidFill>
                   <a:schemeClr val="dk2"/>
                 </a:solidFill>
@@ -6540,15 +6623,19 @@
               </a:defRPr>
             </a:lvl9pPr>
           </a:lstStyle>
-          <a:p/>
+          <a:p>
+            <a:endParaRPr/>
+          </a:p>
         </p:txBody>
       </p:sp>
       <p:sp>
         <p:nvSpPr>
           <p:cNvPr id="7" name="Google Shape;7;p1"/>
-          <p:cNvSpPr txBox="1"/>
+          <p:cNvSpPr txBox="1">
+            <a:spLocks noGrp="1"/>
+          </p:cNvSpPr>
           <p:nvPr>
-            <p:ph idx="1" type="body"/>
+            <p:ph type="body" idx="1"/>
           </p:nvPr>
         </p:nvSpPr>
         <p:spPr>
@@ -6565,11 +6652,11 @@
           </a:ln>
         </p:spPr>
         <p:txBody>
-          <a:bodyPr anchorCtr="0" anchor="t" bIns="91425" lIns="91425" spcFirstLastPara="1" rIns="91425" wrap="square" tIns="91425">
+          <a:bodyPr spcFirstLastPara="1" wrap="square" lIns="91425" tIns="91425" rIns="91425" bIns="91425" anchor="t" anchorCtr="0">
             <a:normAutofit/>
           </a:bodyPr>
           <a:lstStyle>
-            <a:lvl1pPr indent="-311150" lvl="0" marL="457200">
+            <a:lvl1pPr marL="457200" lvl="0" indent="-311150">
               <a:lnSpc>
                 <a:spcPct val="115000"/>
               </a:lnSpc>
@@ -6595,7 +6682,7 @@
                 <a:sym typeface="Lato"/>
               </a:defRPr>
             </a:lvl1pPr>
-            <a:lvl2pPr indent="-298450" lvl="1" marL="914400">
+            <a:lvl2pPr marL="914400" lvl="1" indent="-298450">
               <a:lnSpc>
                 <a:spcPct val="115000"/>
               </a:lnSpc>
@@ -6621,7 +6708,7 @@
                 <a:sym typeface="Lato"/>
               </a:defRPr>
             </a:lvl2pPr>
-            <a:lvl3pPr indent="-298450" lvl="2" marL="1371600">
+            <a:lvl3pPr marL="1371600" lvl="2" indent="-298450">
               <a:lnSpc>
                 <a:spcPct val="115000"/>
               </a:lnSpc>
@@ -6647,7 +6734,7 @@
                 <a:sym typeface="Lato"/>
               </a:defRPr>
             </a:lvl3pPr>
-            <a:lvl4pPr indent="-298450" lvl="3" marL="1828800">
+            <a:lvl4pPr marL="1828800" lvl="3" indent="-298450">
               <a:lnSpc>
                 <a:spcPct val="115000"/>
               </a:lnSpc>
@@ -6673,7 +6760,7 @@
                 <a:sym typeface="Lato"/>
               </a:defRPr>
             </a:lvl4pPr>
-            <a:lvl5pPr indent="-298450" lvl="4" marL="2286000">
+            <a:lvl5pPr marL="2286000" lvl="4" indent="-298450">
               <a:lnSpc>
                 <a:spcPct val="115000"/>
               </a:lnSpc>
@@ -6699,7 +6786,7 @@
                 <a:sym typeface="Lato"/>
               </a:defRPr>
             </a:lvl5pPr>
-            <a:lvl6pPr indent="-298450" lvl="5" marL="2743200">
+            <a:lvl6pPr marL="2743200" lvl="5" indent="-298450">
               <a:lnSpc>
                 <a:spcPct val="115000"/>
               </a:lnSpc>
@@ -6725,7 +6812,7 @@
                 <a:sym typeface="Lato"/>
               </a:defRPr>
             </a:lvl6pPr>
-            <a:lvl7pPr indent="-298450" lvl="6" marL="3200400">
+            <a:lvl7pPr marL="3200400" lvl="6" indent="-298450">
               <a:lnSpc>
                 <a:spcPct val="115000"/>
               </a:lnSpc>
@@ -6751,7 +6838,7 @@
                 <a:sym typeface="Lato"/>
               </a:defRPr>
             </a:lvl7pPr>
-            <a:lvl8pPr indent="-298450" lvl="7" marL="3657600">
+            <a:lvl8pPr marL="3657600" lvl="7" indent="-298450">
               <a:lnSpc>
                 <a:spcPct val="115000"/>
               </a:lnSpc>
@@ -6777,7 +6864,7 @@
                 <a:sym typeface="Lato"/>
               </a:defRPr>
             </a:lvl8pPr>
-            <a:lvl9pPr indent="-298450" lvl="8" marL="4114800">
+            <a:lvl9pPr marL="4114800" lvl="8" indent="-298450">
               <a:lnSpc>
                 <a:spcPct val="115000"/>
               </a:lnSpc>
@@ -6804,15 +6891,19 @@
               </a:defRPr>
             </a:lvl9pPr>
           </a:lstStyle>
-          <a:p/>
+          <a:p>
+            <a:endParaRPr/>
+          </a:p>
         </p:txBody>
       </p:sp>
       <p:sp>
         <p:nvSpPr>
           <p:cNvPr id="8" name="Google Shape;8;p1"/>
-          <p:cNvSpPr txBox="1"/>
+          <p:cNvSpPr txBox="1">
+            <a:spLocks noGrp="1"/>
+          </p:cNvSpPr>
           <p:nvPr>
-            <p:ph idx="12" type="sldNum"/>
+            <p:ph type="sldNum" idx="12"/>
           </p:nvPr>
         </p:nvSpPr>
         <p:spPr>
@@ -6829,7 +6920,7 @@
           </a:ln>
         </p:spPr>
         <p:txBody>
-          <a:bodyPr anchorCtr="0" anchor="ctr" bIns="91425" lIns="91425" spcFirstLastPara="1" rIns="91425" wrap="square" tIns="91425">
+          <a:bodyPr spcFirstLastPara="1" wrap="square" lIns="91425" tIns="91425" rIns="91425" bIns="91425" anchor="ctr" anchorCtr="0">
             <a:normAutofit/>
           </a:bodyPr>
           <a:lstStyle>
@@ -6943,7 +7034,7 @@
             </a:lvl9pPr>
           </a:lstStyle>
           <a:p>
-            <a:pPr indent="0" lvl="0" marL="0" rtl="0" algn="r">
+            <a:pPr marL="0" lvl="0" indent="0" algn="r" rtl="0">
               <a:spcBef>
                 <a:spcPts val="0"/>
               </a:spcBef>
@@ -6962,7 +7053,7 @@
       </p:sp>
     </p:spTree>
   </p:cSld>
-  <p:clrMap accent1="accent1" accent2="accent2" accent3="accent3" accent4="accent4" accent5="accent5" accent6="accent6" bg1="lt1" bg2="dk2" tx1="dk1" tx2="lt2" folHlink="folHlink" hlink="hlink"/>
+  <p:clrMap bg1="lt1" tx1="dk1" bg2="dk2" tx2="lt2" accent1="accent1" accent2="accent2" accent3="accent3" accent4="accent4" accent5="accent5" accent6="accent6" hlink="hlink" folHlink="folHlink"/>
   <p:sldLayoutIdLst>
     <p:sldLayoutId id="2147483648" r:id="rId1"/>
     <p:sldLayoutId id="2147483649" r:id="rId2"/>
@@ -6976,10 +7067,10 @@
     <p:sldLayoutId id="2147483657" r:id="rId10"/>
     <p:sldLayoutId id="2147483658" r:id="rId11"/>
   </p:sldLayoutIdLst>
-  <p:hf dt="0" ftr="0" hdr="0" sldNum="0"/>
+  <p:hf sldNum="0" hdr="0" ftr="0" dt="0"/>
   <p:txStyles>
     <p:titleStyle>
-      <a:defPPr lvl="0" marR="0" rtl="0" algn="l">
+      <a:defPPr marR="0" lvl="0" algn="l" rtl="0">
         <a:lnSpc>
           <a:spcPct val="100000"/>
         </a:lnSpc>
@@ -6990,7 +7081,7 @@
           <a:spcPts val="0"/>
         </a:spcAft>
       </a:defPPr>
-      <a:lvl1pPr lvl="0" marR="0" rtl="0" algn="l">
+      <a:lvl1pPr marR="0" lvl="0" algn="l" rtl="0">
         <a:lnSpc>
           <a:spcPct val="100000"/>
         </a:lnSpc>
@@ -7004,7 +7095,7 @@
           <a:srgbClr val="000000"/>
         </a:buClr>
         <a:buFont typeface="Arial"/>
-        <a:defRPr b="0" i="0" sz="1400" u="none" cap="none" strike="noStrike">
+        <a:defRPr sz="1400" b="0" i="0" u="none" strike="noStrike" cap="none">
           <a:solidFill>
             <a:srgbClr val="000000"/>
           </a:solidFill>
@@ -7014,7 +7105,7 @@
           <a:sym typeface="Arial"/>
         </a:defRPr>
       </a:lvl1pPr>
-      <a:lvl2pPr lvl="1" marR="0" rtl="0" algn="l">
+      <a:lvl2pPr marR="0" lvl="1" algn="l" rtl="0">
         <a:lnSpc>
           <a:spcPct val="100000"/>
         </a:lnSpc>
@@ -7028,7 +7119,7 @@
           <a:srgbClr val="000000"/>
         </a:buClr>
         <a:buFont typeface="Arial"/>
-        <a:defRPr b="0" i="0" sz="1400" u="none" cap="none" strike="noStrike">
+        <a:defRPr sz="1400" b="0" i="0" u="none" strike="noStrike" cap="none">
           <a:solidFill>
             <a:srgbClr val="000000"/>
           </a:solidFill>
@@ -7038,7 +7129,7 @@
           <a:sym typeface="Arial"/>
         </a:defRPr>
       </a:lvl2pPr>
-      <a:lvl3pPr lvl="2" marR="0" rtl="0" algn="l">
+      <a:lvl3pPr marR="0" lvl="2" algn="l" rtl="0">
         <a:lnSpc>
           <a:spcPct val="100000"/>
         </a:lnSpc>
@@ -7052,7 +7143,7 @@
           <a:srgbClr val="000000"/>
         </a:buClr>
         <a:buFont typeface="Arial"/>
-        <a:defRPr b="0" i="0" sz="1400" u="none" cap="none" strike="noStrike">
+        <a:defRPr sz="1400" b="0" i="0" u="none" strike="noStrike" cap="none">
           <a:solidFill>
             <a:srgbClr val="000000"/>
           </a:solidFill>
@@ -7062,7 +7153,7 @@
           <a:sym typeface="Arial"/>
         </a:defRPr>
       </a:lvl3pPr>
-      <a:lvl4pPr lvl="3" marR="0" rtl="0" algn="l">
+      <a:lvl4pPr marR="0" lvl="3" algn="l" rtl="0">
         <a:lnSpc>
           <a:spcPct val="100000"/>
         </a:lnSpc>
@@ -7076,7 +7167,7 @@
           <a:srgbClr val="000000"/>
         </a:buClr>
         <a:buFont typeface="Arial"/>
-        <a:defRPr b="0" i="0" sz="1400" u="none" cap="none" strike="noStrike">
+        <a:defRPr sz="1400" b="0" i="0" u="none" strike="noStrike" cap="none">
           <a:solidFill>
             <a:srgbClr val="000000"/>
           </a:solidFill>
@@ -7086,7 +7177,7 @@
           <a:sym typeface="Arial"/>
         </a:defRPr>
       </a:lvl4pPr>
-      <a:lvl5pPr lvl="4" marR="0" rtl="0" algn="l">
+      <a:lvl5pPr marR="0" lvl="4" algn="l" rtl="0">
         <a:lnSpc>
           <a:spcPct val="100000"/>
         </a:lnSpc>
@@ -7100,7 +7191,7 @@
           <a:srgbClr val="000000"/>
         </a:buClr>
         <a:buFont typeface="Arial"/>
-        <a:defRPr b="0" i="0" sz="1400" u="none" cap="none" strike="noStrike">
+        <a:defRPr sz="1400" b="0" i="0" u="none" strike="noStrike" cap="none">
           <a:solidFill>
             <a:srgbClr val="000000"/>
           </a:solidFill>
@@ -7110,7 +7201,7 @@
           <a:sym typeface="Arial"/>
         </a:defRPr>
       </a:lvl5pPr>
-      <a:lvl6pPr lvl="5" marR="0" rtl="0" algn="l">
+      <a:lvl6pPr marR="0" lvl="5" algn="l" rtl="0">
         <a:lnSpc>
           <a:spcPct val="100000"/>
         </a:lnSpc>
@@ -7124,7 +7215,7 @@
           <a:srgbClr val="000000"/>
         </a:buClr>
         <a:buFont typeface="Arial"/>
-        <a:defRPr b="0" i="0" sz="1400" u="none" cap="none" strike="noStrike">
+        <a:defRPr sz="1400" b="0" i="0" u="none" strike="noStrike" cap="none">
           <a:solidFill>
             <a:srgbClr val="000000"/>
           </a:solidFill>
@@ -7134,7 +7225,7 @@
           <a:sym typeface="Arial"/>
         </a:defRPr>
       </a:lvl6pPr>
-      <a:lvl7pPr lvl="6" marR="0" rtl="0" algn="l">
+      <a:lvl7pPr marR="0" lvl="6" algn="l" rtl="0">
         <a:lnSpc>
           <a:spcPct val="100000"/>
         </a:lnSpc>
@@ -7148,7 +7239,7 @@
           <a:srgbClr val="000000"/>
         </a:buClr>
         <a:buFont typeface="Arial"/>
-        <a:defRPr b="0" i="0" sz="1400" u="none" cap="none" strike="noStrike">
+        <a:defRPr sz="1400" b="0" i="0" u="none" strike="noStrike" cap="none">
           <a:solidFill>
             <a:srgbClr val="000000"/>
           </a:solidFill>
@@ -7158,7 +7249,7 @@
           <a:sym typeface="Arial"/>
         </a:defRPr>
       </a:lvl7pPr>
-      <a:lvl8pPr lvl="7" marR="0" rtl="0" algn="l">
+      <a:lvl8pPr marR="0" lvl="7" algn="l" rtl="0">
         <a:lnSpc>
           <a:spcPct val="100000"/>
         </a:lnSpc>
@@ -7172,7 +7263,7 @@
           <a:srgbClr val="000000"/>
         </a:buClr>
         <a:buFont typeface="Arial"/>
-        <a:defRPr b="0" i="0" sz="1400" u="none" cap="none" strike="noStrike">
+        <a:defRPr sz="1400" b="0" i="0" u="none" strike="noStrike" cap="none">
           <a:solidFill>
             <a:srgbClr val="000000"/>
           </a:solidFill>
@@ -7182,7 +7273,7 @@
           <a:sym typeface="Arial"/>
         </a:defRPr>
       </a:lvl8pPr>
-      <a:lvl9pPr lvl="8" marR="0" rtl="0" algn="l">
+      <a:lvl9pPr marR="0" lvl="8" algn="l" rtl="0">
         <a:lnSpc>
           <a:spcPct val="100000"/>
         </a:lnSpc>
@@ -7196,7 +7287,7 @@
           <a:srgbClr val="000000"/>
         </a:buClr>
         <a:buFont typeface="Arial"/>
-        <a:defRPr b="0" i="0" sz="1400" u="none" cap="none" strike="noStrike">
+        <a:defRPr sz="1400" b="0" i="0" u="none" strike="noStrike" cap="none">
           <a:solidFill>
             <a:srgbClr val="000000"/>
           </a:solidFill>
@@ -7208,7 +7299,7 @@
       </a:lvl9pPr>
     </p:titleStyle>
     <p:bodyStyle>
-      <a:defPPr lvl="0" marR="0" rtl="0" algn="l">
+      <a:defPPr marR="0" lvl="0" algn="l" rtl="0">
         <a:lnSpc>
           <a:spcPct val="100000"/>
         </a:lnSpc>
@@ -7219,7 +7310,7 @@
           <a:spcPts val="0"/>
         </a:spcAft>
       </a:defPPr>
-      <a:lvl1pPr lvl="0" marR="0" rtl="0" algn="l">
+      <a:lvl1pPr marR="0" lvl="0" algn="l" rtl="0">
         <a:lnSpc>
           <a:spcPct val="100000"/>
         </a:lnSpc>
@@ -7233,7 +7324,7 @@
           <a:srgbClr val="000000"/>
         </a:buClr>
         <a:buFont typeface="Arial"/>
-        <a:defRPr b="0" i="0" sz="1400" u="none" cap="none" strike="noStrike">
+        <a:defRPr sz="1400" b="0" i="0" u="none" strike="noStrike" cap="none">
           <a:solidFill>
             <a:srgbClr val="000000"/>
           </a:solidFill>
@@ -7243,7 +7334,7 @@
           <a:sym typeface="Arial"/>
         </a:defRPr>
       </a:lvl1pPr>
-      <a:lvl2pPr lvl="1" marR="0" rtl="0" algn="l">
+      <a:lvl2pPr marR="0" lvl="1" algn="l" rtl="0">
         <a:lnSpc>
           <a:spcPct val="100000"/>
         </a:lnSpc>
@@ -7257,7 +7348,7 @@
           <a:srgbClr val="000000"/>
         </a:buClr>
         <a:buFont typeface="Arial"/>
-        <a:defRPr b="0" i="0" sz="1400" u="none" cap="none" strike="noStrike">
+        <a:defRPr sz="1400" b="0" i="0" u="none" strike="noStrike" cap="none">
           <a:solidFill>
             <a:srgbClr val="000000"/>
           </a:solidFill>
@@ -7267,7 +7358,7 @@
           <a:sym typeface="Arial"/>
         </a:defRPr>
       </a:lvl2pPr>
-      <a:lvl3pPr lvl="2" marR="0" rtl="0" algn="l">
+      <a:lvl3pPr marR="0" lvl="2" algn="l" rtl="0">
         <a:lnSpc>
           <a:spcPct val="100000"/>
         </a:lnSpc>
@@ -7281,7 +7372,7 @@
           <a:srgbClr val="000000"/>
         </a:buClr>
         <a:buFont typeface="Arial"/>
-        <a:defRPr b="0" i="0" sz="1400" u="none" cap="none" strike="noStrike">
+        <a:defRPr sz="1400" b="0" i="0" u="none" strike="noStrike" cap="none">
           <a:solidFill>
             <a:srgbClr val="000000"/>
           </a:solidFill>
@@ -7291,7 +7382,7 @@
           <a:sym typeface="Arial"/>
         </a:defRPr>
       </a:lvl3pPr>
-      <a:lvl4pPr lvl="3" marR="0" rtl="0" algn="l">
+      <a:lvl4pPr marR="0" lvl="3" algn="l" rtl="0">
         <a:lnSpc>
           <a:spcPct val="100000"/>
         </a:lnSpc>
@@ -7305,7 +7396,7 @@
           <a:srgbClr val="000000"/>
         </a:buClr>
         <a:buFont typeface="Arial"/>
-        <a:defRPr b="0" i="0" sz="1400" u="none" cap="none" strike="noStrike">
+        <a:defRPr sz="1400" b="0" i="0" u="none" strike="noStrike" cap="none">
           <a:solidFill>
             <a:srgbClr val="000000"/>
           </a:solidFill>
@@ -7315,7 +7406,7 @@
           <a:sym typeface="Arial"/>
         </a:defRPr>
       </a:lvl4pPr>
-      <a:lvl5pPr lvl="4" marR="0" rtl="0" algn="l">
+      <a:lvl5pPr marR="0" lvl="4" algn="l" rtl="0">
         <a:lnSpc>
           <a:spcPct val="100000"/>
         </a:lnSpc>
@@ -7329,7 +7420,7 @@
           <a:srgbClr val="000000"/>
         </a:buClr>
         <a:buFont typeface="Arial"/>
-        <a:defRPr b="0" i="0" sz="1400" u="none" cap="none" strike="noStrike">
+        <a:defRPr sz="1400" b="0" i="0" u="none" strike="noStrike" cap="none">
           <a:solidFill>
             <a:srgbClr val="000000"/>
           </a:solidFill>
@@ -7339,7 +7430,7 @@
           <a:sym typeface="Arial"/>
         </a:defRPr>
       </a:lvl5pPr>
-      <a:lvl6pPr lvl="5" marR="0" rtl="0" algn="l">
+      <a:lvl6pPr marR="0" lvl="5" algn="l" rtl="0">
         <a:lnSpc>
           <a:spcPct val="100000"/>
         </a:lnSpc>
@@ -7353,7 +7444,7 @@
           <a:srgbClr val="000000"/>
         </a:buClr>
         <a:buFont typeface="Arial"/>
-        <a:defRPr b="0" i="0" sz="1400" u="none" cap="none" strike="noStrike">
+        <a:defRPr sz="1400" b="0" i="0" u="none" strike="noStrike" cap="none">
           <a:solidFill>
             <a:srgbClr val="000000"/>
           </a:solidFill>
@@ -7363,7 +7454,7 @@
           <a:sym typeface="Arial"/>
         </a:defRPr>
       </a:lvl6pPr>
-      <a:lvl7pPr lvl="6" marR="0" rtl="0" algn="l">
+      <a:lvl7pPr marR="0" lvl="6" algn="l" rtl="0">
         <a:lnSpc>
           <a:spcPct val="100000"/>
         </a:lnSpc>
@@ -7377,7 +7468,7 @@
           <a:srgbClr val="000000"/>
         </a:buClr>
         <a:buFont typeface="Arial"/>
-        <a:defRPr b="0" i="0" sz="1400" u="none" cap="none" strike="noStrike">
+        <a:defRPr sz="1400" b="0" i="0" u="none" strike="noStrike" cap="none">
           <a:solidFill>
             <a:srgbClr val="000000"/>
           </a:solidFill>
@@ -7387,7 +7478,7 @@
           <a:sym typeface="Arial"/>
         </a:defRPr>
       </a:lvl7pPr>
-      <a:lvl8pPr lvl="7" marR="0" rtl="0" algn="l">
+      <a:lvl8pPr marR="0" lvl="7" algn="l" rtl="0">
         <a:lnSpc>
           <a:spcPct val="100000"/>
         </a:lnSpc>
@@ -7401,7 +7492,7 @@
           <a:srgbClr val="000000"/>
         </a:buClr>
         <a:buFont typeface="Arial"/>
-        <a:defRPr b="0" i="0" sz="1400" u="none" cap="none" strike="noStrike">
+        <a:defRPr sz="1400" b="0" i="0" u="none" strike="noStrike" cap="none">
           <a:solidFill>
             <a:srgbClr val="000000"/>
           </a:solidFill>
@@ -7411,7 +7502,7 @@
           <a:sym typeface="Arial"/>
         </a:defRPr>
       </a:lvl8pPr>
-      <a:lvl9pPr lvl="8" marR="0" rtl="0" algn="l">
+      <a:lvl9pPr marR="0" lvl="8" algn="l" rtl="0">
         <a:lnSpc>
           <a:spcPct val="100000"/>
         </a:lnSpc>
@@ -7425,7 +7516,7 @@
           <a:srgbClr val="000000"/>
         </a:buClr>
         <a:buFont typeface="Arial"/>
-        <a:defRPr b="0" i="0" sz="1400" u="none" cap="none" strike="noStrike">
+        <a:defRPr sz="1400" b="0" i="0" u="none" strike="noStrike" cap="none">
           <a:solidFill>
             <a:srgbClr val="000000"/>
           </a:solidFill>
@@ -7437,7 +7528,7 @@
       </a:lvl9pPr>
     </p:bodyStyle>
     <p:otherStyle>
-      <a:defPPr lvl="0" marR="0" rtl="0" algn="l">
+      <a:defPPr marR="0" lvl="0" algn="l" rtl="0">
         <a:lnSpc>
           <a:spcPct val="100000"/>
         </a:lnSpc>
@@ -7448,7 +7539,7 @@
           <a:spcPts val="0"/>
         </a:spcAft>
       </a:defPPr>
-      <a:lvl1pPr lvl="0" marR="0" rtl="0" algn="l">
+      <a:lvl1pPr marR="0" lvl="0" algn="l" rtl="0">
         <a:lnSpc>
           <a:spcPct val="100000"/>
         </a:lnSpc>
@@ -7462,7 +7553,7 @@
           <a:srgbClr val="000000"/>
         </a:buClr>
         <a:buFont typeface="Arial"/>
-        <a:defRPr b="0" i="0" sz="1400" u="none" cap="none" strike="noStrike">
+        <a:defRPr sz="1400" b="0" i="0" u="none" strike="noStrike" cap="none">
           <a:solidFill>
             <a:srgbClr val="000000"/>
           </a:solidFill>
@@ -7472,7 +7563,7 @@
           <a:sym typeface="Arial"/>
         </a:defRPr>
       </a:lvl1pPr>
-      <a:lvl2pPr lvl="1" marR="0" rtl="0" algn="l">
+      <a:lvl2pPr marR="0" lvl="1" algn="l" rtl="0">
         <a:lnSpc>
           <a:spcPct val="100000"/>
         </a:lnSpc>
@@ -7486,7 +7577,7 @@
           <a:srgbClr val="000000"/>
         </a:buClr>
         <a:buFont typeface="Arial"/>
-        <a:defRPr b="0" i="0" sz="1400" u="none" cap="none" strike="noStrike">
+        <a:defRPr sz="1400" b="0" i="0" u="none" strike="noStrike" cap="none">
           <a:solidFill>
             <a:srgbClr val="000000"/>
           </a:solidFill>
@@ -7496,7 +7587,7 @@
           <a:sym typeface="Arial"/>
         </a:defRPr>
       </a:lvl2pPr>
-      <a:lvl3pPr lvl="2" marR="0" rtl="0" algn="l">
+      <a:lvl3pPr marR="0" lvl="2" algn="l" rtl="0">
         <a:lnSpc>
           <a:spcPct val="100000"/>
         </a:lnSpc>
@@ -7510,7 +7601,7 @@
           <a:srgbClr val="000000"/>
         </a:buClr>
         <a:buFont typeface="Arial"/>
-        <a:defRPr b="0" i="0" sz="1400" u="none" cap="none" strike="noStrike">
+        <a:defRPr sz="1400" b="0" i="0" u="none" strike="noStrike" cap="none">
           <a:solidFill>
             <a:srgbClr val="000000"/>
           </a:solidFill>
@@ -7520,7 +7611,7 @@
           <a:sym typeface="Arial"/>
         </a:defRPr>
       </a:lvl3pPr>
-      <a:lvl4pPr lvl="3" marR="0" rtl="0" algn="l">
+      <a:lvl4pPr marR="0" lvl="3" algn="l" rtl="0">
         <a:lnSpc>
           <a:spcPct val="100000"/>
         </a:lnSpc>
@@ -7534,7 +7625,7 @@
           <a:srgbClr val="000000"/>
         </a:buClr>
         <a:buFont typeface="Arial"/>
-        <a:defRPr b="0" i="0" sz="1400" u="none" cap="none" strike="noStrike">
+        <a:defRPr sz="1400" b="0" i="0" u="none" strike="noStrike" cap="none">
           <a:solidFill>
             <a:srgbClr val="000000"/>
           </a:solidFill>
@@ -7544,7 +7635,7 @@
           <a:sym typeface="Arial"/>
         </a:defRPr>
       </a:lvl4pPr>
-      <a:lvl5pPr lvl="4" marR="0" rtl="0" algn="l">
+      <a:lvl5pPr marR="0" lvl="4" algn="l" rtl="0">
         <a:lnSpc>
           <a:spcPct val="100000"/>
         </a:lnSpc>
@@ -7558,7 +7649,7 @@
           <a:srgbClr val="000000"/>
         </a:buClr>
         <a:buFont typeface="Arial"/>
-        <a:defRPr b="0" i="0" sz="1400" u="none" cap="none" strike="noStrike">
+        <a:defRPr sz="1400" b="0" i="0" u="none" strike="noStrike" cap="none">
           <a:solidFill>
             <a:srgbClr val="000000"/>
           </a:solidFill>
@@ -7568,7 +7659,7 @@
           <a:sym typeface="Arial"/>
         </a:defRPr>
       </a:lvl5pPr>
-      <a:lvl6pPr lvl="5" marR="0" rtl="0" algn="l">
+      <a:lvl6pPr marR="0" lvl="5" algn="l" rtl="0">
         <a:lnSpc>
           <a:spcPct val="100000"/>
         </a:lnSpc>
@@ -7582,7 +7673,7 @@
           <a:srgbClr val="000000"/>
         </a:buClr>
         <a:buFont typeface="Arial"/>
-        <a:defRPr b="0" i="0" sz="1400" u="none" cap="none" strike="noStrike">
+        <a:defRPr sz="1400" b="0" i="0" u="none" strike="noStrike" cap="none">
           <a:solidFill>
             <a:srgbClr val="000000"/>
           </a:solidFill>
@@ -7592,7 +7683,7 @@
           <a:sym typeface="Arial"/>
         </a:defRPr>
       </a:lvl6pPr>
-      <a:lvl7pPr lvl="6" marR="0" rtl="0" algn="l">
+      <a:lvl7pPr marR="0" lvl="6" algn="l" rtl="0">
         <a:lnSpc>
           <a:spcPct val="100000"/>
         </a:lnSpc>
@@ -7606,7 +7697,7 @@
           <a:srgbClr val="000000"/>
         </a:buClr>
         <a:buFont typeface="Arial"/>
-        <a:defRPr b="0" i="0" sz="1400" u="none" cap="none" strike="noStrike">
+        <a:defRPr sz="1400" b="0" i="0" u="none" strike="noStrike" cap="none">
           <a:solidFill>
             <a:srgbClr val="000000"/>
           </a:solidFill>
@@ -7616,7 +7707,7 @@
           <a:sym typeface="Arial"/>
         </a:defRPr>
       </a:lvl7pPr>
-      <a:lvl8pPr lvl="7" marR="0" rtl="0" algn="l">
+      <a:lvl8pPr marR="0" lvl="7" algn="l" rtl="0">
         <a:lnSpc>
           <a:spcPct val="100000"/>
         </a:lnSpc>
@@ -7630,7 +7721,7 @@
           <a:srgbClr val="000000"/>
         </a:buClr>
         <a:buFont typeface="Arial"/>
-        <a:defRPr b="0" i="0" sz="1400" u="none" cap="none" strike="noStrike">
+        <a:defRPr sz="1400" b="0" i="0" u="none" strike="noStrike" cap="none">
           <a:solidFill>
             <a:srgbClr val="000000"/>
           </a:solidFill>
@@ -7640,7 +7731,7 @@
           <a:sym typeface="Arial"/>
         </a:defRPr>
       </a:lvl8pPr>
-      <a:lvl9pPr lvl="8" marR="0" rtl="0" algn="l">
+      <a:lvl9pPr marR="0" lvl="8" algn="l" rtl="0">
         <a:lnSpc>
           <a:spcPct val="100000"/>
         </a:lnSpc>
@@ -7654,7 +7745,7 @@
           <a:srgbClr val="000000"/>
         </a:buClr>
         <a:buFont typeface="Arial"/>
-        <a:defRPr b="0" i="0" sz="1400" u="none" cap="none" strike="noStrike">
+        <a:defRPr sz="1400" b="0" i="0" u="none" strike="noStrike" cap="none">
           <a:solidFill>
             <a:srgbClr val="000000"/>
           </a:solidFill>
@@ -7670,11 +7761,11 @@
 </file>
 
 <file path=ppt/slides/slide1.xml><?xml version="1.0" encoding="utf-8"?>
-<p:sld xmlns:a="http://schemas.openxmlformats.org/drawingml/2006/main" xmlns:r="http://schemas.openxmlformats.org/officeDocument/2006/relationships" xmlns:mc="http://schemas.openxmlformats.org/markup-compatibility/2006" xmlns:mv="urn:schemas-microsoft-com:mac:vml" xmlns:p="http://schemas.openxmlformats.org/presentationml/2006/main" xmlns:c="http://schemas.openxmlformats.org/drawingml/2006/chart" xmlns:dgm="http://schemas.openxmlformats.org/drawingml/2006/diagram" xmlns:o="urn:schemas-microsoft-com:office:office" xmlns:v="urn:schemas-microsoft-com:vml" xmlns:pvml="urn:schemas-microsoft-com:office:powerpoint" xmlns:com="http://schemas.openxmlformats.org/drawingml/2006/compatibility" xmlns:p14="http://schemas.microsoft.com/office/powerpoint/2010/main" xmlns:p15="http://schemas.microsoft.com/office/powerpoint/2012/main" xmlns:ahyp="http://schemas.microsoft.com/office/drawing/2018/hyperlinkcolor">
+<p:sld xmlns:a="http://schemas.openxmlformats.org/drawingml/2006/main" xmlns:r="http://schemas.openxmlformats.org/officeDocument/2006/relationships" xmlns:p="http://schemas.openxmlformats.org/presentationml/2006/main">
   <p:cSld>
     <p:spTree>
       <p:nvGrpSpPr>
-        <p:cNvPr id="85" name="Shape 85"/>
+        <p:cNvPr id="1" name="Shape 85"/>
         <p:cNvGrpSpPr/>
         <p:nvPr/>
       </p:nvGrpSpPr>
@@ -7689,9 +7780,11 @@
       <p:sp>
         <p:nvSpPr>
           <p:cNvPr id="86" name="Google Shape;86;p13"/>
-          <p:cNvSpPr txBox="1"/>
+          <p:cNvSpPr txBox="1">
+            <a:spLocks noGrp="1"/>
+          </p:cNvSpPr>
           <p:nvPr>
-            <p:ph idx="1" type="subTitle"/>
+            <p:ph type="subTitle" idx="1"/>
           </p:nvPr>
         </p:nvSpPr>
         <p:spPr>
@@ -7704,12 +7797,12 @@
           </a:prstGeom>
         </p:spPr>
         <p:txBody>
-          <a:bodyPr anchorCtr="0" anchor="t" bIns="91425" lIns="91425" spcFirstLastPara="1" rIns="91425" wrap="square" tIns="91425">
+          <a:bodyPr spcFirstLastPara="1" wrap="square" lIns="91425" tIns="91425" rIns="91425" bIns="91425" anchor="t" anchorCtr="0">
             <a:normAutofit/>
           </a:bodyPr>
           <a:lstStyle/>
           <a:p>
-            <a:pPr indent="0" lvl="0" marL="0" rtl="0" algn="l">
+            <a:pPr marL="0" lvl="0" indent="0" algn="l" rtl="0">
               <a:spcBef>
                 <a:spcPts val="0"/>
               </a:spcBef>
@@ -7719,10 +7812,10 @@
               <a:buNone/>
             </a:pPr>
             <a:r>
-              <a:rPr b="1" lang="en" sz="1800"/>
+              <a:rPr lang="en" sz="1800" b="1"/>
               <a:t>By Hannah Fry</a:t>
             </a:r>
-            <a:endParaRPr b="1" sz="1800"/>
+            <a:endParaRPr sz="1800" b="1"/>
           </a:p>
         </p:txBody>
       </p:sp>
@@ -7774,12 +7867,12 @@
           </a:ln>
         </p:spPr>
         <p:txBody>
-          <a:bodyPr anchorCtr="0" anchor="t" bIns="91425" lIns="91425" spcFirstLastPara="1" rIns="91425" wrap="square" tIns="91425">
+          <a:bodyPr spcFirstLastPara="1" wrap="square" lIns="91425" tIns="91425" rIns="91425" bIns="91425" anchor="t" anchorCtr="0">
             <a:spAutoFit/>
           </a:bodyPr>
           <a:lstStyle/>
           <a:p>
-            <a:pPr indent="0" lvl="0" marL="0" rtl="0" algn="l">
+            <a:pPr marL="0" lvl="0" indent="0" algn="l" rtl="0">
               <a:spcBef>
                 <a:spcPts val="0"/>
               </a:spcBef>
@@ -7801,7 +7894,7 @@
               <a:t>Hello World</a:t>
             </a:r>
             <a:r>
-              <a:rPr b="1" lang="en" sz="1600">
+              <a:rPr lang="en" sz="1600" b="1">
                 <a:solidFill>
                   <a:srgbClr val="232323"/>
                 </a:solidFill>
@@ -7812,7 +7905,7 @@
               </a:rPr>
               <a:t>: </a:t>
             </a:r>
-            <a:endParaRPr b="1" sz="1600">
+            <a:endParaRPr sz="1600" b="1">
               <a:solidFill>
                 <a:srgbClr val="232323"/>
               </a:solidFill>
@@ -7823,7 +7916,7 @@
             </a:endParaRPr>
           </a:p>
           <a:p>
-            <a:pPr indent="0" lvl="0" marL="0" rtl="0" algn="l">
+            <a:pPr marL="0" lvl="0" indent="0" algn="l" rtl="0">
               <a:spcBef>
                 <a:spcPts val="0"/>
               </a:spcBef>
@@ -7833,7 +7926,7 @@
               <a:buNone/>
             </a:pPr>
             <a:r>
-              <a:rPr b="1" lang="en" sz="1600">
+              <a:rPr lang="en" sz="1600" b="1">
                 <a:solidFill>
                   <a:srgbClr val="3ABCBD"/>
                 </a:solidFill>
@@ -7876,12 +7969,12 @@
           </a:ln>
         </p:spPr>
         <p:txBody>
-          <a:bodyPr anchorCtr="0" anchor="t" bIns="91425" lIns="91425" spcFirstLastPara="1" rIns="91425" wrap="square" tIns="91425">
+          <a:bodyPr spcFirstLastPara="1" wrap="square" lIns="91425" tIns="91425" rIns="91425" bIns="91425" anchor="t" anchorCtr="0">
             <a:spAutoFit/>
           </a:bodyPr>
           <a:lstStyle/>
           <a:p>
-            <a:pPr indent="0" lvl="0" marL="0" rtl="0" algn="l">
+            <a:pPr marL="0" lvl="0" indent="0" algn="l" rtl="0">
               <a:spcBef>
                 <a:spcPts val="0"/>
               </a:spcBef>
@@ -7891,7 +7984,7 @@
               <a:buNone/>
             </a:pPr>
             <a:r>
-              <a:rPr lang="en" sz="1300">
+              <a:rPr lang="en" sz="1300" dirty="0">
                 <a:latin typeface="Lato"/>
                 <a:ea typeface="Lato"/>
                 <a:cs typeface="Lato"/>
@@ -7899,7 +7992,7 @@
               </a:rPr>
               <a:t>Data 303 Presentation </a:t>
             </a:r>
-            <a:endParaRPr sz="1300">
+            <a:endParaRPr sz="1300" dirty="0">
               <a:latin typeface="Lato"/>
               <a:ea typeface="Lato"/>
               <a:cs typeface="Lato"/>
@@ -7907,7 +8000,7 @@
             </a:endParaRPr>
           </a:p>
           <a:p>
-            <a:pPr indent="0" lvl="0" marL="0" rtl="0" algn="l">
+            <a:pPr marL="0" lvl="0" indent="0" algn="l" rtl="0">
               <a:spcBef>
                 <a:spcPts val="0"/>
               </a:spcBef>
@@ -7917,7 +8010,7 @@
               <a:buNone/>
             </a:pPr>
             <a:r>
-              <a:rPr lang="en" sz="800">
+              <a:rPr lang="en" sz="800" dirty="0">
                 <a:latin typeface="Lato"/>
                 <a:ea typeface="Lato"/>
                 <a:cs typeface="Lato"/>
@@ -7925,7 +8018,7 @@
               </a:rPr>
               <a:t>Presented by Yuqian Wang</a:t>
             </a:r>
-            <a:endParaRPr sz="800">
+            <a:endParaRPr sz="800" dirty="0">
               <a:latin typeface="Lato"/>
               <a:ea typeface="Lato"/>
               <a:cs typeface="Lato"/>
@@ -7943,11 +8036,11 @@
 </file>
 
 <file path=ppt/slides/slide2.xml><?xml version="1.0" encoding="utf-8"?>
-<p:sld xmlns:a="http://schemas.openxmlformats.org/drawingml/2006/main" xmlns:r="http://schemas.openxmlformats.org/officeDocument/2006/relationships" xmlns:mc="http://schemas.openxmlformats.org/markup-compatibility/2006" xmlns:mv="urn:schemas-microsoft-com:mac:vml" xmlns:p="http://schemas.openxmlformats.org/presentationml/2006/main" xmlns:c="http://schemas.openxmlformats.org/drawingml/2006/chart" xmlns:dgm="http://schemas.openxmlformats.org/drawingml/2006/diagram" xmlns:o="urn:schemas-microsoft-com:office:office" xmlns:v="urn:schemas-microsoft-com:vml" xmlns:pvml="urn:schemas-microsoft-com:office:powerpoint" xmlns:com="http://schemas.openxmlformats.org/drawingml/2006/compatibility" xmlns:p14="http://schemas.microsoft.com/office/powerpoint/2010/main" xmlns:p15="http://schemas.microsoft.com/office/powerpoint/2012/main" xmlns:ahyp="http://schemas.microsoft.com/office/drawing/2018/hyperlinkcolor">
+<p:sld xmlns:a="http://schemas.openxmlformats.org/drawingml/2006/main" xmlns:r="http://schemas.openxmlformats.org/officeDocument/2006/relationships" xmlns:p="http://schemas.openxmlformats.org/presentationml/2006/main">
   <p:cSld>
     <p:spTree>
       <p:nvGrpSpPr>
-        <p:cNvPr id="93" name="Shape 93"/>
+        <p:cNvPr id="1" name="Shape 93"/>
         <p:cNvGrpSpPr/>
         <p:nvPr/>
       </p:nvGrpSpPr>
@@ -7962,7 +8055,9 @@
       <p:sp>
         <p:nvSpPr>
           <p:cNvPr id="94" name="Google Shape;94;p14"/>
-          <p:cNvSpPr txBox="1"/>
+          <p:cNvSpPr txBox="1">
+            <a:spLocks noGrp="1"/>
+          </p:cNvSpPr>
           <p:nvPr>
             <p:ph type="title"/>
           </p:nvPr>
@@ -7977,12 +8072,12 @@
           </a:prstGeom>
         </p:spPr>
         <p:txBody>
-          <a:bodyPr anchorCtr="0" anchor="t" bIns="91425" lIns="91425" spcFirstLastPara="1" rIns="91425" wrap="square" tIns="91425">
-            <a:normAutofit fontScale="90000"/>
+          <a:bodyPr spcFirstLastPara="1" wrap="square" lIns="91425" tIns="91425" rIns="91425" bIns="91425" anchor="t" anchorCtr="0">
+            <a:normAutofit/>
           </a:bodyPr>
           <a:lstStyle/>
           <a:p>
-            <a:pPr indent="0" lvl="0" marL="0" rtl="0" algn="l">
+            <a:pPr marL="0" lvl="0" indent="0" algn="l" rtl="0">
               <a:spcBef>
                 <a:spcPts val="0"/>
               </a:spcBef>
@@ -7992,7 +8087,7 @@
               <a:buNone/>
             </a:pPr>
             <a:r>
-              <a:rPr b="0" lang="en" sz="2127">
+              <a:rPr lang="en" sz="2127" b="0">
                 <a:solidFill>
                   <a:srgbClr val="373A3C"/>
                 </a:solidFill>
@@ -8006,7 +8101,7 @@
               </a:rPr>
               <a:t>Summary of the Big Ideas</a:t>
             </a:r>
-            <a:endParaRPr b="0" sz="3377">
+            <a:endParaRPr sz="3377" b="0">
               <a:latin typeface="Lato Black"/>
               <a:ea typeface="Lato Black"/>
               <a:cs typeface="Lato Black"/>
@@ -8018,9 +8113,11 @@
       <p:sp>
         <p:nvSpPr>
           <p:cNvPr id="95" name="Google Shape;95;p14"/>
-          <p:cNvSpPr txBox="1"/>
+          <p:cNvSpPr txBox="1">
+            <a:spLocks noGrp="1"/>
+          </p:cNvSpPr>
           <p:nvPr>
-            <p:ph idx="1" type="body"/>
+            <p:ph type="body" idx="1"/>
           </p:nvPr>
         </p:nvSpPr>
         <p:spPr>
@@ -8033,12 +8130,12 @@
           </a:prstGeom>
         </p:spPr>
         <p:txBody>
-          <a:bodyPr anchorCtr="0" anchor="t" bIns="91425" lIns="91425" spcFirstLastPara="1" rIns="91425" wrap="square" tIns="91425">
+          <a:bodyPr spcFirstLastPara="1" wrap="square" lIns="91425" tIns="91425" rIns="91425" bIns="91425" anchor="t" anchorCtr="0">
             <a:normAutofit/>
           </a:bodyPr>
           <a:lstStyle/>
           <a:p>
-            <a:pPr indent="-311150" lvl="0" marL="457200" rtl="0" algn="l">
+            <a:pPr marL="457200" lvl="0" indent="-311150" algn="l" rtl="0">
               <a:spcBef>
                 <a:spcPts val="0"/>
               </a:spcBef>
@@ -8049,13 +8146,24 @@
               <a:buChar char="●"/>
             </a:pPr>
             <a:r>
-              <a:rPr lang="en"/>
-              <a:t>The book raises ethical considerations about the transparency, human oversight, and potential biases in algorithms, and emphasizes the importance of human touch, morality, and individualized ethical solutions.</a:t>
+              <a:rPr lang="en-US" altLang="zh-CN" sz="1800" dirty="0">
+                <a:latin typeface="Times New Roman" panose="02020603050405020304" pitchFamily="18" charset="0"/>
+                <a:ea typeface="等线" panose="02010600030101010101" pitchFamily="2" charset="-122"/>
+              </a:rPr>
+              <a:t>T</a:t>
             </a:r>
-            <a:endParaRPr/>
+            <a:r>
+              <a:rPr lang="en-US" sz="1800" kern="0" dirty="0">
+                <a:effectLst/>
+                <a:latin typeface="Times New Roman" panose="02020603050405020304" pitchFamily="18" charset="0"/>
+                <a:ea typeface="等线" panose="02010600030101010101" pitchFamily="2" charset="-122"/>
+              </a:rPr>
+              <a:t>he relationship between humans and machines is evolving, and it is important to consider how we can work together to achieve human goals</a:t>
+            </a:r>
+            <a:endParaRPr lang="en-US" dirty="0"/>
           </a:p>
           <a:p>
-            <a:pPr indent="-311150" lvl="0" marL="457200" rtl="0" algn="l">
+            <a:pPr marL="457200" lvl="0" indent="-311150" algn="l" rtl="0">
               <a:spcBef>
                 <a:spcPts val="0"/>
               </a:spcBef>
@@ -8066,13 +8174,23 @@
               <a:buChar char="●"/>
             </a:pPr>
             <a:r>
-              <a:rPr lang="en"/>
-              <a:t>Sometimes, using algorithms means forcing people to develop a practical solution to ethical or philosophical problems</a:t>
+              <a:rPr lang="en-US" sz="1800" dirty="0">
+                <a:latin typeface="Times New Roman" panose="02020603050405020304" pitchFamily="18" charset="0"/>
+                <a:ea typeface="等线" panose="02010600030101010101" pitchFamily="2" charset="-122"/>
+              </a:rPr>
+              <a:t>T</a:t>
             </a:r>
-            <a:endParaRPr/>
+            <a:r>
+              <a:rPr lang="en-US" sz="1800" kern="0" dirty="0">
+                <a:effectLst/>
+                <a:latin typeface="Times New Roman" panose="02020603050405020304" pitchFamily="18" charset="0"/>
+                <a:ea typeface="等线" panose="02010600030101010101" pitchFamily="2" charset="-122"/>
+              </a:rPr>
+              <a:t>he nature of prediction is built on mathematical models, and justice is not part of prediction</a:t>
+            </a:r>
           </a:p>
           <a:p>
-            <a:pPr indent="-311150" lvl="0" marL="457200" rtl="0" algn="l">
+            <a:pPr marL="457200" lvl="0" indent="-311150" algn="l" rtl="0">
               <a:spcBef>
                 <a:spcPts val="0"/>
               </a:spcBef>
@@ -8083,10 +8201,21 @@
               <a:buChar char="●"/>
             </a:pPr>
             <a:r>
-              <a:rPr lang="en"/>
-              <a:t>Don't rely too much on algorithms written by others</a:t>
+              <a:rPr lang="en-US" sz="1800" dirty="0">
+                <a:latin typeface="Times New Roman" panose="02020603050405020304" pitchFamily="18" charset="0"/>
+                <a:ea typeface="等线" panose="02010600030101010101" pitchFamily="2" charset="-122"/>
+              </a:rPr>
+              <a:t>U</a:t>
             </a:r>
-            <a:endParaRPr/>
+            <a:r>
+              <a:rPr lang="en-US" sz="1800" kern="0" dirty="0">
+                <a:effectLst/>
+                <a:latin typeface="Times New Roman" panose="02020603050405020304" pitchFamily="18" charset="0"/>
+                <a:ea typeface="等线" panose="02010600030101010101" pitchFamily="2" charset="-122"/>
+              </a:rPr>
+              <a:t>sing AI and algorithms means having to give answers to historical debates about morality and philosophy</a:t>
+            </a:r>
+            <a:endParaRPr dirty="0"/>
           </a:p>
         </p:txBody>
       </p:sp>
@@ -8099,11 +8228,11 @@
 </file>
 
 <file path=ppt/slides/slide3.xml><?xml version="1.0" encoding="utf-8"?>
-<p:sld xmlns:a="http://schemas.openxmlformats.org/drawingml/2006/main" xmlns:r="http://schemas.openxmlformats.org/officeDocument/2006/relationships" xmlns:mc="http://schemas.openxmlformats.org/markup-compatibility/2006" xmlns:mv="urn:schemas-microsoft-com:mac:vml" xmlns:p="http://schemas.openxmlformats.org/presentationml/2006/main" xmlns:c="http://schemas.openxmlformats.org/drawingml/2006/chart" xmlns:dgm="http://schemas.openxmlformats.org/drawingml/2006/diagram" xmlns:o="urn:schemas-microsoft-com:office:office" xmlns:v="urn:schemas-microsoft-com:vml" xmlns:pvml="urn:schemas-microsoft-com:office:powerpoint" xmlns:com="http://schemas.openxmlformats.org/drawingml/2006/compatibility" xmlns:p14="http://schemas.microsoft.com/office/powerpoint/2010/main" xmlns:p15="http://schemas.microsoft.com/office/powerpoint/2012/main" xmlns:ahyp="http://schemas.microsoft.com/office/drawing/2018/hyperlinkcolor">
+<p:sld xmlns:a="http://schemas.openxmlformats.org/drawingml/2006/main" xmlns:r="http://schemas.openxmlformats.org/officeDocument/2006/relationships" xmlns:p="http://schemas.openxmlformats.org/presentationml/2006/main">
   <p:cSld>
     <p:spTree>
       <p:nvGrpSpPr>
-        <p:cNvPr id="99" name="Shape 99"/>
+        <p:cNvPr id="1" name="Shape 99"/>
         <p:cNvGrpSpPr/>
         <p:nvPr/>
       </p:nvGrpSpPr>
@@ -8118,7 +8247,9 @@
       <p:sp>
         <p:nvSpPr>
           <p:cNvPr id="100" name="Google Shape;100;p15"/>
-          <p:cNvSpPr txBox="1"/>
+          <p:cNvSpPr txBox="1">
+            <a:spLocks noGrp="1"/>
+          </p:cNvSpPr>
           <p:nvPr>
             <p:ph type="title"/>
           </p:nvPr>
@@ -8133,12 +8264,12 @@
           </a:prstGeom>
         </p:spPr>
         <p:txBody>
-          <a:bodyPr anchorCtr="0" anchor="t" bIns="91425" lIns="91425" spcFirstLastPara="1" rIns="91425" wrap="square" tIns="91425">
+          <a:bodyPr spcFirstLastPara="1" wrap="square" lIns="91425" tIns="91425" rIns="91425" bIns="91425" anchor="t" anchorCtr="0">
             <a:normAutofit fontScale="90000"/>
           </a:bodyPr>
           <a:lstStyle/>
           <a:p>
-            <a:pPr indent="0" lvl="0" marL="0" rtl="0" algn="l">
+            <a:pPr marL="0" lvl="0" indent="0" algn="l" rtl="0">
               <a:spcBef>
                 <a:spcPts val="0"/>
               </a:spcBef>
@@ -8148,7 +8279,7 @@
               <a:buNone/>
             </a:pPr>
             <a:r>
-              <a:rPr b="0" lang="en" sz="2461">
+              <a:rPr lang="en" sz="2461" b="0">
                 <a:solidFill>
                   <a:srgbClr val="373A3C"/>
                 </a:solidFill>
@@ -8160,37 +8291,7 @@
                 <a:cs typeface="Lato Black"/>
                 <a:sym typeface="Lato Black"/>
               </a:rPr>
-              <a:t>T</a:t>
-            </a:r>
-            <a:r>
-              <a:rPr b="0" lang="en" sz="2461">
-                <a:solidFill>
-                  <a:srgbClr val="373A3C"/>
-                </a:solidFill>
-                <a:highlight>
-                  <a:srgbClr val="FFFFFF"/>
-                </a:highlight>
-                <a:latin typeface="Lato Black"/>
-                <a:ea typeface="Lato Black"/>
-                <a:cs typeface="Lato Black"/>
-                <a:sym typeface="Lato Black"/>
-              </a:rPr>
-              <a:t>rolley Problem in Self-Driving Cars</a:t>
-            </a:r>
-            <a:r>
-              <a:rPr b="0" lang="en" sz="2461">
-                <a:solidFill>
-                  <a:srgbClr val="373A3C"/>
-                </a:solidFill>
-                <a:highlight>
-                  <a:srgbClr val="FFFFFF"/>
-                </a:highlight>
-                <a:latin typeface="Lato Black"/>
-                <a:ea typeface="Lato Black"/>
-                <a:cs typeface="Lato Black"/>
-                <a:sym typeface="Lato Black"/>
-              </a:rPr>
-              <a:t> </a:t>
+              <a:t>Trolley Problem in Self-Driving Cars </a:t>
             </a:r>
             <a:endParaRPr sz="2933"/>
           </a:p>
@@ -8199,9 +8300,11 @@
       <p:sp>
         <p:nvSpPr>
           <p:cNvPr id="101" name="Google Shape;101;p15"/>
-          <p:cNvSpPr txBox="1"/>
+          <p:cNvSpPr txBox="1">
+            <a:spLocks noGrp="1"/>
+          </p:cNvSpPr>
           <p:nvPr>
-            <p:ph idx="1" type="body"/>
+            <p:ph type="body" idx="1"/>
           </p:nvPr>
         </p:nvSpPr>
         <p:spPr>
@@ -8214,12 +8317,12 @@
           </a:prstGeom>
         </p:spPr>
         <p:txBody>
-          <a:bodyPr anchorCtr="0" anchor="t" bIns="91425" lIns="91425" spcFirstLastPara="1" rIns="91425" wrap="square" tIns="91425">
+          <a:bodyPr spcFirstLastPara="1" wrap="square" lIns="91425" tIns="91425" rIns="91425" bIns="91425" anchor="t" anchorCtr="0">
             <a:normAutofit/>
           </a:bodyPr>
           <a:lstStyle/>
           <a:p>
-            <a:pPr indent="0" lvl="0" marL="0" rtl="0" algn="l">
+            <a:pPr marL="0" lvl="0" indent="0" algn="l" rtl="0">
               <a:spcBef>
                 <a:spcPts val="0"/>
               </a:spcBef>
@@ -8228,9 +8331,6 @@
               </a:spcAft>
               <a:buNone/>
             </a:pPr>
-            <a:r>
-              <a:t/>
-            </a:r>
             <a:endParaRPr/>
           </a:p>
         </p:txBody>
@@ -8300,11 +8400,11 @@
 </file>
 
 <file path=ppt/slides/slide4.xml><?xml version="1.0" encoding="utf-8"?>
-<p:sld xmlns:a="http://schemas.openxmlformats.org/drawingml/2006/main" xmlns:r="http://schemas.openxmlformats.org/officeDocument/2006/relationships" xmlns:mc="http://schemas.openxmlformats.org/markup-compatibility/2006" xmlns:mv="urn:schemas-microsoft-com:mac:vml" xmlns:p="http://schemas.openxmlformats.org/presentationml/2006/main" xmlns:c="http://schemas.openxmlformats.org/drawingml/2006/chart" xmlns:dgm="http://schemas.openxmlformats.org/drawingml/2006/diagram" xmlns:o="urn:schemas-microsoft-com:office:office" xmlns:v="urn:schemas-microsoft-com:vml" xmlns:pvml="urn:schemas-microsoft-com:office:powerpoint" xmlns:com="http://schemas.openxmlformats.org/drawingml/2006/compatibility" xmlns:p14="http://schemas.microsoft.com/office/powerpoint/2010/main" xmlns:p15="http://schemas.microsoft.com/office/powerpoint/2012/main" xmlns:ahyp="http://schemas.microsoft.com/office/drawing/2018/hyperlinkcolor">
+<p:sld xmlns:a="http://schemas.openxmlformats.org/drawingml/2006/main" xmlns:r="http://schemas.openxmlformats.org/officeDocument/2006/relationships" xmlns:p="http://schemas.openxmlformats.org/presentationml/2006/main">
   <p:cSld>
     <p:spTree>
       <p:nvGrpSpPr>
-        <p:cNvPr id="107" name="Shape 107"/>
+        <p:cNvPr id="1" name="Shape 107"/>
         <p:cNvGrpSpPr/>
         <p:nvPr/>
       </p:nvGrpSpPr>
@@ -8319,7 +8419,9 @@
       <p:sp>
         <p:nvSpPr>
           <p:cNvPr id="108" name="Google Shape;108;p16"/>
-          <p:cNvSpPr txBox="1"/>
+          <p:cNvSpPr txBox="1">
+            <a:spLocks noGrp="1"/>
+          </p:cNvSpPr>
           <p:nvPr>
             <p:ph type="title"/>
           </p:nvPr>
@@ -8334,12 +8436,12 @@
           </a:prstGeom>
         </p:spPr>
         <p:txBody>
-          <a:bodyPr anchorCtr="0" anchor="t" bIns="91425" lIns="91425" spcFirstLastPara="1" rIns="91425" wrap="square" tIns="91425">
+          <a:bodyPr spcFirstLastPara="1" wrap="square" lIns="91425" tIns="91425" rIns="91425" bIns="91425" anchor="t" anchorCtr="0">
             <a:normAutofit fontScale="90000"/>
           </a:bodyPr>
           <a:lstStyle/>
           <a:p>
-            <a:pPr indent="0" lvl="0" marL="0" rtl="0" algn="l">
+            <a:pPr marL="0" lvl="0" indent="0" algn="l" rtl="0">
               <a:spcBef>
                 <a:spcPts val="0"/>
               </a:spcBef>
@@ -8353,7 +8455,7 @@
               <a:t>Response to </a:t>
             </a:r>
             <a:r>
-              <a:rPr b="0" lang="en" sz="2461">
+              <a:rPr lang="en" sz="2461" b="0">
                 <a:solidFill>
                   <a:srgbClr val="373A3C"/>
                 </a:solidFill>
@@ -8365,22 +8467,7 @@
                 <a:cs typeface="Lato Black"/>
                 <a:sym typeface="Lato Black"/>
               </a:rPr>
-              <a:t>T</a:t>
-            </a:r>
-            <a:r>
-              <a:rPr b="0" lang="en" sz="2461">
-                <a:solidFill>
-                  <a:srgbClr val="373A3C"/>
-                </a:solidFill>
-                <a:highlight>
-                  <a:srgbClr val="FFFFFF"/>
-                </a:highlight>
-                <a:latin typeface="Lato Black"/>
-                <a:ea typeface="Lato Black"/>
-                <a:cs typeface="Lato Black"/>
-                <a:sym typeface="Lato Black"/>
-              </a:rPr>
-              <a:t>rolley Problem</a:t>
+              <a:t>Trolley Problem</a:t>
             </a:r>
             <a:endParaRPr/>
           </a:p>
@@ -8389,9 +8476,11 @@
       <p:sp>
         <p:nvSpPr>
           <p:cNvPr id="109" name="Google Shape;109;p16"/>
-          <p:cNvSpPr txBox="1"/>
+          <p:cNvSpPr txBox="1">
+            <a:spLocks noGrp="1"/>
+          </p:cNvSpPr>
           <p:nvPr>
-            <p:ph idx="1" type="body"/>
+            <p:ph type="body" idx="1"/>
           </p:nvPr>
         </p:nvSpPr>
         <p:spPr>
@@ -8404,12 +8493,12 @@
           </a:prstGeom>
         </p:spPr>
         <p:txBody>
-          <a:bodyPr anchorCtr="0" anchor="t" bIns="91425" lIns="91425" spcFirstLastPara="1" rIns="91425" wrap="square" tIns="91425">
+          <a:bodyPr spcFirstLastPara="1" wrap="square" lIns="91425" tIns="91425" rIns="91425" bIns="91425" anchor="t" anchorCtr="0">
             <a:normAutofit/>
           </a:bodyPr>
           <a:lstStyle/>
           <a:p>
-            <a:pPr indent="0" lvl="0" marL="0" rtl="0" algn="l">
+            <a:pPr marL="0" lvl="0" indent="0" algn="l" rtl="0">
               <a:spcBef>
                 <a:spcPts val="0"/>
               </a:spcBef>
@@ -8443,11 +8532,118 @@
 </file>
 
 <file path=ppt/slides/slide5.xml><?xml version="1.0" encoding="utf-8"?>
-<p:sld xmlns:a="http://schemas.openxmlformats.org/drawingml/2006/main" xmlns:r="http://schemas.openxmlformats.org/officeDocument/2006/relationships" xmlns:mc="http://schemas.openxmlformats.org/markup-compatibility/2006" xmlns:mv="urn:schemas-microsoft-com:mac:vml" xmlns:p="http://schemas.openxmlformats.org/presentationml/2006/main" xmlns:c="http://schemas.openxmlformats.org/drawingml/2006/chart" xmlns:dgm="http://schemas.openxmlformats.org/drawingml/2006/diagram" xmlns:o="urn:schemas-microsoft-com:office:office" xmlns:v="urn:schemas-microsoft-com:vml" xmlns:pvml="urn:schemas-microsoft-com:office:powerpoint" xmlns:com="http://schemas.openxmlformats.org/drawingml/2006/compatibility" xmlns:p14="http://schemas.microsoft.com/office/powerpoint/2010/main" xmlns:p15="http://schemas.microsoft.com/office/powerpoint/2012/main" xmlns:ahyp="http://schemas.microsoft.com/office/drawing/2018/hyperlinkcolor">
+<p:sld xmlns:a="http://schemas.openxmlformats.org/drawingml/2006/main" xmlns:r="http://schemas.openxmlformats.org/officeDocument/2006/relationships" xmlns:p="http://schemas.openxmlformats.org/presentationml/2006/main">
   <p:cSld>
     <p:spTree>
       <p:nvGrpSpPr>
-        <p:cNvPr id="113" name="Shape 113"/>
+        <p:cNvPr id="1" name=""/>
+        <p:cNvGrpSpPr/>
+        <p:nvPr/>
+      </p:nvGrpSpPr>
+      <p:grpSpPr>
+        <a:xfrm>
+          <a:off x="0" y="0"/>
+          <a:ext cx="0" cy="0"/>
+          <a:chOff x="0" y="0"/>
+          <a:chExt cx="0" cy="0"/>
+        </a:xfrm>
+      </p:grpSpPr>
+      <p:sp>
+        <p:nvSpPr>
+          <p:cNvPr id="2" name="标题 1">
+            <a:extLst>
+              <a:ext uri="{FF2B5EF4-FFF2-40B4-BE49-F238E27FC236}">
+                <a16:creationId xmlns:a16="http://schemas.microsoft.com/office/drawing/2014/main" id="{35C8EC4A-91DF-D649-7C37-608AECAEE2FC}"/>
+              </a:ext>
+            </a:extLst>
+          </p:cNvPr>
+          <p:cNvSpPr>
+            <a:spLocks noGrp="1"/>
+          </p:cNvSpPr>
+          <p:nvPr>
+            <p:ph type="title"/>
+          </p:nvPr>
+        </p:nvSpPr>
+        <p:spPr/>
+        <p:txBody>
+          <a:bodyPr>
+            <a:normAutofit fontScale="90000"/>
+          </a:bodyPr>
+          <a:lstStyle/>
+          <a:p>
+            <a:r>
+              <a:rPr lang="en-US" dirty="0"/>
+              <a:t>Algorithms Biases</a:t>
+            </a:r>
+          </a:p>
+        </p:txBody>
+      </p:sp>
+      <p:sp>
+        <p:nvSpPr>
+          <p:cNvPr id="3" name="文本占位符 2">
+            <a:extLst>
+              <a:ext uri="{FF2B5EF4-FFF2-40B4-BE49-F238E27FC236}">
+                <a16:creationId xmlns:a16="http://schemas.microsoft.com/office/drawing/2014/main" id="{7AD4FFEC-70BE-5844-6110-EB8A99CEA358}"/>
+              </a:ext>
+            </a:extLst>
+          </p:cNvPr>
+          <p:cNvSpPr>
+            <a:spLocks noGrp="1"/>
+          </p:cNvSpPr>
+          <p:nvPr>
+            <p:ph type="body" idx="1"/>
+          </p:nvPr>
+        </p:nvSpPr>
+        <p:spPr/>
+        <p:txBody>
+          <a:bodyPr>
+            <a:normAutofit fontScale="92500" lnSpcReduction="20000"/>
+          </a:bodyPr>
+          <a:lstStyle/>
+          <a:p>
+            <a:r>
+              <a:rPr lang="en-US" sz="1800" kern="100" dirty="0">
+                <a:solidFill>
+                  <a:srgbClr val="000000"/>
+                </a:solidFill>
+                <a:effectLst/>
+                <a:latin typeface="Times New Roman" panose="02020603050405020304" pitchFamily="18" charset="0"/>
+                <a:ea typeface="等线" panose="02010600030101010101" pitchFamily="2" charset="-122"/>
+                <a:cs typeface="Times New Roman" panose="02020603050405020304" pitchFamily="18" charset="0"/>
+              </a:rPr>
+              <a:t>“Try searching ‘math professor’ in Google … 94 per cent of math professors are male. But however accurate the results might be, you could argue that using algorithms as a mirror to reflect the real world isn’t always helpful, especially when the mirror is reflecting a present reality that only exists because of centuries of bias. Now, if it so chose, Google could subtly tweak its algorithm to prioritize images of female or non-white professors over others, to even out the balance a little and reflect the society we’re aiming for, rather than the one we live in.”</a:t>
+            </a:r>
+            <a:endParaRPr lang="en-US" sz="1800" kern="100" dirty="0">
+              <a:effectLst/>
+              <a:latin typeface="Calibri" panose="020F0502020204030204" pitchFamily="34" charset="0"/>
+              <a:ea typeface="等线" panose="02010600030101010101" pitchFamily="2" charset="-122"/>
+              <a:cs typeface="Times New Roman" panose="02020603050405020304" pitchFamily="18" charset="0"/>
+            </a:endParaRPr>
+          </a:p>
+          <a:p>
+            <a:endParaRPr lang="en-US" dirty="0"/>
+          </a:p>
+        </p:txBody>
+      </p:sp>
+    </p:spTree>
+    <p:extLst>
+      <p:ext uri="{BB962C8B-B14F-4D97-AF65-F5344CB8AC3E}">
+        <p14:creationId xmlns:p14="http://schemas.microsoft.com/office/powerpoint/2010/main" val="136993337"/>
+      </p:ext>
+    </p:extLst>
+  </p:cSld>
+  <p:clrMapOvr>
+    <a:masterClrMapping/>
+  </p:clrMapOvr>
+</p:sld>
+</file>
+
+<file path=ppt/slides/slide6.xml><?xml version="1.0" encoding="utf-8"?>
+<p:sld xmlns:a="http://schemas.openxmlformats.org/drawingml/2006/main" xmlns:r="http://schemas.openxmlformats.org/officeDocument/2006/relationships" xmlns:p="http://schemas.openxmlformats.org/presentationml/2006/main">
+  <p:cSld>
+    <p:spTree>
+      <p:nvGrpSpPr>
+        <p:cNvPr id="1" name="Shape 113"/>
         <p:cNvGrpSpPr/>
         <p:nvPr/>
       </p:nvGrpSpPr>
@@ -8462,7 +8658,9 @@
       <p:sp>
         <p:nvSpPr>
           <p:cNvPr id="114" name="Google Shape;114;p17"/>
-          <p:cNvSpPr txBox="1"/>
+          <p:cNvSpPr txBox="1">
+            <a:spLocks noGrp="1"/>
+          </p:cNvSpPr>
           <p:nvPr>
             <p:ph type="title"/>
           </p:nvPr>
@@ -8477,12 +8675,12 @@
           </a:prstGeom>
         </p:spPr>
         <p:txBody>
-          <a:bodyPr anchorCtr="0" anchor="t" bIns="91425" lIns="91425" spcFirstLastPara="1" rIns="91425" wrap="square" tIns="91425">
+          <a:bodyPr spcFirstLastPara="1" wrap="square" lIns="91425" tIns="91425" rIns="91425" bIns="91425" anchor="t" anchorCtr="0">
             <a:normAutofit fontScale="90000"/>
           </a:bodyPr>
           <a:lstStyle/>
           <a:p>
-            <a:pPr indent="0" lvl="0" marL="0" rtl="0" algn="l">
+            <a:pPr marL="0" lvl="0" indent="0" algn="l" rtl="0">
               <a:spcBef>
                 <a:spcPts val="0"/>
               </a:spcBef>
@@ -8502,9 +8700,11 @@
       <p:sp>
         <p:nvSpPr>
           <p:cNvPr id="115" name="Google Shape;115;p17"/>
-          <p:cNvSpPr txBox="1"/>
+          <p:cNvSpPr txBox="1">
+            <a:spLocks noGrp="1"/>
+          </p:cNvSpPr>
           <p:nvPr>
-            <p:ph idx="1" type="body"/>
+            <p:ph type="body" idx="1"/>
           </p:nvPr>
         </p:nvSpPr>
         <p:spPr>
@@ -8517,12 +8717,12 @@
           </a:prstGeom>
         </p:spPr>
         <p:txBody>
-          <a:bodyPr anchorCtr="0" anchor="t" bIns="91425" lIns="91425" spcFirstLastPara="1" rIns="91425" wrap="square" tIns="91425">
-            <a:normAutofit fontScale="40000"/>
+          <a:bodyPr spcFirstLastPara="1" wrap="square" lIns="91425" tIns="91425" rIns="91425" bIns="91425" anchor="t" anchorCtr="0">
+            <a:normAutofit fontScale="40000" lnSpcReduction="20000"/>
           </a:bodyPr>
           <a:lstStyle/>
           <a:p>
-            <a:pPr indent="-323340" lvl="0" marL="457200" marR="0" rtl="0" algn="l">
+            <a:pPr marL="457200" marR="0" lvl="0" indent="-323340" algn="l" rtl="0">
               <a:lnSpc>
                 <a:spcPct val="200000"/>
               </a:lnSpc>
@@ -8553,7 +8753,7 @@
             </a:endParaRPr>
           </a:p>
           <a:p>
-            <a:pPr indent="-323340" lvl="0" marL="457200" marR="0" rtl="0" algn="l">
+            <a:pPr marL="457200" marR="0" lvl="0" indent="-323340" algn="l" rtl="0">
               <a:lnSpc>
                 <a:spcPct val="200000"/>
               </a:lnSpc>
@@ -8600,12 +8800,12 @@
 </p:sld>
 </file>
 
-<file path=ppt/slides/slide6.xml><?xml version="1.0" encoding="utf-8"?>
-<p:sld xmlns:a="http://schemas.openxmlformats.org/drawingml/2006/main" xmlns:r="http://schemas.openxmlformats.org/officeDocument/2006/relationships" xmlns:mc="http://schemas.openxmlformats.org/markup-compatibility/2006" xmlns:mv="urn:schemas-microsoft-com:mac:vml" xmlns:p="http://schemas.openxmlformats.org/presentationml/2006/main" xmlns:c="http://schemas.openxmlformats.org/drawingml/2006/chart" xmlns:dgm="http://schemas.openxmlformats.org/drawingml/2006/diagram" xmlns:o="urn:schemas-microsoft-com:office:office" xmlns:v="urn:schemas-microsoft-com:vml" xmlns:pvml="urn:schemas-microsoft-com:office:powerpoint" xmlns:com="http://schemas.openxmlformats.org/drawingml/2006/compatibility" xmlns:p14="http://schemas.microsoft.com/office/powerpoint/2010/main" xmlns:p15="http://schemas.microsoft.com/office/powerpoint/2012/main" xmlns:ahyp="http://schemas.microsoft.com/office/drawing/2018/hyperlinkcolor">
+<file path=ppt/slides/slide7.xml><?xml version="1.0" encoding="utf-8"?>
+<p:sld xmlns:a="http://schemas.openxmlformats.org/drawingml/2006/main" xmlns:r="http://schemas.openxmlformats.org/officeDocument/2006/relationships" xmlns:p="http://schemas.openxmlformats.org/presentationml/2006/main">
   <p:cSld>
     <p:spTree>
       <p:nvGrpSpPr>
-        <p:cNvPr id="119" name="Shape 119"/>
+        <p:cNvPr id="1" name="Shape 119"/>
         <p:cNvGrpSpPr/>
         <p:nvPr/>
       </p:nvGrpSpPr>
@@ -8620,7 +8820,9 @@
       <p:sp>
         <p:nvSpPr>
           <p:cNvPr id="120" name="Google Shape;120;p18"/>
-          <p:cNvSpPr txBox="1"/>
+          <p:cNvSpPr txBox="1">
+            <a:spLocks noGrp="1"/>
+          </p:cNvSpPr>
           <p:nvPr>
             <p:ph type="title"/>
           </p:nvPr>
@@ -8635,12 +8837,12 @@
           </a:prstGeom>
         </p:spPr>
         <p:txBody>
-          <a:bodyPr anchorCtr="0" anchor="t" bIns="91425" lIns="91425" spcFirstLastPara="1" rIns="91425" wrap="square" tIns="91425">
+          <a:bodyPr spcFirstLastPara="1" wrap="square" lIns="91425" tIns="91425" rIns="91425" bIns="91425" anchor="t" anchorCtr="0">
             <a:normAutofit fontScale="90000"/>
           </a:bodyPr>
           <a:lstStyle/>
           <a:p>
-            <a:pPr indent="0" lvl="0" marL="0" rtl="0" algn="l">
+            <a:pPr marL="0" lvl="0" indent="0" algn="l" rtl="0">
               <a:spcBef>
                 <a:spcPts val="0"/>
               </a:spcBef>
@@ -8651,11 +8853,7 @@
             </a:pPr>
             <a:r>
               <a:rPr lang="en"/>
-              <a:t>Recommendation</a:t>
-            </a:r>
-            <a:r>
-              <a:rPr lang="en"/>
-              <a:t> </a:t>
+              <a:t>Recommendation </a:t>
             </a:r>
             <a:endParaRPr/>
           </a:p>
@@ -8709,12 +8907,12 @@
           </a:ln>
         </p:spPr>
         <p:txBody>
-          <a:bodyPr anchorCtr="0" anchor="t" bIns="91425" lIns="91425" spcFirstLastPara="1" rIns="91425" wrap="square" tIns="91425">
+          <a:bodyPr spcFirstLastPara="1" wrap="square" lIns="91425" tIns="91425" rIns="91425" bIns="91425" anchor="t" anchorCtr="0">
             <a:spAutoFit/>
           </a:bodyPr>
           <a:lstStyle/>
           <a:p>
-            <a:pPr indent="0" lvl="0" marL="0" rtl="0" algn="l">
+            <a:pPr marL="0" lvl="0" indent="0" algn="l" rtl="0">
               <a:spcBef>
                 <a:spcPts val="0"/>
               </a:spcBef>
@@ -8750,7 +8948,7 @@
 </file>
 
 <file path=ppt/theme/theme1.xml><?xml version="1.0" encoding="utf-8"?>
-<a:theme xmlns:a="http://schemas.openxmlformats.org/drawingml/2006/main" xmlns:r="http://schemas.openxmlformats.org/officeDocument/2006/relationships" name="Streamline">
+<a:theme xmlns:a="http://schemas.openxmlformats.org/drawingml/2006/main" name="Streamline">
   <a:themeElements>
     <a:clrScheme name="Streamline">
       <a:dk1>
@@ -9025,11 +9223,13 @@
       </a:bgFillStyleLst>
     </a:fmtScheme>
   </a:themeElements>
+  <a:objectDefaults/>
+  <a:extraClrSchemeLst/>
 </a:theme>
 </file>
 
 <file path=ppt/theme/theme2.xml><?xml version="1.0" encoding="utf-8"?>
-<a:theme xmlns:a="http://schemas.openxmlformats.org/drawingml/2006/main" xmlns:r="http://schemas.openxmlformats.org/officeDocument/2006/relationships">
+<a:theme xmlns:a="http://schemas.openxmlformats.org/drawingml/2006/main">
   <a:themeElements>
     <a:clrScheme name="Default">
       <a:dk1>
@@ -9304,5 +9504,7 @@
       </a:bgFillStyleLst>
     </a:fmtScheme>
   </a:themeElements>
+  <a:objectDefaults/>
+  <a:extraClrSchemeLst/>
 </a:theme>
 </file>
</xml_diff>